<commit_message>
add more pdf and
</commit_message>
<xml_diff>
--- a/Materialien/Powerpoint/Einfuehrung in Threads.pptx
+++ b/Materialien/Powerpoint/Einfuehrung in Threads.pptx
@@ -131,2052 +131,6 @@
 <file path=ppt/changesInfos/changesInfo1.xml><?xml version="1.0" encoding="utf-8"?>
 <pc:chgInfo xmlns:a="http://schemas.openxmlformats.org/drawingml/2006/main" xmlns:r="http://schemas.openxmlformats.org/officeDocument/2006/relationships" xmlns:ac="http://schemas.microsoft.com/office/drawing/2013/main/command" xmlns:pc="http://schemas.microsoft.com/office/powerpoint/2013/main/command">
   <pc:docChgLst>
-    <pc:chgData name="Sebastian Meine" userId="f54488a2a6b7dc9e" providerId="LiveId" clId="{BE1DB9F4-E304-4C37-970B-A53B13E8E1BC}"/>
-    <pc:docChg chg="custSel modSld">
-      <pc:chgData name="Sebastian Meine" userId="f54488a2a6b7dc9e" providerId="LiveId" clId="{BE1DB9F4-E304-4C37-970B-A53B13E8E1BC}" dt="2021-07-04T14:49:22.515" v="9"/>
-      <pc:docMkLst>
-        <pc:docMk/>
-      </pc:docMkLst>
-      <pc:sldChg chg="addSp delSp modSp mod">
-        <pc:chgData name="Sebastian Meine" userId="f54488a2a6b7dc9e" providerId="LiveId" clId="{BE1DB9F4-E304-4C37-970B-A53B13E8E1BC}" dt="2021-07-04T14:48:58.033" v="5" actId="478"/>
-        <pc:sldMkLst>
-          <pc:docMk/>
-          <pc:sldMk cId="238189655" sldId="256"/>
-        </pc:sldMkLst>
-        <pc:spChg chg="mod">
-          <ac:chgData name="Sebastian Meine" userId="f54488a2a6b7dc9e" providerId="LiveId" clId="{BE1DB9F4-E304-4C37-970B-A53B13E8E1BC}" dt="2021-07-04T14:43:23.278" v="0" actId="403"/>
-          <ac:spMkLst>
-            <pc:docMk/>
-            <pc:sldMk cId="238189655" sldId="256"/>
-            <ac:spMk id="2" creationId="{87B2046A-71C6-4A5C-90F4-24A921FBE6F2}"/>
-          </ac:spMkLst>
-        </pc:spChg>
-        <pc:spChg chg="add mod">
-          <ac:chgData name="Sebastian Meine" userId="f54488a2a6b7dc9e" providerId="LiveId" clId="{BE1DB9F4-E304-4C37-970B-A53B13E8E1BC}" dt="2021-07-04T14:48:51.469" v="1"/>
-          <ac:spMkLst>
-            <pc:docMk/>
-            <pc:sldMk cId="238189655" sldId="256"/>
-            <ac:spMk id="4" creationId="{59758521-4940-4667-AD02-D9159FCBA0AA}"/>
-          </ac:spMkLst>
-        </pc:spChg>
-        <pc:spChg chg="add del mod">
-          <ac:chgData name="Sebastian Meine" userId="f54488a2a6b7dc9e" providerId="LiveId" clId="{BE1DB9F4-E304-4C37-970B-A53B13E8E1BC}" dt="2021-07-04T14:48:58.033" v="5" actId="478"/>
-          <ac:spMkLst>
-            <pc:docMk/>
-            <pc:sldMk cId="238189655" sldId="256"/>
-            <ac:spMk id="5" creationId="{D8F788BF-858C-49A4-ACB1-BF0BB9B551DE}"/>
-          </ac:spMkLst>
-        </pc:spChg>
-        <pc:spChg chg="add mod">
-          <ac:chgData name="Sebastian Meine" userId="f54488a2a6b7dc9e" providerId="LiveId" clId="{BE1DB9F4-E304-4C37-970B-A53B13E8E1BC}" dt="2021-07-04T14:48:51.469" v="1"/>
-          <ac:spMkLst>
-            <pc:docMk/>
-            <pc:sldMk cId="238189655" sldId="256"/>
-            <ac:spMk id="6" creationId="{16C5E0D0-4B8D-4ABD-AB1C-C34B838619DA}"/>
-          </ac:spMkLst>
-        </pc:spChg>
-      </pc:sldChg>
-      <pc:sldChg chg="addSp delSp modSp mod">
-        <pc:chgData name="Sebastian Meine" userId="f54488a2a6b7dc9e" providerId="LiveId" clId="{BE1DB9F4-E304-4C37-970B-A53B13E8E1BC}" dt="2021-07-04T14:49:01.825" v="6" actId="478"/>
-        <pc:sldMkLst>
-          <pc:docMk/>
-          <pc:sldMk cId="821808063" sldId="257"/>
-        </pc:sldMkLst>
-        <pc:spChg chg="add mod">
-          <ac:chgData name="Sebastian Meine" userId="f54488a2a6b7dc9e" providerId="LiveId" clId="{BE1DB9F4-E304-4C37-970B-A53B13E8E1BC}" dt="2021-07-04T14:48:53.513" v="2"/>
-          <ac:spMkLst>
-            <pc:docMk/>
-            <pc:sldMk cId="821808063" sldId="257"/>
-            <ac:spMk id="6" creationId="{18E16722-5125-474B-813B-7E7FCAD73050}"/>
-          </ac:spMkLst>
-        </pc:spChg>
-        <pc:spChg chg="add del mod">
-          <ac:chgData name="Sebastian Meine" userId="f54488a2a6b7dc9e" providerId="LiveId" clId="{BE1DB9F4-E304-4C37-970B-A53B13E8E1BC}" dt="2021-07-04T14:49:01.825" v="6" actId="478"/>
-          <ac:spMkLst>
-            <pc:docMk/>
-            <pc:sldMk cId="821808063" sldId="257"/>
-            <ac:spMk id="7" creationId="{A3CC68E1-34E3-46EA-8054-08C955DEDCF0}"/>
-          </ac:spMkLst>
-        </pc:spChg>
-        <pc:spChg chg="add mod">
-          <ac:chgData name="Sebastian Meine" userId="f54488a2a6b7dc9e" providerId="LiveId" clId="{BE1DB9F4-E304-4C37-970B-A53B13E8E1BC}" dt="2021-07-04T14:48:53.513" v="2"/>
-          <ac:spMkLst>
-            <pc:docMk/>
-            <pc:sldMk cId="821808063" sldId="257"/>
-            <ac:spMk id="8" creationId="{F93989BF-3261-4820-A19C-59C495FFE0B5}"/>
-          </ac:spMkLst>
-        </pc:spChg>
-      </pc:sldChg>
-      <pc:sldChg chg="addSp modSp mod">
-        <pc:chgData name="Sebastian Meine" userId="f54488a2a6b7dc9e" providerId="LiveId" clId="{BE1DB9F4-E304-4C37-970B-A53B13E8E1BC}" dt="2021-07-04T14:49:17.421" v="8" actId="122"/>
-        <pc:sldMkLst>
-          <pc:docMk/>
-          <pc:sldMk cId="2109793123" sldId="258"/>
-        </pc:sldMkLst>
-        <pc:spChg chg="add mod">
-          <ac:chgData name="Sebastian Meine" userId="f54488a2a6b7dc9e" providerId="LiveId" clId="{BE1DB9F4-E304-4C37-970B-A53B13E8E1BC}" dt="2021-07-04T14:48:54.185" v="3"/>
-          <ac:spMkLst>
-            <pc:docMk/>
-            <pc:sldMk cId="2109793123" sldId="258"/>
-            <ac:spMk id="7" creationId="{18705B3C-262D-45A3-8C90-9FC26244A8CC}"/>
-          </ac:spMkLst>
-        </pc:spChg>
-        <pc:spChg chg="add mod">
-          <ac:chgData name="Sebastian Meine" userId="f54488a2a6b7dc9e" providerId="LiveId" clId="{BE1DB9F4-E304-4C37-970B-A53B13E8E1BC}" dt="2021-07-04T14:49:17.421" v="8" actId="122"/>
-          <ac:spMkLst>
-            <pc:docMk/>
-            <pc:sldMk cId="2109793123" sldId="258"/>
-            <ac:spMk id="8" creationId="{6833897F-8945-43C1-8EE1-2E83FF8331D9}"/>
-          </ac:spMkLst>
-        </pc:spChg>
-        <pc:spChg chg="add mod">
-          <ac:chgData name="Sebastian Meine" userId="f54488a2a6b7dc9e" providerId="LiveId" clId="{BE1DB9F4-E304-4C37-970B-A53B13E8E1BC}" dt="2021-07-04T14:48:54.185" v="3"/>
-          <ac:spMkLst>
-            <pc:docMk/>
-            <pc:sldMk cId="2109793123" sldId="258"/>
-            <ac:spMk id="9" creationId="{4CB1546C-41E9-4CE9-A31D-18CB078FE5F0}"/>
-          </ac:spMkLst>
-        </pc:spChg>
-      </pc:sldChg>
-      <pc:sldChg chg="addSp modSp mod">
-        <pc:chgData name="Sebastian Meine" userId="f54488a2a6b7dc9e" providerId="LiveId" clId="{BE1DB9F4-E304-4C37-970B-A53B13E8E1BC}" dt="2021-07-04T14:49:22.515" v="9"/>
-        <pc:sldMkLst>
-          <pc:docMk/>
-          <pc:sldMk cId="583026924" sldId="259"/>
-        </pc:sldMkLst>
-        <pc:spChg chg="add mod">
-          <ac:chgData name="Sebastian Meine" userId="f54488a2a6b7dc9e" providerId="LiveId" clId="{BE1DB9F4-E304-4C37-970B-A53B13E8E1BC}" dt="2021-07-04T14:48:54.870" v="4"/>
-          <ac:spMkLst>
-            <pc:docMk/>
-            <pc:sldMk cId="583026924" sldId="259"/>
-            <ac:spMk id="7" creationId="{10FFBAAD-19F5-4D04-A8CB-A12454F58FFD}"/>
-          </ac:spMkLst>
-        </pc:spChg>
-        <pc:spChg chg="add mod">
-          <ac:chgData name="Sebastian Meine" userId="f54488a2a6b7dc9e" providerId="LiveId" clId="{BE1DB9F4-E304-4C37-970B-A53B13E8E1BC}" dt="2021-07-04T14:49:22.515" v="9"/>
-          <ac:spMkLst>
-            <pc:docMk/>
-            <pc:sldMk cId="583026924" sldId="259"/>
-            <ac:spMk id="8" creationId="{3B4D951D-CFCF-46C6-91EB-50913F6DFC4D}"/>
-          </ac:spMkLst>
-        </pc:spChg>
-        <pc:spChg chg="add mod">
-          <ac:chgData name="Sebastian Meine" userId="f54488a2a6b7dc9e" providerId="LiveId" clId="{BE1DB9F4-E304-4C37-970B-A53B13E8E1BC}" dt="2021-07-04T14:48:54.870" v="4"/>
-          <ac:spMkLst>
-            <pc:docMk/>
-            <pc:sldMk cId="583026924" sldId="259"/>
-            <ac:spMk id="9" creationId="{3690FB59-357D-44F2-A4A7-2F771FE7F7EF}"/>
-          </ac:spMkLst>
-        </pc:spChg>
-      </pc:sldChg>
-    </pc:docChg>
-  </pc:docChgLst>
-  <pc:docChgLst>
-    <pc:chgData name="Sebastian Meine" userId="f54488a2a6b7dc9e" providerId="LiveId" clId="{762C8129-56AC-41EC-ADD7-A8DEE5433772}"/>
-    <pc:docChg chg="undo redo custSel delSld modSld">
-      <pc:chgData name="Sebastian Meine" userId="f54488a2a6b7dc9e" providerId="LiveId" clId="{762C8129-56AC-41EC-ADD7-A8DEE5433772}" dt="2021-07-21T12:50:25.329" v="1955" actId="47"/>
-      <pc:docMkLst>
-        <pc:docMk/>
-      </pc:docMkLst>
-      <pc:sldChg chg="addSp delSp modSp mod delAnim modAnim">
-        <pc:chgData name="Sebastian Meine" userId="f54488a2a6b7dc9e" providerId="LiveId" clId="{762C8129-56AC-41EC-ADD7-A8DEE5433772}" dt="2021-07-21T12:35:41.887" v="1943" actId="478"/>
-        <pc:sldMkLst>
-          <pc:docMk/>
-          <pc:sldMk cId="2109793123" sldId="258"/>
-        </pc:sldMkLst>
-        <pc:spChg chg="mod">
-          <ac:chgData name="Sebastian Meine" userId="f54488a2a6b7dc9e" providerId="LiveId" clId="{762C8129-56AC-41EC-ADD7-A8DEE5433772}" dt="2021-07-21T10:06:02.075" v="15" actId="20577"/>
-          <ac:spMkLst>
-            <pc:docMk/>
-            <pc:sldMk cId="2109793123" sldId="258"/>
-            <ac:spMk id="5" creationId="{BDF2C912-E02F-4E1F-82DF-351A88BA5B31}"/>
-          </ac:spMkLst>
-        </pc:spChg>
-        <pc:spChg chg="mod">
-          <ac:chgData name="Sebastian Meine" userId="f54488a2a6b7dc9e" providerId="LiveId" clId="{762C8129-56AC-41EC-ADD7-A8DEE5433772}" dt="2021-07-21T12:14:40.255" v="1659" actId="20577"/>
-          <ac:spMkLst>
-            <pc:docMk/>
-            <pc:sldMk cId="2109793123" sldId="258"/>
-            <ac:spMk id="6" creationId="{67FD4DD5-46C1-4974-A569-BB95F27DCC4F}"/>
-          </ac:spMkLst>
-        </pc:spChg>
-        <pc:spChg chg="add del mod">
-          <ac:chgData name="Sebastian Meine" userId="f54488a2a6b7dc9e" providerId="LiveId" clId="{762C8129-56AC-41EC-ADD7-A8DEE5433772}" dt="2021-07-21T12:35:41.887" v="1943" actId="478"/>
-          <ac:spMkLst>
-            <pc:docMk/>
-            <pc:sldMk cId="2109793123" sldId="258"/>
-            <ac:spMk id="10" creationId="{94056F41-58DB-4319-B2B0-5E6A1EBD7407}"/>
-          </ac:spMkLst>
-        </pc:spChg>
-      </pc:sldChg>
-      <pc:sldChg chg="modSp">
-        <pc:chgData name="Sebastian Meine" userId="f54488a2a6b7dc9e" providerId="LiveId" clId="{762C8129-56AC-41EC-ADD7-A8DEE5433772}" dt="2021-07-21T08:50:15.407" v="8" actId="20577"/>
-        <pc:sldMkLst>
-          <pc:docMk/>
-          <pc:sldMk cId="3097966872" sldId="261"/>
-        </pc:sldMkLst>
-        <pc:spChg chg="mod">
-          <ac:chgData name="Sebastian Meine" userId="f54488a2a6b7dc9e" providerId="LiveId" clId="{762C8129-56AC-41EC-ADD7-A8DEE5433772}" dt="2021-07-21T08:50:15.407" v="8" actId="20577"/>
-          <ac:spMkLst>
-            <pc:docMk/>
-            <pc:sldMk cId="3097966872" sldId="261"/>
-            <ac:spMk id="2" creationId="{87B2046A-71C6-4A5C-90F4-24A921FBE6F2}"/>
-          </ac:spMkLst>
-        </pc:spChg>
-      </pc:sldChg>
-      <pc:sldChg chg="addSp delSp modSp mod addAnim delAnim modAnim">
-        <pc:chgData name="Sebastian Meine" userId="f54488a2a6b7dc9e" providerId="LiveId" clId="{762C8129-56AC-41EC-ADD7-A8DEE5433772}" dt="2021-07-21T11:47:02.551" v="1576"/>
-        <pc:sldMkLst>
-          <pc:docMk/>
-          <pc:sldMk cId="362378951" sldId="263"/>
-        </pc:sldMkLst>
-        <pc:spChg chg="add mod topLvl">
-          <ac:chgData name="Sebastian Meine" userId="f54488a2a6b7dc9e" providerId="LiveId" clId="{762C8129-56AC-41EC-ADD7-A8DEE5433772}" dt="2021-07-21T11:32:30.687" v="1432" actId="20577"/>
-          <ac:spMkLst>
-            <pc:docMk/>
-            <pc:sldMk cId="362378951" sldId="263"/>
-            <ac:spMk id="2" creationId="{972B3F78-D113-4547-A50D-DA495A29AB68}"/>
-          </ac:spMkLst>
-        </pc:spChg>
-        <pc:spChg chg="mod">
-          <ac:chgData name="Sebastian Meine" userId="f54488a2a6b7dc9e" providerId="LiveId" clId="{762C8129-56AC-41EC-ADD7-A8DEE5433772}" dt="2021-07-21T10:41:08.472" v="163"/>
-          <ac:spMkLst>
-            <pc:docMk/>
-            <pc:sldMk cId="362378951" sldId="263"/>
-            <ac:spMk id="5" creationId="{BDF2C912-E02F-4E1F-82DF-351A88BA5B31}"/>
-          </ac:spMkLst>
-        </pc:spChg>
-        <pc:spChg chg="mod ord">
-          <ac:chgData name="Sebastian Meine" userId="f54488a2a6b7dc9e" providerId="LiveId" clId="{762C8129-56AC-41EC-ADD7-A8DEE5433772}" dt="2021-07-21T11:21:30.368" v="1364" actId="167"/>
-          <ac:spMkLst>
-            <pc:docMk/>
-            <pc:sldMk cId="362378951" sldId="263"/>
-            <ac:spMk id="6" creationId="{67FD4DD5-46C1-4974-A569-BB95F27DCC4F}"/>
-          </ac:spMkLst>
-        </pc:spChg>
-        <pc:spChg chg="mod">
-          <ac:chgData name="Sebastian Meine" userId="f54488a2a6b7dc9e" providerId="LiveId" clId="{762C8129-56AC-41EC-ADD7-A8DEE5433772}" dt="2021-07-21T11:35:30.617" v="1469" actId="1076"/>
-          <ac:spMkLst>
-            <pc:docMk/>
-            <pc:sldMk cId="362378951" sldId="263"/>
-            <ac:spMk id="9" creationId="{4CB1546C-41E9-4CE9-A31D-18CB078FE5F0}"/>
-          </ac:spMkLst>
-        </pc:spChg>
-        <pc:spChg chg="add mod ord topLvl">
-          <ac:chgData name="Sebastian Meine" userId="f54488a2a6b7dc9e" providerId="LiveId" clId="{762C8129-56AC-41EC-ADD7-A8DEE5433772}" dt="2021-07-21T11:36:59.763" v="1474" actId="14100"/>
-          <ac:spMkLst>
-            <pc:docMk/>
-            <pc:sldMk cId="362378951" sldId="263"/>
-            <ac:spMk id="10" creationId="{03AE95DF-D228-4672-978C-1FFC5CEDC9A5}"/>
-          </ac:spMkLst>
-        </pc:spChg>
-        <pc:spChg chg="add mod ord topLvl">
-          <ac:chgData name="Sebastian Meine" userId="f54488a2a6b7dc9e" providerId="LiveId" clId="{762C8129-56AC-41EC-ADD7-A8DEE5433772}" dt="2021-07-21T11:36:51.739" v="1473" actId="14100"/>
-          <ac:spMkLst>
-            <pc:docMk/>
-            <pc:sldMk cId="362378951" sldId="263"/>
-            <ac:spMk id="11" creationId="{C28B403F-3451-484A-80FC-1EB5977D2530}"/>
-          </ac:spMkLst>
-        </pc:spChg>
-        <pc:spChg chg="add mod ord topLvl">
-          <ac:chgData name="Sebastian Meine" userId="f54488a2a6b7dc9e" providerId="LiveId" clId="{762C8129-56AC-41EC-ADD7-A8DEE5433772}" dt="2021-07-21T11:34:07.556" v="1461" actId="20577"/>
-          <ac:spMkLst>
-            <pc:docMk/>
-            <pc:sldMk cId="362378951" sldId="263"/>
-            <ac:spMk id="12" creationId="{7C3189DC-042F-4794-9BC2-797D08FF8DFE}"/>
-          </ac:spMkLst>
-        </pc:spChg>
-        <pc:spChg chg="add mod topLvl">
-          <ac:chgData name="Sebastian Meine" userId="f54488a2a6b7dc9e" providerId="LiveId" clId="{762C8129-56AC-41EC-ADD7-A8DEE5433772}" dt="2021-07-21T11:22:05.052" v="1368" actId="14100"/>
-          <ac:spMkLst>
-            <pc:docMk/>
-            <pc:sldMk cId="362378951" sldId="263"/>
-            <ac:spMk id="13" creationId="{4B4A749B-73C6-4A7F-BCE7-F97651B563B2}"/>
-          </ac:spMkLst>
-        </pc:spChg>
-        <pc:spChg chg="add mod topLvl">
-          <ac:chgData name="Sebastian Meine" userId="f54488a2a6b7dc9e" providerId="LiveId" clId="{762C8129-56AC-41EC-ADD7-A8DEE5433772}" dt="2021-07-21T11:42:19.087" v="1548" actId="1076"/>
-          <ac:spMkLst>
-            <pc:docMk/>
-            <pc:sldMk cId="362378951" sldId="263"/>
-            <ac:spMk id="14" creationId="{6E7AB4E2-E257-4BF5-BBA2-234F02910BD3}"/>
-          </ac:spMkLst>
-        </pc:spChg>
-        <pc:spChg chg="add mod topLvl">
-          <ac:chgData name="Sebastian Meine" userId="f54488a2a6b7dc9e" providerId="LiveId" clId="{762C8129-56AC-41EC-ADD7-A8DEE5433772}" dt="2021-07-21T11:43:54.729" v="1559" actId="1076"/>
-          <ac:spMkLst>
-            <pc:docMk/>
-            <pc:sldMk cId="362378951" sldId="263"/>
-            <ac:spMk id="15" creationId="{C1625AF7-F147-4389-93F1-490D89FF0FF8}"/>
-          </ac:spMkLst>
-        </pc:spChg>
-        <pc:spChg chg="add mod topLvl">
-          <ac:chgData name="Sebastian Meine" userId="f54488a2a6b7dc9e" providerId="LiveId" clId="{762C8129-56AC-41EC-ADD7-A8DEE5433772}" dt="2021-07-21T11:41:36.101" v="1542" actId="1076"/>
-          <ac:spMkLst>
-            <pc:docMk/>
-            <pc:sldMk cId="362378951" sldId="263"/>
-            <ac:spMk id="16" creationId="{C02D97ED-276C-4037-A4C6-62BC25219E64}"/>
-          </ac:spMkLst>
-        </pc:spChg>
-        <pc:spChg chg="add mod topLvl">
-          <ac:chgData name="Sebastian Meine" userId="f54488a2a6b7dc9e" providerId="LiveId" clId="{762C8129-56AC-41EC-ADD7-A8DEE5433772}" dt="2021-07-21T11:41:46.587" v="1544" actId="1076"/>
-          <ac:spMkLst>
-            <pc:docMk/>
-            <pc:sldMk cId="362378951" sldId="263"/>
-            <ac:spMk id="17" creationId="{22F7E587-EA14-4A8A-B0D4-F8ACCB0753E6}"/>
-          </ac:spMkLst>
-        </pc:spChg>
-        <pc:spChg chg="add mod topLvl">
-          <ac:chgData name="Sebastian Meine" userId="f54488a2a6b7dc9e" providerId="LiveId" clId="{762C8129-56AC-41EC-ADD7-A8DEE5433772}" dt="2021-07-21T11:42:08.650" v="1547" actId="1076"/>
-          <ac:spMkLst>
-            <pc:docMk/>
-            <pc:sldMk cId="362378951" sldId="263"/>
-            <ac:spMk id="18" creationId="{0FD847A6-D71C-4FF9-B033-84EFB64C863D}"/>
-          </ac:spMkLst>
-        </pc:spChg>
-        <pc:spChg chg="add mod topLvl">
-          <ac:chgData name="Sebastian Meine" userId="f54488a2a6b7dc9e" providerId="LiveId" clId="{762C8129-56AC-41EC-ADD7-A8DEE5433772}" dt="2021-07-21T11:41:36.101" v="1542" actId="1076"/>
-          <ac:spMkLst>
-            <pc:docMk/>
-            <pc:sldMk cId="362378951" sldId="263"/>
-            <ac:spMk id="19" creationId="{D2748CB7-70B6-4631-B8D7-D679978202FA}"/>
-          </ac:spMkLst>
-        </pc:spChg>
-        <pc:spChg chg="add mod topLvl">
-          <ac:chgData name="Sebastian Meine" userId="f54488a2a6b7dc9e" providerId="LiveId" clId="{762C8129-56AC-41EC-ADD7-A8DEE5433772}" dt="2021-07-21T11:41:46.587" v="1544" actId="1076"/>
-          <ac:spMkLst>
-            <pc:docMk/>
-            <pc:sldMk cId="362378951" sldId="263"/>
-            <ac:spMk id="20" creationId="{E765D55A-AE9A-4B17-8080-2C7734357AFD}"/>
-          </ac:spMkLst>
-        </pc:spChg>
-        <pc:spChg chg="add mod topLvl">
-          <ac:chgData name="Sebastian Meine" userId="f54488a2a6b7dc9e" providerId="LiveId" clId="{762C8129-56AC-41EC-ADD7-A8DEE5433772}" dt="2021-07-21T11:42:00.653" v="1546" actId="1076"/>
-          <ac:spMkLst>
-            <pc:docMk/>
-            <pc:sldMk cId="362378951" sldId="263"/>
-            <ac:spMk id="21" creationId="{BAD82757-60C4-4AC2-A91A-FE7E6E75396E}"/>
-          </ac:spMkLst>
-        </pc:spChg>
-        <pc:spChg chg="add mod topLvl">
-          <ac:chgData name="Sebastian Meine" userId="f54488a2a6b7dc9e" providerId="LiveId" clId="{762C8129-56AC-41EC-ADD7-A8DEE5433772}" dt="2021-07-21T11:41:27.372" v="1541" actId="1076"/>
-          <ac:spMkLst>
-            <pc:docMk/>
-            <pc:sldMk cId="362378951" sldId="263"/>
-            <ac:spMk id="22" creationId="{636C562F-4FA9-44B2-9E93-867CAF8E3554}"/>
-          </ac:spMkLst>
-        </pc:spChg>
-        <pc:spChg chg="add mod topLvl">
-          <ac:chgData name="Sebastian Meine" userId="f54488a2a6b7dc9e" providerId="LiveId" clId="{762C8129-56AC-41EC-ADD7-A8DEE5433772}" dt="2021-07-21T11:41:41.099" v="1543" actId="1076"/>
-          <ac:spMkLst>
-            <pc:docMk/>
-            <pc:sldMk cId="362378951" sldId="263"/>
-            <ac:spMk id="23" creationId="{D01852CB-B47F-4D6F-B9CE-D5399277C9C6}"/>
-          </ac:spMkLst>
-        </pc:spChg>
-        <pc:spChg chg="add mod topLvl">
-          <ac:chgData name="Sebastian Meine" userId="f54488a2a6b7dc9e" providerId="LiveId" clId="{762C8129-56AC-41EC-ADD7-A8DEE5433772}" dt="2021-07-21T11:42:00.653" v="1546" actId="1076"/>
-          <ac:spMkLst>
-            <pc:docMk/>
-            <pc:sldMk cId="362378951" sldId="263"/>
-            <ac:spMk id="24" creationId="{DE1326DD-5D51-4EF4-B701-21E504D23AB6}"/>
-          </ac:spMkLst>
-        </pc:spChg>
-        <pc:spChg chg="add mod topLvl">
-          <ac:chgData name="Sebastian Meine" userId="f54488a2a6b7dc9e" providerId="LiveId" clId="{762C8129-56AC-41EC-ADD7-A8DEE5433772}" dt="2021-07-21T11:41:27.372" v="1541" actId="1076"/>
-          <ac:spMkLst>
-            <pc:docMk/>
-            <pc:sldMk cId="362378951" sldId="263"/>
-            <ac:spMk id="25" creationId="{5C8A6270-3BFF-4726-8013-23AAFA66FB4C}"/>
-          </ac:spMkLst>
-        </pc:spChg>
-        <pc:spChg chg="add mod topLvl">
-          <ac:chgData name="Sebastian Meine" userId="f54488a2a6b7dc9e" providerId="LiveId" clId="{762C8129-56AC-41EC-ADD7-A8DEE5433772}" dt="2021-07-21T11:41:41.099" v="1543" actId="1076"/>
-          <ac:spMkLst>
-            <pc:docMk/>
-            <pc:sldMk cId="362378951" sldId="263"/>
-            <ac:spMk id="26" creationId="{FB2A26EF-B1FF-480C-B90B-6FD14DF4A762}"/>
-          </ac:spMkLst>
-        </pc:spChg>
-        <pc:spChg chg="add mod topLvl">
-          <ac:chgData name="Sebastian Meine" userId="f54488a2a6b7dc9e" providerId="LiveId" clId="{762C8129-56AC-41EC-ADD7-A8DEE5433772}" dt="2021-07-21T11:41:55.596" v="1545" actId="1076"/>
-          <ac:spMkLst>
-            <pc:docMk/>
-            <pc:sldMk cId="362378951" sldId="263"/>
-            <ac:spMk id="27" creationId="{F6A35869-32AF-4309-98F0-4331D6006EEF}"/>
-          </ac:spMkLst>
-        </pc:spChg>
-        <pc:spChg chg="add mod topLvl">
-          <ac:chgData name="Sebastian Meine" userId="f54488a2a6b7dc9e" providerId="LiveId" clId="{762C8129-56AC-41EC-ADD7-A8DEE5433772}" dt="2021-07-21T11:41:21.306" v="1540" actId="1076"/>
-          <ac:spMkLst>
-            <pc:docMk/>
-            <pc:sldMk cId="362378951" sldId="263"/>
-            <ac:spMk id="28" creationId="{0742766D-510A-43EA-8D4A-5B2291F4EBEC}"/>
-          </ac:spMkLst>
-        </pc:spChg>
-        <pc:spChg chg="add mod topLvl">
-          <ac:chgData name="Sebastian Meine" userId="f54488a2a6b7dc9e" providerId="LiveId" clId="{762C8129-56AC-41EC-ADD7-A8DEE5433772}" dt="2021-07-21T11:41:41.099" v="1543" actId="1076"/>
-          <ac:spMkLst>
-            <pc:docMk/>
-            <pc:sldMk cId="362378951" sldId="263"/>
-            <ac:spMk id="29" creationId="{8C532347-BD26-4199-BA1C-D040162B14D3}"/>
-          </ac:spMkLst>
-        </pc:spChg>
-        <pc:spChg chg="add mod topLvl">
-          <ac:chgData name="Sebastian Meine" userId="f54488a2a6b7dc9e" providerId="LiveId" clId="{762C8129-56AC-41EC-ADD7-A8DEE5433772}" dt="2021-07-21T11:41:55.596" v="1545" actId="1076"/>
-          <ac:spMkLst>
-            <pc:docMk/>
-            <pc:sldMk cId="362378951" sldId="263"/>
-            <ac:spMk id="30" creationId="{2E91BC08-61A1-440A-B267-6B0297178F95}"/>
-          </ac:spMkLst>
-        </pc:spChg>
-        <pc:spChg chg="add mod topLvl">
-          <ac:chgData name="Sebastian Meine" userId="f54488a2a6b7dc9e" providerId="LiveId" clId="{762C8129-56AC-41EC-ADD7-A8DEE5433772}" dt="2021-07-21T11:41:21.306" v="1540" actId="1076"/>
-          <ac:spMkLst>
-            <pc:docMk/>
-            <pc:sldMk cId="362378951" sldId="263"/>
-            <ac:spMk id="31" creationId="{3B7C6BF5-5FE5-4289-8083-A86866D97CEF}"/>
-          </ac:spMkLst>
-        </pc:spChg>
-        <pc:spChg chg="add mod topLvl">
-          <ac:chgData name="Sebastian Meine" userId="f54488a2a6b7dc9e" providerId="LiveId" clId="{762C8129-56AC-41EC-ADD7-A8DEE5433772}" dt="2021-07-21T11:41:02.962" v="1535" actId="1076"/>
-          <ac:spMkLst>
-            <pc:docMk/>
-            <pc:sldMk cId="362378951" sldId="263"/>
-            <ac:spMk id="32" creationId="{EF30DFCD-0DA1-4DB2-8304-82FDB639F5B6}"/>
-          </ac:spMkLst>
-        </pc:spChg>
-        <pc:spChg chg="add mod topLvl">
-          <ac:chgData name="Sebastian Meine" userId="f54488a2a6b7dc9e" providerId="LiveId" clId="{762C8129-56AC-41EC-ADD7-A8DEE5433772}" dt="2021-07-21T11:21:47.861" v="1365" actId="1076"/>
-          <ac:spMkLst>
-            <pc:docMk/>
-            <pc:sldMk cId="362378951" sldId="263"/>
-            <ac:spMk id="33" creationId="{401C70BE-B278-47CA-A82D-700F9E169DFA}"/>
-          </ac:spMkLst>
-        </pc:spChg>
-        <pc:spChg chg="add mod topLvl">
-          <ac:chgData name="Sebastian Meine" userId="f54488a2a6b7dc9e" providerId="LiveId" clId="{762C8129-56AC-41EC-ADD7-A8DEE5433772}" dt="2021-07-21T11:41:09.476" v="1537" actId="1076"/>
-          <ac:spMkLst>
-            <pc:docMk/>
-            <pc:sldMk cId="362378951" sldId="263"/>
-            <ac:spMk id="34" creationId="{05B1A237-A1A9-4A9F-A279-465474E76F71}"/>
-          </ac:spMkLst>
-        </pc:spChg>
-        <pc:spChg chg="add mod topLvl">
-          <ac:chgData name="Sebastian Meine" userId="f54488a2a6b7dc9e" providerId="LiveId" clId="{762C8129-56AC-41EC-ADD7-A8DEE5433772}" dt="2021-07-21T11:40:58.840" v="1534" actId="1076"/>
-          <ac:spMkLst>
-            <pc:docMk/>
-            <pc:sldMk cId="362378951" sldId="263"/>
-            <ac:spMk id="35" creationId="{740712E7-2808-44D4-95D1-E2089CF3F982}"/>
-          </ac:spMkLst>
-        </pc:spChg>
-        <pc:spChg chg="add mod topLvl">
-          <ac:chgData name="Sebastian Meine" userId="f54488a2a6b7dc9e" providerId="LiveId" clId="{762C8129-56AC-41EC-ADD7-A8DEE5433772}" dt="2021-07-21T11:40:10.401" v="1527" actId="1076"/>
-          <ac:spMkLst>
-            <pc:docMk/>
-            <pc:sldMk cId="362378951" sldId="263"/>
-            <ac:spMk id="36" creationId="{AA74FA46-7716-430E-907F-4E41CA8F613E}"/>
-          </ac:spMkLst>
-        </pc:spChg>
-        <pc:spChg chg="add mod topLvl">
-          <ac:chgData name="Sebastian Meine" userId="f54488a2a6b7dc9e" providerId="LiveId" clId="{762C8129-56AC-41EC-ADD7-A8DEE5433772}" dt="2021-07-21T11:41:05.142" v="1536" actId="1076"/>
-          <ac:spMkLst>
-            <pc:docMk/>
-            <pc:sldMk cId="362378951" sldId="263"/>
-            <ac:spMk id="37" creationId="{97055284-4E0C-4420-81E7-911298325F8D}"/>
-          </ac:spMkLst>
-        </pc:spChg>
-        <pc:spChg chg="add mod topLvl">
-          <ac:chgData name="Sebastian Meine" userId="f54488a2a6b7dc9e" providerId="LiveId" clId="{762C8129-56AC-41EC-ADD7-A8DEE5433772}" dt="2021-07-21T11:40:05.914" v="1525" actId="1076"/>
-          <ac:spMkLst>
-            <pc:docMk/>
-            <pc:sldMk cId="362378951" sldId="263"/>
-            <ac:spMk id="38" creationId="{6C25D959-E36E-4425-BF0D-589CDF7CCEB9}"/>
-          </ac:spMkLst>
-        </pc:spChg>
-        <pc:spChg chg="add mod topLvl">
-          <ac:chgData name="Sebastian Meine" userId="f54488a2a6b7dc9e" providerId="LiveId" clId="{762C8129-56AC-41EC-ADD7-A8DEE5433772}" dt="2021-07-21T11:40:07.527" v="1526" actId="1076"/>
-          <ac:spMkLst>
-            <pc:docMk/>
-            <pc:sldMk cId="362378951" sldId="263"/>
-            <ac:spMk id="39" creationId="{4033A8F9-B753-4118-8A25-5103CA6A8F35}"/>
-          </ac:spMkLst>
-        </pc:spChg>
-        <pc:spChg chg="add mod topLvl">
-          <ac:chgData name="Sebastian Meine" userId="f54488a2a6b7dc9e" providerId="LiveId" clId="{762C8129-56AC-41EC-ADD7-A8DEE5433772}" dt="2021-07-21T11:40:03.346" v="1524" actId="1076"/>
-          <ac:spMkLst>
-            <pc:docMk/>
-            <pc:sldMk cId="362378951" sldId="263"/>
-            <ac:spMk id="40" creationId="{2F60C297-08E2-4CB9-B754-E7E8C217F88E}"/>
-          </ac:spMkLst>
-        </pc:spChg>
-        <pc:spChg chg="add mod topLvl">
-          <ac:chgData name="Sebastian Meine" userId="f54488a2a6b7dc9e" providerId="LiveId" clId="{762C8129-56AC-41EC-ADD7-A8DEE5433772}" dt="2021-07-21T11:39:52.840" v="1522" actId="1076"/>
-          <ac:spMkLst>
-            <pc:docMk/>
-            <pc:sldMk cId="362378951" sldId="263"/>
-            <ac:spMk id="41" creationId="{2366BB95-A9E9-429E-8F35-E3DF06E4D9B3}"/>
-          </ac:spMkLst>
-        </pc:spChg>
-        <pc:spChg chg="add mod topLvl">
-          <ac:chgData name="Sebastian Meine" userId="f54488a2a6b7dc9e" providerId="LiveId" clId="{762C8129-56AC-41EC-ADD7-A8DEE5433772}" dt="2021-07-21T11:39:31.244" v="1517" actId="1076"/>
-          <ac:spMkLst>
-            <pc:docMk/>
-            <pc:sldMk cId="362378951" sldId="263"/>
-            <ac:spMk id="42" creationId="{AA7B3EDB-2A75-47B7-9985-806E8370EB25}"/>
-          </ac:spMkLst>
-        </pc:spChg>
-        <pc:spChg chg="add mod topLvl">
-          <ac:chgData name="Sebastian Meine" userId="f54488a2a6b7dc9e" providerId="LiveId" clId="{762C8129-56AC-41EC-ADD7-A8DEE5433772}" dt="2021-07-21T11:39:59.444" v="1523" actId="1076"/>
-          <ac:spMkLst>
-            <pc:docMk/>
-            <pc:sldMk cId="362378951" sldId="263"/>
-            <ac:spMk id="43" creationId="{79227F05-4966-4075-A8FA-61E8C137D6B7}"/>
-          </ac:spMkLst>
-        </pc:spChg>
-        <pc:spChg chg="add mod topLvl">
-          <ac:chgData name="Sebastian Meine" userId="f54488a2a6b7dc9e" providerId="LiveId" clId="{762C8129-56AC-41EC-ADD7-A8DEE5433772}" dt="2021-07-21T11:39:50.334" v="1521" actId="1076"/>
-          <ac:spMkLst>
-            <pc:docMk/>
-            <pc:sldMk cId="362378951" sldId="263"/>
-            <ac:spMk id="44" creationId="{3637F160-3DB8-4405-B45E-C2A8114808ED}"/>
-          </ac:spMkLst>
-        </pc:spChg>
-        <pc:spChg chg="add mod topLvl">
-          <ac:chgData name="Sebastian Meine" userId="f54488a2a6b7dc9e" providerId="LiveId" clId="{762C8129-56AC-41EC-ADD7-A8DEE5433772}" dt="2021-07-21T11:39:29.112" v="1516" actId="1076"/>
-          <ac:spMkLst>
-            <pc:docMk/>
-            <pc:sldMk cId="362378951" sldId="263"/>
-            <ac:spMk id="45" creationId="{B734E4A0-20C0-4E61-BFD0-B1B9DBF34AA9}"/>
-          </ac:spMkLst>
-        </pc:spChg>
-        <pc:spChg chg="add mod topLvl">
-          <ac:chgData name="Sebastian Meine" userId="f54488a2a6b7dc9e" providerId="LiveId" clId="{762C8129-56AC-41EC-ADD7-A8DEE5433772}" dt="2021-07-21T11:39:45.478" v="1520" actId="1076"/>
-          <ac:spMkLst>
-            <pc:docMk/>
-            <pc:sldMk cId="362378951" sldId="263"/>
-            <ac:spMk id="46" creationId="{205798F4-3165-41D9-A72D-BDBB72704EFF}"/>
-          </ac:spMkLst>
-        </pc:spChg>
-        <pc:spChg chg="add mod topLvl">
-          <ac:chgData name="Sebastian Meine" userId="f54488a2a6b7dc9e" providerId="LiveId" clId="{762C8129-56AC-41EC-ADD7-A8DEE5433772}" dt="2021-07-21T11:39:40.234" v="1519" actId="1076"/>
-          <ac:spMkLst>
-            <pc:docMk/>
-            <pc:sldMk cId="362378951" sldId="263"/>
-            <ac:spMk id="47" creationId="{659A3EDB-3F56-42C8-AB31-7181FAC9DC96}"/>
-          </ac:spMkLst>
-        </pc:spChg>
-        <pc:spChg chg="add mod topLvl">
-          <ac:chgData name="Sebastian Meine" userId="f54488a2a6b7dc9e" providerId="LiveId" clId="{762C8129-56AC-41EC-ADD7-A8DEE5433772}" dt="2021-07-21T11:21:47.861" v="1365" actId="1076"/>
-          <ac:spMkLst>
-            <pc:docMk/>
-            <pc:sldMk cId="362378951" sldId="263"/>
-            <ac:spMk id="48" creationId="{14950BCD-FC21-408B-AF20-5CBAD2C6BC19}"/>
-          </ac:spMkLst>
-        </pc:spChg>
-        <pc:spChg chg="add mod topLvl">
-          <ac:chgData name="Sebastian Meine" userId="f54488a2a6b7dc9e" providerId="LiveId" clId="{762C8129-56AC-41EC-ADD7-A8DEE5433772}" dt="2021-07-21T11:26:41.053" v="1389" actId="1076"/>
-          <ac:spMkLst>
-            <pc:docMk/>
-            <pc:sldMk cId="362378951" sldId="263"/>
-            <ac:spMk id="49" creationId="{99AE8D3D-1A10-40A6-A0D6-8A0BC8594168}"/>
-          </ac:spMkLst>
-        </pc:spChg>
-        <pc:spChg chg="add mod topLvl">
-          <ac:chgData name="Sebastian Meine" userId="f54488a2a6b7dc9e" providerId="LiveId" clId="{762C8129-56AC-41EC-ADD7-A8DEE5433772}" dt="2021-07-21T11:39:37.459" v="1518" actId="1076"/>
-          <ac:spMkLst>
-            <pc:docMk/>
-            <pc:sldMk cId="362378951" sldId="263"/>
-            <ac:spMk id="50" creationId="{0D6421C3-ECD4-4814-8433-AE9EC376DE8A}"/>
-          </ac:spMkLst>
-        </pc:spChg>
-        <pc:spChg chg="add mod topLvl">
-          <ac:chgData name="Sebastian Meine" userId="f54488a2a6b7dc9e" providerId="LiveId" clId="{762C8129-56AC-41EC-ADD7-A8DEE5433772}" dt="2021-07-21T11:21:47.861" v="1365" actId="1076"/>
-          <ac:spMkLst>
-            <pc:docMk/>
-            <pc:sldMk cId="362378951" sldId="263"/>
-            <ac:spMk id="51" creationId="{E6C0A146-03EA-459F-8F49-1126DAF66C6B}"/>
-          </ac:spMkLst>
-        </pc:spChg>
-        <pc:spChg chg="add del mod topLvl">
-          <ac:chgData name="Sebastian Meine" userId="f54488a2a6b7dc9e" providerId="LiveId" clId="{762C8129-56AC-41EC-ADD7-A8DEE5433772}" dt="2021-07-21T11:38:59.434" v="1512" actId="1076"/>
-          <ac:spMkLst>
-            <pc:docMk/>
-            <pc:sldMk cId="362378951" sldId="263"/>
-            <ac:spMk id="52" creationId="{2A2D80E6-E129-44B2-904E-CE22265E4158}"/>
-          </ac:spMkLst>
-        </pc:spChg>
-        <pc:spChg chg="add mod topLvl">
-          <ac:chgData name="Sebastian Meine" userId="f54488a2a6b7dc9e" providerId="LiveId" clId="{762C8129-56AC-41EC-ADD7-A8DEE5433772}" dt="2021-07-21T11:21:47.861" v="1365" actId="1076"/>
-          <ac:spMkLst>
-            <pc:docMk/>
-            <pc:sldMk cId="362378951" sldId="263"/>
-            <ac:spMk id="53" creationId="{7F6541AD-E739-4F90-BC30-071417425938}"/>
-          </ac:spMkLst>
-        </pc:spChg>
-        <pc:spChg chg="add mod topLvl">
-          <ac:chgData name="Sebastian Meine" userId="f54488a2a6b7dc9e" providerId="LiveId" clId="{762C8129-56AC-41EC-ADD7-A8DEE5433772}" dt="2021-07-21T11:24:59.028" v="1383" actId="1076"/>
-          <ac:spMkLst>
-            <pc:docMk/>
-            <pc:sldMk cId="362378951" sldId="263"/>
-            <ac:spMk id="54" creationId="{452031FF-D159-4E81-8E4A-9361D3B9723F}"/>
-          </ac:spMkLst>
-        </pc:spChg>
-        <pc:spChg chg="add mod topLvl">
-          <ac:chgData name="Sebastian Meine" userId="f54488a2a6b7dc9e" providerId="LiveId" clId="{762C8129-56AC-41EC-ADD7-A8DEE5433772}" dt="2021-07-21T11:24:59.028" v="1383" actId="1076"/>
-          <ac:spMkLst>
-            <pc:docMk/>
-            <pc:sldMk cId="362378951" sldId="263"/>
-            <ac:spMk id="55" creationId="{33BEDFAC-B41C-4322-8E30-7A7D29BBB230}"/>
-          </ac:spMkLst>
-        </pc:spChg>
-        <pc:spChg chg="add mod topLvl">
-          <ac:chgData name="Sebastian Meine" userId="f54488a2a6b7dc9e" providerId="LiveId" clId="{762C8129-56AC-41EC-ADD7-A8DEE5433772}" dt="2021-07-21T11:24:59.028" v="1383" actId="1076"/>
-          <ac:spMkLst>
-            <pc:docMk/>
-            <pc:sldMk cId="362378951" sldId="263"/>
-            <ac:spMk id="56" creationId="{69CCB8A5-FD7A-44EC-A796-C3D53B96FCFC}"/>
-          </ac:spMkLst>
-        </pc:spChg>
-        <pc:spChg chg="add mod topLvl">
-          <ac:chgData name="Sebastian Meine" userId="f54488a2a6b7dc9e" providerId="LiveId" clId="{762C8129-56AC-41EC-ADD7-A8DEE5433772}" dt="2021-07-21T11:24:59.028" v="1383" actId="1076"/>
-          <ac:spMkLst>
-            <pc:docMk/>
-            <pc:sldMk cId="362378951" sldId="263"/>
-            <ac:spMk id="57" creationId="{60ADF56E-68A6-434E-A524-54539AA4CCB0}"/>
-          </ac:spMkLst>
-        </pc:spChg>
-        <pc:spChg chg="add mod topLvl">
-          <ac:chgData name="Sebastian Meine" userId="f54488a2a6b7dc9e" providerId="LiveId" clId="{762C8129-56AC-41EC-ADD7-A8DEE5433772}" dt="2021-07-21T11:24:59.028" v="1383" actId="1076"/>
-          <ac:spMkLst>
-            <pc:docMk/>
-            <pc:sldMk cId="362378951" sldId="263"/>
-            <ac:spMk id="58" creationId="{17D175CD-CABE-46AE-BBF8-D1BF373C7868}"/>
-          </ac:spMkLst>
-        </pc:spChg>
-        <pc:spChg chg="add mod topLvl">
-          <ac:chgData name="Sebastian Meine" userId="f54488a2a6b7dc9e" providerId="LiveId" clId="{762C8129-56AC-41EC-ADD7-A8DEE5433772}" dt="2021-07-21T11:24:59.028" v="1383" actId="1076"/>
-          <ac:spMkLst>
-            <pc:docMk/>
-            <pc:sldMk cId="362378951" sldId="263"/>
-            <ac:spMk id="59" creationId="{163B1371-3F8E-46B6-BCF1-19E4301C26BF}"/>
-          </ac:spMkLst>
-        </pc:spChg>
-        <pc:spChg chg="add mod topLvl">
-          <ac:chgData name="Sebastian Meine" userId="f54488a2a6b7dc9e" providerId="LiveId" clId="{762C8129-56AC-41EC-ADD7-A8DEE5433772}" dt="2021-07-21T11:25:17.710" v="1385" actId="1076"/>
-          <ac:spMkLst>
-            <pc:docMk/>
-            <pc:sldMk cId="362378951" sldId="263"/>
-            <ac:spMk id="134" creationId="{3F94E448-A9CC-475F-8FE1-0ED55C9AF953}"/>
-          </ac:spMkLst>
-        </pc:spChg>
-        <pc:spChg chg="add mod">
-          <ac:chgData name="Sebastian Meine" userId="f54488a2a6b7dc9e" providerId="LiveId" clId="{762C8129-56AC-41EC-ADD7-A8DEE5433772}" dt="2021-07-21T11:12:15.534" v="986" actId="571"/>
-          <ac:spMkLst>
-            <pc:docMk/>
-            <pc:sldMk cId="362378951" sldId="263"/>
-            <ac:spMk id="138" creationId="{2CE26DDC-5FA5-446E-BE5F-19BF4DD1B773}"/>
-          </ac:spMkLst>
-        </pc:spChg>
-        <pc:spChg chg="add mod">
-          <ac:chgData name="Sebastian Meine" userId="f54488a2a6b7dc9e" providerId="LiveId" clId="{762C8129-56AC-41EC-ADD7-A8DEE5433772}" dt="2021-07-21T11:12:15.534" v="986" actId="571"/>
-          <ac:spMkLst>
-            <pc:docMk/>
-            <pc:sldMk cId="362378951" sldId="263"/>
-            <ac:spMk id="140" creationId="{58252E9A-5052-439B-9D78-ADE83C2FD3EF}"/>
-          </ac:spMkLst>
-        </pc:spChg>
-        <pc:spChg chg="add mod">
-          <ac:chgData name="Sebastian Meine" userId="f54488a2a6b7dc9e" providerId="LiveId" clId="{762C8129-56AC-41EC-ADD7-A8DEE5433772}" dt="2021-07-21T11:12:14.978" v="985" actId="571"/>
-          <ac:spMkLst>
-            <pc:docMk/>
-            <pc:sldMk cId="362378951" sldId="263"/>
-            <ac:spMk id="158" creationId="{CA08DCBB-5D97-4D82-B05E-BA132E27E64D}"/>
-          </ac:spMkLst>
-        </pc:spChg>
-        <pc:spChg chg="add mod">
-          <ac:chgData name="Sebastian Meine" userId="f54488a2a6b7dc9e" providerId="LiveId" clId="{762C8129-56AC-41EC-ADD7-A8DEE5433772}" dt="2021-07-21T11:12:14.978" v="985" actId="571"/>
-          <ac:spMkLst>
-            <pc:docMk/>
-            <pc:sldMk cId="362378951" sldId="263"/>
-            <ac:spMk id="159" creationId="{66BB14C0-2AF6-452B-9C74-EC412C9330E4}"/>
-          </ac:spMkLst>
-        </pc:spChg>
-        <pc:spChg chg="add mod">
-          <ac:chgData name="Sebastian Meine" userId="f54488a2a6b7dc9e" providerId="LiveId" clId="{762C8129-56AC-41EC-ADD7-A8DEE5433772}" dt="2021-07-21T11:12:14.978" v="985" actId="571"/>
-          <ac:spMkLst>
-            <pc:docMk/>
-            <pc:sldMk cId="362378951" sldId="263"/>
-            <ac:spMk id="160" creationId="{D6EFCC58-7069-4E1E-B662-1F5B800D12B2}"/>
-          </ac:spMkLst>
-        </pc:spChg>
-        <pc:spChg chg="add mod">
-          <ac:chgData name="Sebastian Meine" userId="f54488a2a6b7dc9e" providerId="LiveId" clId="{762C8129-56AC-41EC-ADD7-A8DEE5433772}" dt="2021-07-21T11:12:14.978" v="985" actId="571"/>
-          <ac:spMkLst>
-            <pc:docMk/>
-            <pc:sldMk cId="362378951" sldId="263"/>
-            <ac:spMk id="161" creationId="{D50C8597-5811-4296-88AB-A2FA6DD1D53E}"/>
-          </ac:spMkLst>
-        </pc:spChg>
-        <pc:spChg chg="add mod">
-          <ac:chgData name="Sebastian Meine" userId="f54488a2a6b7dc9e" providerId="LiveId" clId="{762C8129-56AC-41EC-ADD7-A8DEE5433772}" dt="2021-07-21T11:12:14.978" v="985" actId="571"/>
-          <ac:spMkLst>
-            <pc:docMk/>
-            <pc:sldMk cId="362378951" sldId="263"/>
-            <ac:spMk id="162" creationId="{D4D12FD1-EF1B-4DAE-AAD9-2EF2888E3D4E}"/>
-          </ac:spMkLst>
-        </pc:spChg>
-        <pc:spChg chg="add mod">
-          <ac:chgData name="Sebastian Meine" userId="f54488a2a6b7dc9e" providerId="LiveId" clId="{762C8129-56AC-41EC-ADD7-A8DEE5433772}" dt="2021-07-21T11:12:14.978" v="985" actId="571"/>
-          <ac:spMkLst>
-            <pc:docMk/>
-            <pc:sldMk cId="362378951" sldId="263"/>
-            <ac:spMk id="163" creationId="{444BB898-48DB-4E07-8264-CF362C3A493A}"/>
-          </ac:spMkLst>
-        </pc:spChg>
-        <pc:spChg chg="add mod">
-          <ac:chgData name="Sebastian Meine" userId="f54488a2a6b7dc9e" providerId="LiveId" clId="{762C8129-56AC-41EC-ADD7-A8DEE5433772}" dt="2021-07-21T11:12:14.978" v="985" actId="571"/>
-          <ac:spMkLst>
-            <pc:docMk/>
-            <pc:sldMk cId="362378951" sldId="263"/>
-            <ac:spMk id="164" creationId="{9497D5AE-CB1F-4FB2-A238-771CDF522061}"/>
-          </ac:spMkLst>
-        </pc:spChg>
-        <pc:spChg chg="add mod">
-          <ac:chgData name="Sebastian Meine" userId="f54488a2a6b7dc9e" providerId="LiveId" clId="{762C8129-56AC-41EC-ADD7-A8DEE5433772}" dt="2021-07-21T11:12:14.978" v="985" actId="571"/>
-          <ac:spMkLst>
-            <pc:docMk/>
-            <pc:sldMk cId="362378951" sldId="263"/>
-            <ac:spMk id="165" creationId="{1A1C3FB0-1097-4301-996E-71ECE3A8AC21}"/>
-          </ac:spMkLst>
-        </pc:spChg>
-        <pc:spChg chg="add mod">
-          <ac:chgData name="Sebastian Meine" userId="f54488a2a6b7dc9e" providerId="LiveId" clId="{762C8129-56AC-41EC-ADD7-A8DEE5433772}" dt="2021-07-21T11:12:14.978" v="985" actId="571"/>
-          <ac:spMkLst>
-            <pc:docMk/>
-            <pc:sldMk cId="362378951" sldId="263"/>
-            <ac:spMk id="166" creationId="{E989C434-143A-4B6A-9A18-5A3A85854D70}"/>
-          </ac:spMkLst>
-        </pc:spChg>
-        <pc:spChg chg="add mod">
-          <ac:chgData name="Sebastian Meine" userId="f54488a2a6b7dc9e" providerId="LiveId" clId="{762C8129-56AC-41EC-ADD7-A8DEE5433772}" dt="2021-07-21T11:12:14.978" v="985" actId="571"/>
-          <ac:spMkLst>
-            <pc:docMk/>
-            <pc:sldMk cId="362378951" sldId="263"/>
-            <ac:spMk id="167" creationId="{54462E02-F994-4931-9F69-DF9C3D91BDCB}"/>
-          </ac:spMkLst>
-        </pc:spChg>
-        <pc:spChg chg="add mod">
-          <ac:chgData name="Sebastian Meine" userId="f54488a2a6b7dc9e" providerId="LiveId" clId="{762C8129-56AC-41EC-ADD7-A8DEE5433772}" dt="2021-07-21T11:12:14.978" v="985" actId="571"/>
-          <ac:spMkLst>
-            <pc:docMk/>
-            <pc:sldMk cId="362378951" sldId="263"/>
-            <ac:spMk id="168" creationId="{6052E854-BCB5-4AD7-8AA8-266ED594D14A}"/>
-          </ac:spMkLst>
-        </pc:spChg>
-        <pc:spChg chg="add mod">
-          <ac:chgData name="Sebastian Meine" userId="f54488a2a6b7dc9e" providerId="LiveId" clId="{762C8129-56AC-41EC-ADD7-A8DEE5433772}" dt="2021-07-21T11:12:14.978" v="985" actId="571"/>
-          <ac:spMkLst>
-            <pc:docMk/>
-            <pc:sldMk cId="362378951" sldId="263"/>
-            <ac:spMk id="169" creationId="{F05D6D8E-C42E-487E-9939-E708552355AA}"/>
-          </ac:spMkLst>
-        </pc:spChg>
-        <pc:spChg chg="add mod">
-          <ac:chgData name="Sebastian Meine" userId="f54488a2a6b7dc9e" providerId="LiveId" clId="{762C8129-56AC-41EC-ADD7-A8DEE5433772}" dt="2021-07-21T11:12:14.978" v="985" actId="571"/>
-          <ac:spMkLst>
-            <pc:docMk/>
-            <pc:sldMk cId="362378951" sldId="263"/>
-            <ac:spMk id="170" creationId="{44FAD2F4-4715-46A0-A549-F614C24D560A}"/>
-          </ac:spMkLst>
-        </pc:spChg>
-        <pc:spChg chg="add mod">
-          <ac:chgData name="Sebastian Meine" userId="f54488a2a6b7dc9e" providerId="LiveId" clId="{762C8129-56AC-41EC-ADD7-A8DEE5433772}" dt="2021-07-21T11:12:14.978" v="985" actId="571"/>
-          <ac:spMkLst>
-            <pc:docMk/>
-            <pc:sldMk cId="362378951" sldId="263"/>
-            <ac:spMk id="171" creationId="{5777BB2F-6E96-49AC-B5A8-80D913ED3EF3}"/>
-          </ac:spMkLst>
-        </pc:spChg>
-        <pc:spChg chg="add mod">
-          <ac:chgData name="Sebastian Meine" userId="f54488a2a6b7dc9e" providerId="LiveId" clId="{762C8129-56AC-41EC-ADD7-A8DEE5433772}" dt="2021-07-21T11:12:14.978" v="985" actId="571"/>
-          <ac:spMkLst>
-            <pc:docMk/>
-            <pc:sldMk cId="362378951" sldId="263"/>
-            <ac:spMk id="172" creationId="{E63EC859-8045-43D6-AD7D-C3F4DBDA8276}"/>
-          </ac:spMkLst>
-        </pc:spChg>
-        <pc:spChg chg="add mod">
-          <ac:chgData name="Sebastian Meine" userId="f54488a2a6b7dc9e" providerId="LiveId" clId="{762C8129-56AC-41EC-ADD7-A8DEE5433772}" dt="2021-07-21T11:12:14.978" v="985" actId="571"/>
-          <ac:spMkLst>
-            <pc:docMk/>
-            <pc:sldMk cId="362378951" sldId="263"/>
-            <ac:spMk id="173" creationId="{8D7AEB7D-D779-4F7B-9D64-86863DB88785}"/>
-          </ac:spMkLst>
-        </pc:spChg>
-        <pc:spChg chg="add mod">
-          <ac:chgData name="Sebastian Meine" userId="f54488a2a6b7dc9e" providerId="LiveId" clId="{762C8129-56AC-41EC-ADD7-A8DEE5433772}" dt="2021-07-21T11:12:14.978" v="985" actId="571"/>
-          <ac:spMkLst>
-            <pc:docMk/>
-            <pc:sldMk cId="362378951" sldId="263"/>
-            <ac:spMk id="176" creationId="{BA7116D5-ED03-45F7-89D0-D4A71B2E4190}"/>
-          </ac:spMkLst>
-        </pc:spChg>
-        <pc:spChg chg="add mod">
-          <ac:chgData name="Sebastian Meine" userId="f54488a2a6b7dc9e" providerId="LiveId" clId="{762C8129-56AC-41EC-ADD7-A8DEE5433772}" dt="2021-07-21T11:12:14.978" v="985" actId="571"/>
-          <ac:spMkLst>
-            <pc:docMk/>
-            <pc:sldMk cId="362378951" sldId="263"/>
-            <ac:spMk id="178" creationId="{50946BC0-7C5D-4C75-A665-2896642C8AC9}"/>
-          </ac:spMkLst>
-        </pc:spChg>
-        <pc:spChg chg="add del mod">
-          <ac:chgData name="Sebastian Meine" userId="f54488a2a6b7dc9e" providerId="LiveId" clId="{762C8129-56AC-41EC-ADD7-A8DEE5433772}" dt="2021-07-21T11:38:59.966" v="1514"/>
-          <ac:spMkLst>
-            <pc:docMk/>
-            <pc:sldMk cId="362378951" sldId="263"/>
-            <ac:spMk id="232" creationId="{1C163E1D-F58D-4FAA-938A-573D6ECAF09C}"/>
-          </ac:spMkLst>
-        </pc:spChg>
-        <pc:spChg chg="add del mod">
-          <ac:chgData name="Sebastian Meine" userId="f54488a2a6b7dc9e" providerId="LiveId" clId="{762C8129-56AC-41EC-ADD7-A8DEE5433772}" dt="2021-07-21T11:38:57.886" v="1507"/>
-          <ac:spMkLst>
-            <pc:docMk/>
-            <pc:sldMk cId="362378951" sldId="263"/>
-            <ac:spMk id="233" creationId="{35DE4188-A991-4589-B793-528803450203}"/>
-          </ac:spMkLst>
-        </pc:spChg>
-        <pc:spChg chg="add del mod">
-          <ac:chgData name="Sebastian Meine" userId="f54488a2a6b7dc9e" providerId="LiveId" clId="{762C8129-56AC-41EC-ADD7-A8DEE5433772}" dt="2021-07-21T11:38:57.886" v="1507"/>
-          <ac:spMkLst>
-            <pc:docMk/>
-            <pc:sldMk cId="362378951" sldId="263"/>
-            <ac:spMk id="234" creationId="{8DE91337-3387-4DB7-891D-249F8202ADD6}"/>
-          </ac:spMkLst>
-        </pc:spChg>
-        <pc:spChg chg="add del mod">
-          <ac:chgData name="Sebastian Meine" userId="f54488a2a6b7dc9e" providerId="LiveId" clId="{762C8129-56AC-41EC-ADD7-A8DEE5433772}" dt="2021-07-21T11:38:57.886" v="1507"/>
-          <ac:spMkLst>
-            <pc:docMk/>
-            <pc:sldMk cId="362378951" sldId="263"/>
-            <ac:spMk id="235" creationId="{3C6A63A0-44B7-464A-8EB1-D63F2AAE5D69}"/>
-          </ac:spMkLst>
-        </pc:spChg>
-        <pc:spChg chg="add del mod">
-          <ac:chgData name="Sebastian Meine" userId="f54488a2a6b7dc9e" providerId="LiveId" clId="{762C8129-56AC-41EC-ADD7-A8DEE5433772}" dt="2021-07-21T11:38:57.565" v="1505"/>
-          <ac:spMkLst>
-            <pc:docMk/>
-            <pc:sldMk cId="362378951" sldId="263"/>
-            <ac:spMk id="236" creationId="{7761084A-D2E4-40FB-AE91-07BE1761BAFC}"/>
-          </ac:spMkLst>
-        </pc:spChg>
-        <pc:spChg chg="add del mod">
-          <ac:chgData name="Sebastian Meine" userId="f54488a2a6b7dc9e" providerId="LiveId" clId="{762C8129-56AC-41EC-ADD7-A8DEE5433772}" dt="2021-07-21T11:38:57.167" v="1503"/>
-          <ac:spMkLst>
-            <pc:docMk/>
-            <pc:sldMk cId="362378951" sldId="263"/>
-            <ac:spMk id="237" creationId="{982EEB1A-D38A-45A9-8B72-464CB222AA73}"/>
-          </ac:spMkLst>
-        </pc:spChg>
-        <pc:spChg chg="add del mod">
-          <ac:chgData name="Sebastian Meine" userId="f54488a2a6b7dc9e" providerId="LiveId" clId="{762C8129-56AC-41EC-ADD7-A8DEE5433772}" dt="2021-07-21T11:38:56.171" v="1499"/>
-          <ac:spMkLst>
-            <pc:docMk/>
-            <pc:sldMk cId="362378951" sldId="263"/>
-            <ac:spMk id="238" creationId="{21BCAF66-48F2-4EE0-BB67-6EFE1CC4669F}"/>
-          </ac:spMkLst>
-        </pc:spChg>
-        <pc:spChg chg="add del mod">
-          <ac:chgData name="Sebastian Meine" userId="f54488a2a6b7dc9e" providerId="LiveId" clId="{762C8129-56AC-41EC-ADD7-A8DEE5433772}" dt="2021-07-21T11:38:55.701" v="1496"/>
-          <ac:spMkLst>
-            <pc:docMk/>
-            <pc:sldMk cId="362378951" sldId="263"/>
-            <ac:spMk id="239" creationId="{985921B7-8350-4D11-AAD8-A68837B30626}"/>
-          </ac:spMkLst>
-        </pc:spChg>
-        <pc:spChg chg="add del mod">
-          <ac:chgData name="Sebastian Meine" userId="f54488a2a6b7dc9e" providerId="LiveId" clId="{762C8129-56AC-41EC-ADD7-A8DEE5433772}" dt="2021-07-21T11:38:55.701" v="1496"/>
-          <ac:spMkLst>
-            <pc:docMk/>
-            <pc:sldMk cId="362378951" sldId="263"/>
-            <ac:spMk id="240" creationId="{0B1B0FDA-D1C6-4BB4-B1D2-2ECF996C20EB}"/>
-          </ac:spMkLst>
-        </pc:spChg>
-        <pc:spChg chg="add del mod">
-          <ac:chgData name="Sebastian Meine" userId="f54488a2a6b7dc9e" providerId="LiveId" clId="{762C8129-56AC-41EC-ADD7-A8DEE5433772}" dt="2021-07-21T11:38:55.701" v="1496"/>
-          <ac:spMkLst>
-            <pc:docMk/>
-            <pc:sldMk cId="362378951" sldId="263"/>
-            <ac:spMk id="241" creationId="{CE3A4BBE-6A22-41A0-9E2B-7A29FBCE868F}"/>
-          </ac:spMkLst>
-        </pc:spChg>
-        <pc:spChg chg="add mod">
-          <ac:chgData name="Sebastian Meine" userId="f54488a2a6b7dc9e" providerId="LiveId" clId="{762C8129-56AC-41EC-ADD7-A8DEE5433772}" dt="2021-07-21T11:40:29.209" v="1529" actId="1076"/>
-          <ac:spMkLst>
-            <pc:docMk/>
-            <pc:sldMk cId="362378951" sldId="263"/>
-            <ac:spMk id="242" creationId="{F9041B7D-8114-4312-B2BE-79CD332103C7}"/>
-          </ac:spMkLst>
-        </pc:spChg>
-        <pc:spChg chg="add mod">
-          <ac:chgData name="Sebastian Meine" userId="f54488a2a6b7dc9e" providerId="LiveId" clId="{762C8129-56AC-41EC-ADD7-A8DEE5433772}" dt="2021-07-21T11:40:44.647" v="1532" actId="1076"/>
-          <ac:spMkLst>
-            <pc:docMk/>
-            <pc:sldMk cId="362378951" sldId="263"/>
-            <ac:spMk id="243" creationId="{F54FF04F-086D-4DB5-A714-C9A6C43B3DD5}"/>
-          </ac:spMkLst>
-        </pc:spChg>
-        <pc:spChg chg="add mod">
-          <ac:chgData name="Sebastian Meine" userId="f54488a2a6b7dc9e" providerId="LiveId" clId="{762C8129-56AC-41EC-ADD7-A8DEE5433772}" dt="2021-07-21T11:42:29.124" v="1550" actId="1076"/>
-          <ac:spMkLst>
-            <pc:docMk/>
-            <pc:sldMk cId="362378951" sldId="263"/>
-            <ac:spMk id="244" creationId="{EF80AF76-1D40-4E4A-8E62-CB6C5EE180B5}"/>
-          </ac:spMkLst>
-        </pc:spChg>
-        <pc:spChg chg="add mod">
-          <ac:chgData name="Sebastian Meine" userId="f54488a2a6b7dc9e" providerId="LiveId" clId="{762C8129-56AC-41EC-ADD7-A8DEE5433772}" dt="2021-07-21T11:42:29.124" v="1550" actId="1076"/>
-          <ac:spMkLst>
-            <pc:docMk/>
-            <pc:sldMk cId="362378951" sldId="263"/>
-            <ac:spMk id="245" creationId="{2C688EE4-A8BD-49A6-AFD9-17C9E1CCBA68}"/>
-          </ac:spMkLst>
-        </pc:spChg>
-        <pc:spChg chg="add mod">
-          <ac:chgData name="Sebastian Meine" userId="f54488a2a6b7dc9e" providerId="LiveId" clId="{762C8129-56AC-41EC-ADD7-A8DEE5433772}" dt="2021-07-21T11:42:29.124" v="1550" actId="1076"/>
-          <ac:spMkLst>
-            <pc:docMk/>
-            <pc:sldMk cId="362378951" sldId="263"/>
-            <ac:spMk id="246" creationId="{4AB66913-76DE-47C4-9602-A5DE98FA6348}"/>
-          </ac:spMkLst>
-        </pc:spChg>
-        <pc:spChg chg="add mod">
-          <ac:chgData name="Sebastian Meine" userId="f54488a2a6b7dc9e" providerId="LiveId" clId="{762C8129-56AC-41EC-ADD7-A8DEE5433772}" dt="2021-07-21T11:43:54.729" v="1559" actId="1076"/>
-          <ac:spMkLst>
-            <pc:docMk/>
-            <pc:sldMk cId="362378951" sldId="263"/>
-            <ac:spMk id="247" creationId="{C59ABEE1-3DC9-4EF0-985B-ED0E7529F7E3}"/>
-          </ac:spMkLst>
-        </pc:spChg>
-        <pc:spChg chg="add mod">
-          <ac:chgData name="Sebastian Meine" userId="f54488a2a6b7dc9e" providerId="LiveId" clId="{762C8129-56AC-41EC-ADD7-A8DEE5433772}" dt="2021-07-21T11:43:54.729" v="1559" actId="1076"/>
-          <ac:spMkLst>
-            <pc:docMk/>
-            <pc:sldMk cId="362378951" sldId="263"/>
-            <ac:spMk id="248" creationId="{2EF969AB-4B0F-4896-A520-02BF15ABD16A}"/>
-          </ac:spMkLst>
-        </pc:spChg>
-        <pc:spChg chg="add mod">
-          <ac:chgData name="Sebastian Meine" userId="f54488a2a6b7dc9e" providerId="LiveId" clId="{762C8129-56AC-41EC-ADD7-A8DEE5433772}" dt="2021-07-21T11:43:41.267" v="1558" actId="1076"/>
-          <ac:spMkLst>
-            <pc:docMk/>
-            <pc:sldMk cId="362378951" sldId="263"/>
-            <ac:spMk id="249" creationId="{121ADEB6-CB71-4DF5-9148-F99238421ED2}"/>
-          </ac:spMkLst>
-        </pc:spChg>
-        <pc:spChg chg="add mod">
-          <ac:chgData name="Sebastian Meine" userId="f54488a2a6b7dc9e" providerId="LiveId" clId="{762C8129-56AC-41EC-ADD7-A8DEE5433772}" dt="2021-07-21T11:43:41.267" v="1558" actId="1076"/>
-          <ac:spMkLst>
-            <pc:docMk/>
-            <pc:sldMk cId="362378951" sldId="263"/>
-            <ac:spMk id="250" creationId="{0E4D9A70-2F09-4F80-8D31-14BCB05B8888}"/>
-          </ac:spMkLst>
-        </pc:spChg>
-        <pc:spChg chg="add mod">
-          <ac:chgData name="Sebastian Meine" userId="f54488a2a6b7dc9e" providerId="LiveId" clId="{762C8129-56AC-41EC-ADD7-A8DEE5433772}" dt="2021-07-21T11:43:41.267" v="1558" actId="1076"/>
-          <ac:spMkLst>
-            <pc:docMk/>
-            <pc:sldMk cId="362378951" sldId="263"/>
-            <ac:spMk id="251" creationId="{1AF7C8E0-7E63-4DB8-A5AE-DF0F6F822BD5}"/>
-          </ac:spMkLst>
-        </pc:spChg>
-        <pc:spChg chg="add mod">
-          <ac:chgData name="Sebastian Meine" userId="f54488a2a6b7dc9e" providerId="LiveId" clId="{762C8129-56AC-41EC-ADD7-A8DEE5433772}" dt="2021-07-21T11:44:06.462" v="1561" actId="1076"/>
-          <ac:spMkLst>
-            <pc:docMk/>
-            <pc:sldMk cId="362378951" sldId="263"/>
-            <ac:spMk id="252" creationId="{E95400F4-1697-43A4-B16E-DCFD401F993F}"/>
-          </ac:spMkLst>
-        </pc:spChg>
-        <pc:spChg chg="add mod">
-          <ac:chgData name="Sebastian Meine" userId="f54488a2a6b7dc9e" providerId="LiveId" clId="{762C8129-56AC-41EC-ADD7-A8DEE5433772}" dt="2021-07-21T11:44:06.462" v="1561" actId="1076"/>
-          <ac:spMkLst>
-            <pc:docMk/>
-            <pc:sldMk cId="362378951" sldId="263"/>
-            <ac:spMk id="253" creationId="{9ECA579C-4CC7-4FFD-8D34-78420AAC26B4}"/>
-          </ac:spMkLst>
-        </pc:spChg>
-        <pc:spChg chg="add mod">
-          <ac:chgData name="Sebastian Meine" userId="f54488a2a6b7dc9e" providerId="LiveId" clId="{762C8129-56AC-41EC-ADD7-A8DEE5433772}" dt="2021-07-21T11:44:06.462" v="1561" actId="1076"/>
-          <ac:spMkLst>
-            <pc:docMk/>
-            <pc:sldMk cId="362378951" sldId="263"/>
-            <ac:spMk id="254" creationId="{9B2CB008-0475-4A7D-A762-391918A05C25}"/>
-          </ac:spMkLst>
-        </pc:spChg>
-        <pc:grpChg chg="add del mod">
-          <ac:chgData name="Sebastian Meine" userId="f54488a2a6b7dc9e" providerId="LiveId" clId="{762C8129-56AC-41EC-ADD7-A8DEE5433772}" dt="2021-07-21T11:05:04.452" v="926" actId="165"/>
-          <ac:grpSpMkLst>
-            <pc:docMk/>
-            <pc:sldMk cId="362378951" sldId="263"/>
-            <ac:grpSpMk id="135" creationId="{2BD12A9B-C543-4272-AC01-FC8AFF5601AC}"/>
-          </ac:grpSpMkLst>
-        </pc:grpChg>
-        <pc:grpChg chg="add mod ord">
-          <ac:chgData name="Sebastian Meine" userId="f54488a2a6b7dc9e" providerId="LiveId" clId="{762C8129-56AC-41EC-ADD7-A8DEE5433772}" dt="2021-07-21T11:25:11.407" v="1384" actId="14100"/>
-          <ac:grpSpMkLst>
-            <pc:docMk/>
-            <pc:sldMk cId="362378951" sldId="263"/>
-            <ac:grpSpMk id="136" creationId="{D694CDF6-9EE0-4E29-B79D-EF3BFEF9243D}"/>
-          </ac:grpSpMkLst>
-        </pc:grpChg>
-        <pc:cxnChg chg="add del mod">
-          <ac:chgData name="Sebastian Meine" userId="f54488a2a6b7dc9e" providerId="LiveId" clId="{762C8129-56AC-41EC-ADD7-A8DEE5433772}" dt="2021-07-21T10:50:40.058" v="547" actId="478"/>
-          <ac:cxnSpMkLst>
-            <pc:docMk/>
-            <pc:sldMk cId="362378951" sldId="263"/>
-            <ac:cxnSpMk id="4" creationId="{E564E939-8E6B-4CCC-A23A-BE4A7A8E8D8B}"/>
-          </ac:cxnSpMkLst>
-        </pc:cxnChg>
-        <pc:cxnChg chg="add del mod topLvl">
-          <ac:chgData name="Sebastian Meine" userId="f54488a2a6b7dc9e" providerId="LiveId" clId="{762C8129-56AC-41EC-ADD7-A8DEE5433772}" dt="2021-07-21T11:36:38.712" v="1471" actId="478"/>
-          <ac:cxnSpMkLst>
-            <pc:docMk/>
-            <pc:sldMk cId="362378951" sldId="263"/>
-            <ac:cxnSpMk id="62" creationId="{641C89C7-AAD9-4ADA-B116-D4F842B46E01}"/>
-          </ac:cxnSpMkLst>
-        </pc:cxnChg>
-        <pc:cxnChg chg="add del mod topLvl">
-          <ac:chgData name="Sebastian Meine" userId="f54488a2a6b7dc9e" providerId="LiveId" clId="{762C8129-56AC-41EC-ADD7-A8DEE5433772}" dt="2021-07-21T11:35:52.566" v="1470" actId="478"/>
-          <ac:cxnSpMkLst>
-            <pc:docMk/>
-            <pc:sldMk cId="362378951" sldId="263"/>
-            <ac:cxnSpMk id="64" creationId="{11C587F0-E9DE-421F-9987-A4B2A9CF0100}"/>
-          </ac:cxnSpMkLst>
-        </pc:cxnChg>
-        <pc:cxnChg chg="add del mod ord topLvl">
-          <ac:chgData name="Sebastian Meine" userId="f54488a2a6b7dc9e" providerId="LiveId" clId="{762C8129-56AC-41EC-ADD7-A8DEE5433772}" dt="2021-07-21T11:36:38.712" v="1471" actId="478"/>
-          <ac:cxnSpMkLst>
-            <pc:docMk/>
-            <pc:sldMk cId="362378951" sldId="263"/>
-            <ac:cxnSpMk id="68" creationId="{51FE51BC-649C-4C3F-871F-5E8863A9D413}"/>
-          </ac:cxnSpMkLst>
-        </pc:cxnChg>
-        <pc:cxnChg chg="add del mod ord topLvl">
-          <ac:chgData name="Sebastian Meine" userId="f54488a2a6b7dc9e" providerId="LiveId" clId="{762C8129-56AC-41EC-ADD7-A8DEE5433772}" dt="2021-07-21T11:36:38.712" v="1471" actId="478"/>
-          <ac:cxnSpMkLst>
-            <pc:docMk/>
-            <pc:sldMk cId="362378951" sldId="263"/>
-            <ac:cxnSpMk id="73" creationId="{4375D169-34E2-4853-891A-E246B3B32ECF}"/>
-          </ac:cxnSpMkLst>
-        </pc:cxnChg>
-        <pc:cxnChg chg="add del mod topLvl">
-          <ac:chgData name="Sebastian Meine" userId="f54488a2a6b7dc9e" providerId="LiveId" clId="{762C8129-56AC-41EC-ADD7-A8DEE5433772}" dt="2021-07-21T11:35:52.566" v="1470" actId="478"/>
-          <ac:cxnSpMkLst>
-            <pc:docMk/>
-            <pc:sldMk cId="362378951" sldId="263"/>
-            <ac:cxnSpMk id="76" creationId="{50167718-8ED9-4F15-B8D7-6E7C6522C9E9}"/>
-          </ac:cxnSpMkLst>
-        </pc:cxnChg>
-        <pc:cxnChg chg="add del mod topLvl">
-          <ac:chgData name="Sebastian Meine" userId="f54488a2a6b7dc9e" providerId="LiveId" clId="{762C8129-56AC-41EC-ADD7-A8DEE5433772}" dt="2021-07-21T11:36:38.712" v="1471" actId="478"/>
-          <ac:cxnSpMkLst>
-            <pc:docMk/>
-            <pc:sldMk cId="362378951" sldId="263"/>
-            <ac:cxnSpMk id="80" creationId="{5CA63747-A5D2-4C82-9A67-0B7BDCC37689}"/>
-          </ac:cxnSpMkLst>
-        </pc:cxnChg>
-        <pc:cxnChg chg="add del mod topLvl">
-          <ac:chgData name="Sebastian Meine" userId="f54488a2a6b7dc9e" providerId="LiveId" clId="{762C8129-56AC-41EC-ADD7-A8DEE5433772}" dt="2021-07-21T11:36:38.712" v="1471" actId="478"/>
-          <ac:cxnSpMkLst>
-            <pc:docMk/>
-            <pc:sldMk cId="362378951" sldId="263"/>
-            <ac:cxnSpMk id="81" creationId="{C3052F66-9B5A-4D90-A8C8-505FDE8188DF}"/>
-          </ac:cxnSpMkLst>
-        </pc:cxnChg>
-        <pc:cxnChg chg="add del mod topLvl">
-          <ac:chgData name="Sebastian Meine" userId="f54488a2a6b7dc9e" providerId="LiveId" clId="{762C8129-56AC-41EC-ADD7-A8DEE5433772}" dt="2021-07-21T11:35:52.566" v="1470" actId="478"/>
-          <ac:cxnSpMkLst>
-            <pc:docMk/>
-            <pc:sldMk cId="362378951" sldId="263"/>
-            <ac:cxnSpMk id="82" creationId="{FAE93A71-60BC-4150-BE14-D517A0887F23}"/>
-          </ac:cxnSpMkLst>
-        </pc:cxnChg>
-        <pc:cxnChg chg="add del mod">
-          <ac:chgData name="Sebastian Meine" userId="f54488a2a6b7dc9e" providerId="LiveId" clId="{762C8129-56AC-41EC-ADD7-A8DEE5433772}" dt="2021-07-21T10:54:59.872" v="717"/>
-          <ac:cxnSpMkLst>
-            <pc:docMk/>
-            <pc:sldMk cId="362378951" sldId="263"/>
-            <ac:cxnSpMk id="83" creationId="{30BB1F1B-3DDB-4DC2-86C3-E8EA18EB74E1}"/>
-          </ac:cxnSpMkLst>
-        </pc:cxnChg>
-        <pc:cxnChg chg="add del mod">
-          <ac:chgData name="Sebastian Meine" userId="f54488a2a6b7dc9e" providerId="LiveId" clId="{762C8129-56AC-41EC-ADD7-A8DEE5433772}" dt="2021-07-21T10:54:59.872" v="717"/>
-          <ac:cxnSpMkLst>
-            <pc:docMk/>
-            <pc:sldMk cId="362378951" sldId="263"/>
-            <ac:cxnSpMk id="84" creationId="{282A8C56-A98C-4A6E-AE59-28B10106A0C2}"/>
-          </ac:cxnSpMkLst>
-        </pc:cxnChg>
-        <pc:cxnChg chg="add del mod">
-          <ac:chgData name="Sebastian Meine" userId="f54488a2a6b7dc9e" providerId="LiveId" clId="{762C8129-56AC-41EC-ADD7-A8DEE5433772}" dt="2021-07-21T10:54:59.872" v="717"/>
-          <ac:cxnSpMkLst>
-            <pc:docMk/>
-            <pc:sldMk cId="362378951" sldId="263"/>
-            <ac:cxnSpMk id="85" creationId="{E3723346-7C2D-4DE4-A190-B9880F32A8DE}"/>
-          </ac:cxnSpMkLst>
-        </pc:cxnChg>
-        <pc:cxnChg chg="add del mod topLvl">
-          <ac:chgData name="Sebastian Meine" userId="f54488a2a6b7dc9e" providerId="LiveId" clId="{762C8129-56AC-41EC-ADD7-A8DEE5433772}" dt="2021-07-21T11:36:38.712" v="1471" actId="478"/>
-          <ac:cxnSpMkLst>
-            <pc:docMk/>
-            <pc:sldMk cId="362378951" sldId="263"/>
-            <ac:cxnSpMk id="86" creationId="{FBF51318-D1B1-42C9-8BF4-B70B0564CB4D}"/>
-          </ac:cxnSpMkLst>
-        </pc:cxnChg>
-        <pc:cxnChg chg="add del mod topLvl">
-          <ac:chgData name="Sebastian Meine" userId="f54488a2a6b7dc9e" providerId="LiveId" clId="{762C8129-56AC-41EC-ADD7-A8DEE5433772}" dt="2021-07-21T11:36:38.712" v="1471" actId="478"/>
-          <ac:cxnSpMkLst>
-            <pc:docMk/>
-            <pc:sldMk cId="362378951" sldId="263"/>
-            <ac:cxnSpMk id="87" creationId="{866DF66F-D875-410E-8616-3D1202A12D58}"/>
-          </ac:cxnSpMkLst>
-        </pc:cxnChg>
-        <pc:cxnChg chg="add del mod topLvl">
-          <ac:chgData name="Sebastian Meine" userId="f54488a2a6b7dc9e" providerId="LiveId" clId="{762C8129-56AC-41EC-ADD7-A8DEE5433772}" dt="2021-07-21T11:35:52.566" v="1470" actId="478"/>
-          <ac:cxnSpMkLst>
-            <pc:docMk/>
-            <pc:sldMk cId="362378951" sldId="263"/>
-            <ac:cxnSpMk id="88" creationId="{3D57836C-837A-409E-BE93-848712BF5981}"/>
-          </ac:cxnSpMkLst>
-        </pc:cxnChg>
-        <pc:cxnChg chg="add del mod topLvl">
-          <ac:chgData name="Sebastian Meine" userId="f54488a2a6b7dc9e" providerId="LiveId" clId="{762C8129-56AC-41EC-ADD7-A8DEE5433772}" dt="2021-07-21T11:36:38.712" v="1471" actId="478"/>
-          <ac:cxnSpMkLst>
-            <pc:docMk/>
-            <pc:sldMk cId="362378951" sldId="263"/>
-            <ac:cxnSpMk id="89" creationId="{AA44D446-644B-4371-8E5A-8F3D65328F65}"/>
-          </ac:cxnSpMkLst>
-        </pc:cxnChg>
-        <pc:cxnChg chg="add del mod topLvl">
-          <ac:chgData name="Sebastian Meine" userId="f54488a2a6b7dc9e" providerId="LiveId" clId="{762C8129-56AC-41EC-ADD7-A8DEE5433772}" dt="2021-07-21T11:36:38.712" v="1471" actId="478"/>
-          <ac:cxnSpMkLst>
-            <pc:docMk/>
-            <pc:sldMk cId="362378951" sldId="263"/>
-            <ac:cxnSpMk id="90" creationId="{977A07A0-6614-4EC4-B5B0-30F3E5198FDB}"/>
-          </ac:cxnSpMkLst>
-        </pc:cxnChg>
-        <pc:cxnChg chg="add del mod topLvl">
-          <ac:chgData name="Sebastian Meine" userId="f54488a2a6b7dc9e" providerId="LiveId" clId="{762C8129-56AC-41EC-ADD7-A8DEE5433772}" dt="2021-07-21T11:35:52.566" v="1470" actId="478"/>
-          <ac:cxnSpMkLst>
-            <pc:docMk/>
-            <pc:sldMk cId="362378951" sldId="263"/>
-            <ac:cxnSpMk id="91" creationId="{6309E462-89C3-49C6-A8DC-E5C2368A4A81}"/>
-          </ac:cxnSpMkLst>
-        </pc:cxnChg>
-        <pc:cxnChg chg="add del mod topLvl">
-          <ac:chgData name="Sebastian Meine" userId="f54488a2a6b7dc9e" providerId="LiveId" clId="{762C8129-56AC-41EC-ADD7-A8DEE5433772}" dt="2021-07-21T11:36:38.712" v="1471" actId="478"/>
-          <ac:cxnSpMkLst>
-            <pc:docMk/>
-            <pc:sldMk cId="362378951" sldId="263"/>
-            <ac:cxnSpMk id="92" creationId="{5945FE7C-971F-482A-802E-153E983CBED9}"/>
-          </ac:cxnSpMkLst>
-        </pc:cxnChg>
-        <pc:cxnChg chg="add del mod topLvl">
-          <ac:chgData name="Sebastian Meine" userId="f54488a2a6b7dc9e" providerId="LiveId" clId="{762C8129-56AC-41EC-ADD7-A8DEE5433772}" dt="2021-07-21T11:36:38.712" v="1471" actId="478"/>
-          <ac:cxnSpMkLst>
-            <pc:docMk/>
-            <pc:sldMk cId="362378951" sldId="263"/>
-            <ac:cxnSpMk id="93" creationId="{D5E6647E-0185-4281-9BB5-C6A22215F917}"/>
-          </ac:cxnSpMkLst>
-        </pc:cxnChg>
-        <pc:cxnChg chg="add del mod topLvl">
-          <ac:chgData name="Sebastian Meine" userId="f54488a2a6b7dc9e" providerId="LiveId" clId="{762C8129-56AC-41EC-ADD7-A8DEE5433772}" dt="2021-07-21T11:35:52.566" v="1470" actId="478"/>
-          <ac:cxnSpMkLst>
-            <pc:docMk/>
-            <pc:sldMk cId="362378951" sldId="263"/>
-            <ac:cxnSpMk id="94" creationId="{0FDE8CB8-A594-4146-836A-48730F80877A}"/>
-          </ac:cxnSpMkLst>
-        </pc:cxnChg>
-        <pc:cxnChg chg="add del mod topLvl">
-          <ac:chgData name="Sebastian Meine" userId="f54488a2a6b7dc9e" providerId="LiveId" clId="{762C8129-56AC-41EC-ADD7-A8DEE5433772}" dt="2021-07-21T11:36:38.712" v="1471" actId="478"/>
-          <ac:cxnSpMkLst>
-            <pc:docMk/>
-            <pc:sldMk cId="362378951" sldId="263"/>
-            <ac:cxnSpMk id="95" creationId="{F133D6BC-971F-49F9-8075-260EC1759729}"/>
-          </ac:cxnSpMkLst>
-        </pc:cxnChg>
-        <pc:cxnChg chg="add del mod topLvl">
-          <ac:chgData name="Sebastian Meine" userId="f54488a2a6b7dc9e" providerId="LiveId" clId="{762C8129-56AC-41EC-ADD7-A8DEE5433772}" dt="2021-07-21T11:36:38.712" v="1471" actId="478"/>
-          <ac:cxnSpMkLst>
-            <pc:docMk/>
-            <pc:sldMk cId="362378951" sldId="263"/>
-            <ac:cxnSpMk id="96" creationId="{9D301A9A-7D57-4EC7-BBD5-9E451FB76AD7}"/>
-          </ac:cxnSpMkLst>
-        </pc:cxnChg>
-        <pc:cxnChg chg="add del mod topLvl">
-          <ac:chgData name="Sebastian Meine" userId="f54488a2a6b7dc9e" providerId="LiveId" clId="{762C8129-56AC-41EC-ADD7-A8DEE5433772}" dt="2021-07-21T11:35:52.566" v="1470" actId="478"/>
-          <ac:cxnSpMkLst>
-            <pc:docMk/>
-            <pc:sldMk cId="362378951" sldId="263"/>
-            <ac:cxnSpMk id="97" creationId="{95E91D7A-E522-41FE-AA2B-14F2F275F54F}"/>
-          </ac:cxnSpMkLst>
-        </pc:cxnChg>
-        <pc:cxnChg chg="add del mod topLvl">
-          <ac:chgData name="Sebastian Meine" userId="f54488a2a6b7dc9e" providerId="LiveId" clId="{762C8129-56AC-41EC-ADD7-A8DEE5433772}" dt="2021-07-21T11:36:38.712" v="1471" actId="478"/>
-          <ac:cxnSpMkLst>
-            <pc:docMk/>
-            <pc:sldMk cId="362378951" sldId="263"/>
-            <ac:cxnSpMk id="98" creationId="{38F4F638-3ADC-4D29-94CA-EE3DAE69F487}"/>
-          </ac:cxnSpMkLst>
-        </pc:cxnChg>
-        <pc:cxnChg chg="add del mod topLvl">
-          <ac:chgData name="Sebastian Meine" userId="f54488a2a6b7dc9e" providerId="LiveId" clId="{762C8129-56AC-41EC-ADD7-A8DEE5433772}" dt="2021-07-21T11:36:38.712" v="1471" actId="478"/>
-          <ac:cxnSpMkLst>
-            <pc:docMk/>
-            <pc:sldMk cId="362378951" sldId="263"/>
-            <ac:cxnSpMk id="99" creationId="{4631C8F0-621E-4A55-8CD0-4010D3012922}"/>
-          </ac:cxnSpMkLst>
-        </pc:cxnChg>
-        <pc:cxnChg chg="add del mod">
-          <ac:chgData name="Sebastian Meine" userId="f54488a2a6b7dc9e" providerId="LiveId" clId="{762C8129-56AC-41EC-ADD7-A8DEE5433772}" dt="2021-07-21T10:55:51.613" v="730" actId="478"/>
-          <ac:cxnSpMkLst>
-            <pc:docMk/>
-            <pc:sldMk cId="362378951" sldId="263"/>
-            <ac:cxnSpMk id="100" creationId="{67C1D83A-10C6-490F-8BF6-E9E7B1CCC0C6}"/>
-          </ac:cxnSpMkLst>
-        </pc:cxnChg>
-        <pc:cxnChg chg="add del mod topLvl">
-          <ac:chgData name="Sebastian Meine" userId="f54488a2a6b7dc9e" providerId="LiveId" clId="{762C8129-56AC-41EC-ADD7-A8DEE5433772}" dt="2021-07-21T11:36:38.712" v="1471" actId="478"/>
-          <ac:cxnSpMkLst>
-            <pc:docMk/>
-            <pc:sldMk cId="362378951" sldId="263"/>
-            <ac:cxnSpMk id="101" creationId="{CBD09E57-DF97-44D0-8EE2-CDD713CF3616}"/>
-          </ac:cxnSpMkLst>
-        </pc:cxnChg>
-        <pc:cxnChg chg="add del mod topLvl">
-          <ac:chgData name="Sebastian Meine" userId="f54488a2a6b7dc9e" providerId="LiveId" clId="{762C8129-56AC-41EC-ADD7-A8DEE5433772}" dt="2021-07-21T11:36:38.712" v="1471" actId="478"/>
-          <ac:cxnSpMkLst>
-            <pc:docMk/>
-            <pc:sldMk cId="362378951" sldId="263"/>
-            <ac:cxnSpMk id="102" creationId="{D56D64AC-BCBA-401A-8BD8-356903ADB112}"/>
-          </ac:cxnSpMkLst>
-        </pc:cxnChg>
-        <pc:cxnChg chg="add del mod topLvl">
-          <ac:chgData name="Sebastian Meine" userId="f54488a2a6b7dc9e" providerId="LiveId" clId="{762C8129-56AC-41EC-ADD7-A8DEE5433772}" dt="2021-07-21T11:35:52.566" v="1470" actId="478"/>
-          <ac:cxnSpMkLst>
-            <pc:docMk/>
-            <pc:sldMk cId="362378951" sldId="263"/>
-            <ac:cxnSpMk id="103" creationId="{0DF22BED-7B3C-4B4E-9EA6-2207A0C99582}"/>
-          </ac:cxnSpMkLst>
-        </pc:cxnChg>
-        <pc:cxnChg chg="add del mod topLvl">
-          <ac:chgData name="Sebastian Meine" userId="f54488a2a6b7dc9e" providerId="LiveId" clId="{762C8129-56AC-41EC-ADD7-A8DEE5433772}" dt="2021-07-21T11:36:38.712" v="1471" actId="478"/>
-          <ac:cxnSpMkLst>
-            <pc:docMk/>
-            <pc:sldMk cId="362378951" sldId="263"/>
-            <ac:cxnSpMk id="108" creationId="{D1A0BB38-0980-461B-B0AC-AEBFE3183D29}"/>
-          </ac:cxnSpMkLst>
-        </pc:cxnChg>
-        <pc:cxnChg chg="add del mod topLvl">
-          <ac:chgData name="Sebastian Meine" userId="f54488a2a6b7dc9e" providerId="LiveId" clId="{762C8129-56AC-41EC-ADD7-A8DEE5433772}" dt="2021-07-21T11:36:38.712" v="1471" actId="478"/>
-          <ac:cxnSpMkLst>
-            <pc:docMk/>
-            <pc:sldMk cId="362378951" sldId="263"/>
-            <ac:cxnSpMk id="109" creationId="{1800DCEE-7977-4B86-A77A-2C4661D78BD7}"/>
-          </ac:cxnSpMkLst>
-        </pc:cxnChg>
-        <pc:cxnChg chg="add del mod topLvl">
-          <ac:chgData name="Sebastian Meine" userId="f54488a2a6b7dc9e" providerId="LiveId" clId="{762C8129-56AC-41EC-ADD7-A8DEE5433772}" dt="2021-07-21T11:35:52.566" v="1470" actId="478"/>
-          <ac:cxnSpMkLst>
-            <pc:docMk/>
-            <pc:sldMk cId="362378951" sldId="263"/>
-            <ac:cxnSpMk id="110" creationId="{02F55A8F-46F2-4728-B417-DC7DEA230A14}"/>
-          </ac:cxnSpMkLst>
-        </pc:cxnChg>
-        <pc:cxnChg chg="add del mod topLvl">
-          <ac:chgData name="Sebastian Meine" userId="f54488a2a6b7dc9e" providerId="LiveId" clId="{762C8129-56AC-41EC-ADD7-A8DEE5433772}" dt="2021-07-21T11:36:38.712" v="1471" actId="478"/>
-          <ac:cxnSpMkLst>
-            <pc:docMk/>
-            <pc:sldMk cId="362378951" sldId="263"/>
-            <ac:cxnSpMk id="111" creationId="{059613AD-3F30-4D25-B8E6-BA3084CBD16B}"/>
-          </ac:cxnSpMkLst>
-        </pc:cxnChg>
-        <pc:cxnChg chg="add del mod topLvl">
-          <ac:chgData name="Sebastian Meine" userId="f54488a2a6b7dc9e" providerId="LiveId" clId="{762C8129-56AC-41EC-ADD7-A8DEE5433772}" dt="2021-07-21T11:36:38.712" v="1471" actId="478"/>
-          <ac:cxnSpMkLst>
-            <pc:docMk/>
-            <pc:sldMk cId="362378951" sldId="263"/>
-            <ac:cxnSpMk id="112" creationId="{25120E7B-51A7-432C-B1D5-EEE699E41F47}"/>
-          </ac:cxnSpMkLst>
-        </pc:cxnChg>
-        <pc:cxnChg chg="add del mod topLvl">
-          <ac:chgData name="Sebastian Meine" userId="f54488a2a6b7dc9e" providerId="LiveId" clId="{762C8129-56AC-41EC-ADD7-A8DEE5433772}" dt="2021-07-21T11:35:52.566" v="1470" actId="478"/>
-          <ac:cxnSpMkLst>
-            <pc:docMk/>
-            <pc:sldMk cId="362378951" sldId="263"/>
-            <ac:cxnSpMk id="113" creationId="{2FE4CB73-92BB-4082-9BB1-E6796D523AE8}"/>
-          </ac:cxnSpMkLst>
-        </pc:cxnChg>
-        <pc:cxnChg chg="add del mod">
-          <ac:chgData name="Sebastian Meine" userId="f54488a2a6b7dc9e" providerId="LiveId" clId="{762C8129-56AC-41EC-ADD7-A8DEE5433772}" dt="2021-07-21T10:58:00.114" v="865"/>
-          <ac:cxnSpMkLst>
-            <pc:docMk/>
-            <pc:sldMk cId="362378951" sldId="263"/>
-            <ac:cxnSpMk id="114" creationId="{8B38866D-0AA0-472E-954F-C5B13DEEC04D}"/>
-          </ac:cxnSpMkLst>
-        </pc:cxnChg>
-        <pc:cxnChg chg="add del mod">
-          <ac:chgData name="Sebastian Meine" userId="f54488a2a6b7dc9e" providerId="LiveId" clId="{762C8129-56AC-41EC-ADD7-A8DEE5433772}" dt="2021-07-21T10:58:00.114" v="865"/>
-          <ac:cxnSpMkLst>
-            <pc:docMk/>
-            <pc:sldMk cId="362378951" sldId="263"/>
-            <ac:cxnSpMk id="115" creationId="{46CAA9EB-7B94-4D34-AF8F-17D4A847B535}"/>
-          </ac:cxnSpMkLst>
-        </pc:cxnChg>
-        <pc:cxnChg chg="add del mod">
-          <ac:chgData name="Sebastian Meine" userId="f54488a2a6b7dc9e" providerId="LiveId" clId="{762C8129-56AC-41EC-ADD7-A8DEE5433772}" dt="2021-07-21T10:58:00.114" v="865"/>
-          <ac:cxnSpMkLst>
-            <pc:docMk/>
-            <pc:sldMk cId="362378951" sldId="263"/>
-            <ac:cxnSpMk id="116" creationId="{E0512FA2-63FA-404F-B509-8F9413E6CE18}"/>
-          </ac:cxnSpMkLst>
-        </pc:cxnChg>
-        <pc:cxnChg chg="add del mod topLvl">
-          <ac:chgData name="Sebastian Meine" userId="f54488a2a6b7dc9e" providerId="LiveId" clId="{762C8129-56AC-41EC-ADD7-A8DEE5433772}" dt="2021-07-21T11:36:38.712" v="1471" actId="478"/>
-          <ac:cxnSpMkLst>
-            <pc:docMk/>
-            <pc:sldMk cId="362378951" sldId="263"/>
-            <ac:cxnSpMk id="117" creationId="{A2D009C4-9F9A-4AB1-9CFD-CBD7948A3B4D}"/>
-          </ac:cxnSpMkLst>
-        </pc:cxnChg>
-        <pc:cxnChg chg="add del mod topLvl">
-          <ac:chgData name="Sebastian Meine" userId="f54488a2a6b7dc9e" providerId="LiveId" clId="{762C8129-56AC-41EC-ADD7-A8DEE5433772}" dt="2021-07-21T11:36:38.712" v="1471" actId="478"/>
-          <ac:cxnSpMkLst>
-            <pc:docMk/>
-            <pc:sldMk cId="362378951" sldId="263"/>
-            <ac:cxnSpMk id="118" creationId="{AEB4E4B7-CC4C-4875-9903-014BD200A5DC}"/>
-          </ac:cxnSpMkLst>
-        </pc:cxnChg>
-        <pc:cxnChg chg="add del mod topLvl">
-          <ac:chgData name="Sebastian Meine" userId="f54488a2a6b7dc9e" providerId="LiveId" clId="{762C8129-56AC-41EC-ADD7-A8DEE5433772}" dt="2021-07-21T11:35:52.566" v="1470" actId="478"/>
-          <ac:cxnSpMkLst>
-            <pc:docMk/>
-            <pc:sldMk cId="362378951" sldId="263"/>
-            <ac:cxnSpMk id="119" creationId="{184527EA-91AC-47C0-9CAA-3D3057672776}"/>
-          </ac:cxnSpMkLst>
-        </pc:cxnChg>
-        <pc:cxnChg chg="add del mod topLvl">
-          <ac:chgData name="Sebastian Meine" userId="f54488a2a6b7dc9e" providerId="LiveId" clId="{762C8129-56AC-41EC-ADD7-A8DEE5433772}" dt="2021-07-21T11:36:38.712" v="1471" actId="478"/>
-          <ac:cxnSpMkLst>
-            <pc:docMk/>
-            <pc:sldMk cId="362378951" sldId="263"/>
-            <ac:cxnSpMk id="120" creationId="{1FFDA1DD-C077-4680-AA24-0C9A4853627F}"/>
-          </ac:cxnSpMkLst>
-        </pc:cxnChg>
-        <pc:cxnChg chg="add del mod topLvl">
-          <ac:chgData name="Sebastian Meine" userId="f54488a2a6b7dc9e" providerId="LiveId" clId="{762C8129-56AC-41EC-ADD7-A8DEE5433772}" dt="2021-07-21T11:36:38.712" v="1471" actId="478"/>
-          <ac:cxnSpMkLst>
-            <pc:docMk/>
-            <pc:sldMk cId="362378951" sldId="263"/>
-            <ac:cxnSpMk id="121" creationId="{74224497-0F7D-495D-A4DA-3DAE395521CE}"/>
-          </ac:cxnSpMkLst>
-        </pc:cxnChg>
-        <pc:cxnChg chg="add del mod topLvl">
-          <ac:chgData name="Sebastian Meine" userId="f54488a2a6b7dc9e" providerId="LiveId" clId="{762C8129-56AC-41EC-ADD7-A8DEE5433772}" dt="2021-07-21T11:35:52.566" v="1470" actId="478"/>
-          <ac:cxnSpMkLst>
-            <pc:docMk/>
-            <pc:sldMk cId="362378951" sldId="263"/>
-            <ac:cxnSpMk id="122" creationId="{75DD3674-22F2-424B-897C-1BEF90149A84}"/>
-          </ac:cxnSpMkLst>
-        </pc:cxnChg>
-        <pc:cxnChg chg="add del mod topLvl">
-          <ac:chgData name="Sebastian Meine" userId="f54488a2a6b7dc9e" providerId="LiveId" clId="{762C8129-56AC-41EC-ADD7-A8DEE5433772}" dt="2021-07-21T11:35:52.566" v="1470" actId="478"/>
-          <ac:cxnSpMkLst>
-            <pc:docMk/>
-            <pc:sldMk cId="362378951" sldId="263"/>
-            <ac:cxnSpMk id="123" creationId="{2EB260D9-22D4-4682-9393-FEE846165C41}"/>
-          </ac:cxnSpMkLst>
-        </pc:cxnChg>
-        <pc:cxnChg chg="add del mod topLvl">
-          <ac:chgData name="Sebastian Meine" userId="f54488a2a6b7dc9e" providerId="LiveId" clId="{762C8129-56AC-41EC-ADD7-A8DEE5433772}" dt="2021-07-21T11:36:38.712" v="1471" actId="478"/>
-          <ac:cxnSpMkLst>
-            <pc:docMk/>
-            <pc:sldMk cId="362378951" sldId="263"/>
-            <ac:cxnSpMk id="124" creationId="{C7BA54DF-D0C7-45A9-83C2-1AD500CB3E9E}"/>
-          </ac:cxnSpMkLst>
-        </pc:cxnChg>
-        <pc:cxnChg chg="add del mod topLvl">
-          <ac:chgData name="Sebastian Meine" userId="f54488a2a6b7dc9e" providerId="LiveId" clId="{762C8129-56AC-41EC-ADD7-A8DEE5433772}" dt="2021-07-21T11:35:52.566" v="1470" actId="478"/>
-          <ac:cxnSpMkLst>
-            <pc:docMk/>
-            <pc:sldMk cId="362378951" sldId="263"/>
-            <ac:cxnSpMk id="125" creationId="{91EE1DC4-E184-4DAB-A8CC-15BC134B5106}"/>
-          </ac:cxnSpMkLst>
-        </pc:cxnChg>
-        <pc:cxnChg chg="add del mod topLvl">
-          <ac:chgData name="Sebastian Meine" userId="f54488a2a6b7dc9e" providerId="LiveId" clId="{762C8129-56AC-41EC-ADD7-A8DEE5433772}" dt="2021-07-21T11:35:20.640" v="1462" actId="478"/>
-          <ac:cxnSpMkLst>
-            <pc:docMk/>
-            <pc:sldMk cId="362378951" sldId="263"/>
-            <ac:cxnSpMk id="126" creationId="{5B1E355E-84C8-4FFF-886F-BE2350CD5884}"/>
-          </ac:cxnSpMkLst>
-        </pc:cxnChg>
-        <pc:cxnChg chg="add del mod topLvl">
-          <ac:chgData name="Sebastian Meine" userId="f54488a2a6b7dc9e" providerId="LiveId" clId="{762C8129-56AC-41EC-ADD7-A8DEE5433772}" dt="2021-07-21T11:35:21.677" v="1463" actId="478"/>
-          <ac:cxnSpMkLst>
-            <pc:docMk/>
-            <pc:sldMk cId="362378951" sldId="263"/>
-            <ac:cxnSpMk id="127" creationId="{B7F335C2-6ECF-48B4-ADE2-696F9380E134}"/>
-          </ac:cxnSpMkLst>
-        </pc:cxnChg>
-        <pc:cxnChg chg="add del mod topLvl">
-          <ac:chgData name="Sebastian Meine" userId="f54488a2a6b7dc9e" providerId="LiveId" clId="{762C8129-56AC-41EC-ADD7-A8DEE5433772}" dt="2021-07-21T11:35:22.698" v="1464" actId="478"/>
-          <ac:cxnSpMkLst>
-            <pc:docMk/>
-            <pc:sldMk cId="362378951" sldId="263"/>
-            <ac:cxnSpMk id="128" creationId="{1C530278-2743-483F-B1D9-EEAD1476B3A8}"/>
-          </ac:cxnSpMkLst>
-        </pc:cxnChg>
-        <pc:cxnChg chg="add del mod topLvl">
-          <ac:chgData name="Sebastian Meine" userId="f54488a2a6b7dc9e" providerId="LiveId" clId="{762C8129-56AC-41EC-ADD7-A8DEE5433772}" dt="2021-07-21T11:35:23.404" v="1465" actId="478"/>
-          <ac:cxnSpMkLst>
-            <pc:docMk/>
-            <pc:sldMk cId="362378951" sldId="263"/>
-            <ac:cxnSpMk id="129" creationId="{EC9C998B-E07E-47BB-BC01-22A1B96321E5}"/>
-          </ac:cxnSpMkLst>
-        </pc:cxnChg>
-        <pc:cxnChg chg="add del mod topLvl">
-          <ac:chgData name="Sebastian Meine" userId="f54488a2a6b7dc9e" providerId="LiveId" clId="{762C8129-56AC-41EC-ADD7-A8DEE5433772}" dt="2021-07-21T11:35:24.297" v="1466" actId="478"/>
-          <ac:cxnSpMkLst>
-            <pc:docMk/>
-            <pc:sldMk cId="362378951" sldId="263"/>
-            <ac:cxnSpMk id="130" creationId="{F77C2736-08F1-451F-AB7D-17039071E728}"/>
-          </ac:cxnSpMkLst>
-        </pc:cxnChg>
-        <pc:cxnChg chg="add del mod topLvl">
-          <ac:chgData name="Sebastian Meine" userId="f54488a2a6b7dc9e" providerId="LiveId" clId="{762C8129-56AC-41EC-ADD7-A8DEE5433772}" dt="2021-07-21T11:35:25.312" v="1467" actId="478"/>
-          <ac:cxnSpMkLst>
-            <pc:docMk/>
-            <pc:sldMk cId="362378951" sldId="263"/>
-            <ac:cxnSpMk id="131" creationId="{DD4D6E6D-4EC3-4E24-831A-B4539B79C7BF}"/>
-          </ac:cxnSpMkLst>
-        </pc:cxnChg>
-        <pc:cxnChg chg="add mod topLvl">
-          <ac:chgData name="Sebastian Meine" userId="f54488a2a6b7dc9e" providerId="LiveId" clId="{762C8129-56AC-41EC-ADD7-A8DEE5433772}" dt="2021-07-21T11:25:17.710" v="1385" actId="1076"/>
-          <ac:cxnSpMkLst>
-            <pc:docMk/>
-            <pc:sldMk cId="362378951" sldId="263"/>
-            <ac:cxnSpMk id="133" creationId="{D4A04664-43DE-4D6D-8612-ED0EFFCB70BC}"/>
-          </ac:cxnSpMkLst>
-        </pc:cxnChg>
-        <pc:cxnChg chg="add mod">
-          <ac:chgData name="Sebastian Meine" userId="f54488a2a6b7dc9e" providerId="LiveId" clId="{762C8129-56AC-41EC-ADD7-A8DEE5433772}" dt="2021-07-21T11:12:15.534" v="986" actId="571"/>
-          <ac:cxnSpMkLst>
-            <pc:docMk/>
-            <pc:sldMk cId="362378951" sldId="263"/>
-            <ac:cxnSpMk id="137" creationId="{E45DAFFB-D025-4201-8EFE-678A3E5E2435}"/>
-          </ac:cxnSpMkLst>
-        </pc:cxnChg>
-        <pc:cxnChg chg="add mod">
-          <ac:chgData name="Sebastian Meine" userId="f54488a2a6b7dc9e" providerId="LiveId" clId="{762C8129-56AC-41EC-ADD7-A8DEE5433772}" dt="2021-07-21T11:12:15.534" v="986" actId="571"/>
-          <ac:cxnSpMkLst>
-            <pc:docMk/>
-            <pc:sldMk cId="362378951" sldId="263"/>
-            <ac:cxnSpMk id="139" creationId="{721E7C5D-F9CB-4FEB-A3DB-F32E8B3EA3EF}"/>
-          </ac:cxnSpMkLst>
-        </pc:cxnChg>
-        <pc:cxnChg chg="add mod">
-          <ac:chgData name="Sebastian Meine" userId="f54488a2a6b7dc9e" providerId="LiveId" clId="{762C8129-56AC-41EC-ADD7-A8DEE5433772}" dt="2021-07-21T11:12:15.534" v="986" actId="571"/>
-          <ac:cxnSpMkLst>
-            <pc:docMk/>
-            <pc:sldMk cId="362378951" sldId="263"/>
-            <ac:cxnSpMk id="141" creationId="{654962E0-6256-4BCD-B3E2-3FB11D640FBF}"/>
-          </ac:cxnSpMkLst>
-        </pc:cxnChg>
-        <pc:cxnChg chg="add mod">
-          <ac:chgData name="Sebastian Meine" userId="f54488a2a6b7dc9e" providerId="LiveId" clId="{762C8129-56AC-41EC-ADD7-A8DEE5433772}" dt="2021-07-21T11:12:15.534" v="986" actId="571"/>
-          <ac:cxnSpMkLst>
-            <pc:docMk/>
-            <pc:sldMk cId="362378951" sldId="263"/>
-            <ac:cxnSpMk id="142" creationId="{BB6CF6F0-BFBB-4B08-8F38-0BBA948631DD}"/>
-          </ac:cxnSpMkLst>
-        </pc:cxnChg>
-        <pc:cxnChg chg="add mod">
-          <ac:chgData name="Sebastian Meine" userId="f54488a2a6b7dc9e" providerId="LiveId" clId="{762C8129-56AC-41EC-ADD7-A8DEE5433772}" dt="2021-07-21T11:12:15.534" v="986" actId="571"/>
-          <ac:cxnSpMkLst>
-            <pc:docMk/>
-            <pc:sldMk cId="362378951" sldId="263"/>
-            <ac:cxnSpMk id="143" creationId="{D594E35F-1E97-4C51-9CA3-2AC13B4F57B7}"/>
-          </ac:cxnSpMkLst>
-        </pc:cxnChg>
-        <pc:cxnChg chg="add mod">
-          <ac:chgData name="Sebastian Meine" userId="f54488a2a6b7dc9e" providerId="LiveId" clId="{762C8129-56AC-41EC-ADD7-A8DEE5433772}" dt="2021-07-21T11:12:15.534" v="986" actId="571"/>
-          <ac:cxnSpMkLst>
-            <pc:docMk/>
-            <pc:sldMk cId="362378951" sldId="263"/>
-            <ac:cxnSpMk id="144" creationId="{A9E0F8B6-AEF7-44F8-B8E6-BA771A2E354D}"/>
-          </ac:cxnSpMkLst>
-        </pc:cxnChg>
-        <pc:cxnChg chg="add mod">
-          <ac:chgData name="Sebastian Meine" userId="f54488a2a6b7dc9e" providerId="LiveId" clId="{762C8129-56AC-41EC-ADD7-A8DEE5433772}" dt="2021-07-21T11:12:15.534" v="986" actId="571"/>
-          <ac:cxnSpMkLst>
-            <pc:docMk/>
-            <pc:sldMk cId="362378951" sldId="263"/>
-            <ac:cxnSpMk id="145" creationId="{2EDBAFA9-D285-476D-AF65-512CE9C62AA0}"/>
-          </ac:cxnSpMkLst>
-        </pc:cxnChg>
-        <pc:cxnChg chg="add mod">
-          <ac:chgData name="Sebastian Meine" userId="f54488a2a6b7dc9e" providerId="LiveId" clId="{762C8129-56AC-41EC-ADD7-A8DEE5433772}" dt="2021-07-21T11:12:15.534" v="986" actId="571"/>
-          <ac:cxnSpMkLst>
-            <pc:docMk/>
-            <pc:sldMk cId="362378951" sldId="263"/>
-            <ac:cxnSpMk id="146" creationId="{97AEF6BC-EF71-4FE3-A966-DF4BE0841FC2}"/>
-          </ac:cxnSpMkLst>
-        </pc:cxnChg>
-        <pc:cxnChg chg="add mod">
-          <ac:chgData name="Sebastian Meine" userId="f54488a2a6b7dc9e" providerId="LiveId" clId="{762C8129-56AC-41EC-ADD7-A8DEE5433772}" dt="2021-07-21T11:12:15.534" v="986" actId="571"/>
-          <ac:cxnSpMkLst>
-            <pc:docMk/>
-            <pc:sldMk cId="362378951" sldId="263"/>
-            <ac:cxnSpMk id="147" creationId="{021FAB41-21CE-412C-9757-33EFCDD9191E}"/>
-          </ac:cxnSpMkLst>
-        </pc:cxnChg>
-        <pc:cxnChg chg="add mod">
-          <ac:chgData name="Sebastian Meine" userId="f54488a2a6b7dc9e" providerId="LiveId" clId="{762C8129-56AC-41EC-ADD7-A8DEE5433772}" dt="2021-07-21T11:12:15.534" v="986" actId="571"/>
-          <ac:cxnSpMkLst>
-            <pc:docMk/>
-            <pc:sldMk cId="362378951" sldId="263"/>
-            <ac:cxnSpMk id="148" creationId="{B8EC6A24-1FC6-446E-9665-14186AFA4582}"/>
-          </ac:cxnSpMkLst>
-        </pc:cxnChg>
-        <pc:cxnChg chg="add mod">
-          <ac:chgData name="Sebastian Meine" userId="f54488a2a6b7dc9e" providerId="LiveId" clId="{762C8129-56AC-41EC-ADD7-A8DEE5433772}" dt="2021-07-21T11:12:15.534" v="986" actId="571"/>
-          <ac:cxnSpMkLst>
-            <pc:docMk/>
-            <pc:sldMk cId="362378951" sldId="263"/>
-            <ac:cxnSpMk id="149" creationId="{26349E5D-5F80-4310-95E1-28021AAB14B1}"/>
-          </ac:cxnSpMkLst>
-        </pc:cxnChg>
-        <pc:cxnChg chg="add mod">
-          <ac:chgData name="Sebastian Meine" userId="f54488a2a6b7dc9e" providerId="LiveId" clId="{762C8129-56AC-41EC-ADD7-A8DEE5433772}" dt="2021-07-21T11:12:15.534" v="986" actId="571"/>
-          <ac:cxnSpMkLst>
-            <pc:docMk/>
-            <pc:sldMk cId="362378951" sldId="263"/>
-            <ac:cxnSpMk id="150" creationId="{36C29BA8-0F2C-4F14-8D64-5DCAA6DCEF23}"/>
-          </ac:cxnSpMkLst>
-        </pc:cxnChg>
-        <pc:cxnChg chg="add mod">
-          <ac:chgData name="Sebastian Meine" userId="f54488a2a6b7dc9e" providerId="LiveId" clId="{762C8129-56AC-41EC-ADD7-A8DEE5433772}" dt="2021-07-21T11:12:15.534" v="986" actId="571"/>
-          <ac:cxnSpMkLst>
-            <pc:docMk/>
-            <pc:sldMk cId="362378951" sldId="263"/>
-            <ac:cxnSpMk id="151" creationId="{CCF44DFA-30D9-4691-B273-BF49E38D8233}"/>
-          </ac:cxnSpMkLst>
-        </pc:cxnChg>
-        <pc:cxnChg chg="add mod">
-          <ac:chgData name="Sebastian Meine" userId="f54488a2a6b7dc9e" providerId="LiveId" clId="{762C8129-56AC-41EC-ADD7-A8DEE5433772}" dt="2021-07-21T11:12:15.534" v="986" actId="571"/>
-          <ac:cxnSpMkLst>
-            <pc:docMk/>
-            <pc:sldMk cId="362378951" sldId="263"/>
-            <ac:cxnSpMk id="152" creationId="{E2D1EE7D-EDC2-4779-903A-DCD38F4243FD}"/>
-          </ac:cxnSpMkLst>
-        </pc:cxnChg>
-        <pc:cxnChg chg="add mod">
-          <ac:chgData name="Sebastian Meine" userId="f54488a2a6b7dc9e" providerId="LiveId" clId="{762C8129-56AC-41EC-ADD7-A8DEE5433772}" dt="2021-07-21T11:12:15.534" v="986" actId="571"/>
-          <ac:cxnSpMkLst>
-            <pc:docMk/>
-            <pc:sldMk cId="362378951" sldId="263"/>
-            <ac:cxnSpMk id="153" creationId="{D4F7D47B-6D87-401C-A446-5E0844A3BBD5}"/>
-          </ac:cxnSpMkLst>
-        </pc:cxnChg>
-        <pc:cxnChg chg="add mod">
-          <ac:chgData name="Sebastian Meine" userId="f54488a2a6b7dc9e" providerId="LiveId" clId="{762C8129-56AC-41EC-ADD7-A8DEE5433772}" dt="2021-07-21T11:12:15.534" v="986" actId="571"/>
-          <ac:cxnSpMkLst>
-            <pc:docMk/>
-            <pc:sldMk cId="362378951" sldId="263"/>
-            <ac:cxnSpMk id="154" creationId="{5842CEA3-C8A0-4D32-A3E0-93BD9B124D92}"/>
-          </ac:cxnSpMkLst>
-        </pc:cxnChg>
-        <pc:cxnChg chg="add mod">
-          <ac:chgData name="Sebastian Meine" userId="f54488a2a6b7dc9e" providerId="LiveId" clId="{762C8129-56AC-41EC-ADD7-A8DEE5433772}" dt="2021-07-21T11:12:15.534" v="986" actId="571"/>
-          <ac:cxnSpMkLst>
-            <pc:docMk/>
-            <pc:sldMk cId="362378951" sldId="263"/>
-            <ac:cxnSpMk id="155" creationId="{97FE16B8-5CAE-4C24-9520-15208BC25BEB}"/>
-          </ac:cxnSpMkLst>
-        </pc:cxnChg>
-        <pc:cxnChg chg="add mod">
-          <ac:chgData name="Sebastian Meine" userId="f54488a2a6b7dc9e" providerId="LiveId" clId="{762C8129-56AC-41EC-ADD7-A8DEE5433772}" dt="2021-07-21T11:12:15.534" v="986" actId="571"/>
-          <ac:cxnSpMkLst>
-            <pc:docMk/>
-            <pc:sldMk cId="362378951" sldId="263"/>
-            <ac:cxnSpMk id="156" creationId="{790571E1-C439-4288-BCDC-2D907CDBE472}"/>
-          </ac:cxnSpMkLst>
-        </pc:cxnChg>
-        <pc:cxnChg chg="add mod">
-          <ac:chgData name="Sebastian Meine" userId="f54488a2a6b7dc9e" providerId="LiveId" clId="{762C8129-56AC-41EC-ADD7-A8DEE5433772}" dt="2021-07-21T11:12:15.534" v="986" actId="571"/>
-          <ac:cxnSpMkLst>
-            <pc:docMk/>
-            <pc:sldMk cId="362378951" sldId="263"/>
-            <ac:cxnSpMk id="157" creationId="{CB3E2CC3-4D01-4025-B2D2-CAC269011DAE}"/>
-          </ac:cxnSpMkLst>
-        </pc:cxnChg>
-        <pc:cxnChg chg="add mod">
-          <ac:chgData name="Sebastian Meine" userId="f54488a2a6b7dc9e" providerId="LiveId" clId="{762C8129-56AC-41EC-ADD7-A8DEE5433772}" dt="2021-07-21T11:12:14.978" v="985" actId="571"/>
-          <ac:cxnSpMkLst>
-            <pc:docMk/>
-            <pc:sldMk cId="362378951" sldId="263"/>
-            <ac:cxnSpMk id="174" creationId="{F83BF8FE-F617-4503-B3EB-39E5416CB9AC}"/>
-          </ac:cxnSpMkLst>
-        </pc:cxnChg>
-        <pc:cxnChg chg="add mod">
-          <ac:chgData name="Sebastian Meine" userId="f54488a2a6b7dc9e" providerId="LiveId" clId="{762C8129-56AC-41EC-ADD7-A8DEE5433772}" dt="2021-07-21T11:12:14.978" v="985" actId="571"/>
-          <ac:cxnSpMkLst>
-            <pc:docMk/>
-            <pc:sldMk cId="362378951" sldId="263"/>
-            <ac:cxnSpMk id="175" creationId="{D938618D-574E-4730-A7CB-ABB16292E8F9}"/>
-          </ac:cxnSpMkLst>
-        </pc:cxnChg>
-        <pc:cxnChg chg="add mod">
-          <ac:chgData name="Sebastian Meine" userId="f54488a2a6b7dc9e" providerId="LiveId" clId="{762C8129-56AC-41EC-ADD7-A8DEE5433772}" dt="2021-07-21T11:12:14.978" v="985" actId="571"/>
-          <ac:cxnSpMkLst>
-            <pc:docMk/>
-            <pc:sldMk cId="362378951" sldId="263"/>
-            <ac:cxnSpMk id="177" creationId="{0D1EC9C5-DD96-4C5C-B30F-C72A321D9E75}"/>
-          </ac:cxnSpMkLst>
-        </pc:cxnChg>
-        <pc:cxnChg chg="add mod">
-          <ac:chgData name="Sebastian Meine" userId="f54488a2a6b7dc9e" providerId="LiveId" clId="{762C8129-56AC-41EC-ADD7-A8DEE5433772}" dt="2021-07-21T11:12:14.978" v="985" actId="571"/>
-          <ac:cxnSpMkLst>
-            <pc:docMk/>
-            <pc:sldMk cId="362378951" sldId="263"/>
-            <ac:cxnSpMk id="179" creationId="{4761D53E-BA6F-4009-B5F9-6E0875D1EB2A}"/>
-          </ac:cxnSpMkLst>
-        </pc:cxnChg>
-        <pc:cxnChg chg="add mod">
-          <ac:chgData name="Sebastian Meine" userId="f54488a2a6b7dc9e" providerId="LiveId" clId="{762C8129-56AC-41EC-ADD7-A8DEE5433772}" dt="2021-07-21T11:12:14.978" v="985" actId="571"/>
-          <ac:cxnSpMkLst>
-            <pc:docMk/>
-            <pc:sldMk cId="362378951" sldId="263"/>
-            <ac:cxnSpMk id="180" creationId="{7454FB4A-9937-49F6-A37F-744F1F7419AE}"/>
-          </ac:cxnSpMkLst>
-        </pc:cxnChg>
-        <pc:cxnChg chg="add mod">
-          <ac:chgData name="Sebastian Meine" userId="f54488a2a6b7dc9e" providerId="LiveId" clId="{762C8129-56AC-41EC-ADD7-A8DEE5433772}" dt="2021-07-21T11:12:14.978" v="985" actId="571"/>
-          <ac:cxnSpMkLst>
-            <pc:docMk/>
-            <pc:sldMk cId="362378951" sldId="263"/>
-            <ac:cxnSpMk id="181" creationId="{5F78F936-B03A-4B61-B839-A820C761EE29}"/>
-          </ac:cxnSpMkLst>
-        </pc:cxnChg>
-        <pc:cxnChg chg="add mod">
-          <ac:chgData name="Sebastian Meine" userId="f54488a2a6b7dc9e" providerId="LiveId" clId="{762C8129-56AC-41EC-ADD7-A8DEE5433772}" dt="2021-07-21T11:12:14.978" v="985" actId="571"/>
-          <ac:cxnSpMkLst>
-            <pc:docMk/>
-            <pc:sldMk cId="362378951" sldId="263"/>
-            <ac:cxnSpMk id="182" creationId="{650EDD3D-C5BB-43D9-B7FD-897F98D715D2}"/>
-          </ac:cxnSpMkLst>
-        </pc:cxnChg>
-        <pc:cxnChg chg="add mod">
-          <ac:chgData name="Sebastian Meine" userId="f54488a2a6b7dc9e" providerId="LiveId" clId="{762C8129-56AC-41EC-ADD7-A8DEE5433772}" dt="2021-07-21T11:12:14.978" v="985" actId="571"/>
-          <ac:cxnSpMkLst>
-            <pc:docMk/>
-            <pc:sldMk cId="362378951" sldId="263"/>
-            <ac:cxnSpMk id="183" creationId="{FC05760F-3CA7-4EB3-B403-88F4651C8570}"/>
-          </ac:cxnSpMkLst>
-        </pc:cxnChg>
-        <pc:cxnChg chg="add mod">
-          <ac:chgData name="Sebastian Meine" userId="f54488a2a6b7dc9e" providerId="LiveId" clId="{762C8129-56AC-41EC-ADD7-A8DEE5433772}" dt="2021-07-21T11:12:14.978" v="985" actId="571"/>
-          <ac:cxnSpMkLst>
-            <pc:docMk/>
-            <pc:sldMk cId="362378951" sldId="263"/>
-            <ac:cxnSpMk id="184" creationId="{0E9DA758-F250-49CD-8452-3A092D4BD22C}"/>
-          </ac:cxnSpMkLst>
-        </pc:cxnChg>
-        <pc:cxnChg chg="add mod">
-          <ac:chgData name="Sebastian Meine" userId="f54488a2a6b7dc9e" providerId="LiveId" clId="{762C8129-56AC-41EC-ADD7-A8DEE5433772}" dt="2021-07-21T11:12:14.978" v="985" actId="571"/>
-          <ac:cxnSpMkLst>
-            <pc:docMk/>
-            <pc:sldMk cId="362378951" sldId="263"/>
-            <ac:cxnSpMk id="185" creationId="{7E1EC040-9EBD-433B-944A-FF6A56B5D4A3}"/>
-          </ac:cxnSpMkLst>
-        </pc:cxnChg>
-        <pc:cxnChg chg="add mod">
-          <ac:chgData name="Sebastian Meine" userId="f54488a2a6b7dc9e" providerId="LiveId" clId="{762C8129-56AC-41EC-ADD7-A8DEE5433772}" dt="2021-07-21T11:12:14.978" v="985" actId="571"/>
-          <ac:cxnSpMkLst>
-            <pc:docMk/>
-            <pc:sldMk cId="362378951" sldId="263"/>
-            <ac:cxnSpMk id="186" creationId="{DE4928AC-0584-4E84-917B-F28BC84095E5}"/>
-          </ac:cxnSpMkLst>
-        </pc:cxnChg>
-        <pc:cxnChg chg="add mod">
-          <ac:chgData name="Sebastian Meine" userId="f54488a2a6b7dc9e" providerId="LiveId" clId="{762C8129-56AC-41EC-ADD7-A8DEE5433772}" dt="2021-07-21T11:12:14.978" v="985" actId="571"/>
-          <ac:cxnSpMkLst>
-            <pc:docMk/>
-            <pc:sldMk cId="362378951" sldId="263"/>
-            <ac:cxnSpMk id="187" creationId="{2F9A6ED6-E08D-4ED6-9DA7-69400889D21A}"/>
-          </ac:cxnSpMkLst>
-        </pc:cxnChg>
-        <pc:cxnChg chg="add mod">
-          <ac:chgData name="Sebastian Meine" userId="f54488a2a6b7dc9e" providerId="LiveId" clId="{762C8129-56AC-41EC-ADD7-A8DEE5433772}" dt="2021-07-21T11:12:14.978" v="985" actId="571"/>
-          <ac:cxnSpMkLst>
-            <pc:docMk/>
-            <pc:sldMk cId="362378951" sldId="263"/>
-            <ac:cxnSpMk id="188" creationId="{0898A8E4-50E1-4545-BAE9-FBFB63E1B8E2}"/>
-          </ac:cxnSpMkLst>
-        </pc:cxnChg>
-        <pc:cxnChg chg="add mod">
-          <ac:chgData name="Sebastian Meine" userId="f54488a2a6b7dc9e" providerId="LiveId" clId="{762C8129-56AC-41EC-ADD7-A8DEE5433772}" dt="2021-07-21T11:12:14.978" v="985" actId="571"/>
-          <ac:cxnSpMkLst>
-            <pc:docMk/>
-            <pc:sldMk cId="362378951" sldId="263"/>
-            <ac:cxnSpMk id="189" creationId="{682890B5-ADF3-44B6-977D-1311AEBC7B52}"/>
-          </ac:cxnSpMkLst>
-        </pc:cxnChg>
-        <pc:cxnChg chg="add mod">
-          <ac:chgData name="Sebastian Meine" userId="f54488a2a6b7dc9e" providerId="LiveId" clId="{762C8129-56AC-41EC-ADD7-A8DEE5433772}" dt="2021-07-21T11:12:14.978" v="985" actId="571"/>
-          <ac:cxnSpMkLst>
-            <pc:docMk/>
-            <pc:sldMk cId="362378951" sldId="263"/>
-            <ac:cxnSpMk id="190" creationId="{6D290FA0-FC8C-4FF3-8C99-3D7FE7DF6339}"/>
-          </ac:cxnSpMkLst>
-        </pc:cxnChg>
-        <pc:cxnChg chg="add mod">
-          <ac:chgData name="Sebastian Meine" userId="f54488a2a6b7dc9e" providerId="LiveId" clId="{762C8129-56AC-41EC-ADD7-A8DEE5433772}" dt="2021-07-21T11:12:14.978" v="985" actId="571"/>
-          <ac:cxnSpMkLst>
-            <pc:docMk/>
-            <pc:sldMk cId="362378951" sldId="263"/>
-            <ac:cxnSpMk id="191" creationId="{E3B35F09-E5E6-4D84-B330-493041DCAAB6}"/>
-          </ac:cxnSpMkLst>
-        </pc:cxnChg>
-        <pc:cxnChg chg="add mod">
-          <ac:chgData name="Sebastian Meine" userId="f54488a2a6b7dc9e" providerId="LiveId" clId="{762C8129-56AC-41EC-ADD7-A8DEE5433772}" dt="2021-07-21T11:12:14.978" v="985" actId="571"/>
-          <ac:cxnSpMkLst>
-            <pc:docMk/>
-            <pc:sldMk cId="362378951" sldId="263"/>
-            <ac:cxnSpMk id="192" creationId="{CEE58F86-3E46-423E-B68C-CD8FB4B5584E}"/>
-          </ac:cxnSpMkLst>
-        </pc:cxnChg>
-        <pc:cxnChg chg="add mod">
-          <ac:chgData name="Sebastian Meine" userId="f54488a2a6b7dc9e" providerId="LiveId" clId="{762C8129-56AC-41EC-ADD7-A8DEE5433772}" dt="2021-07-21T11:12:14.978" v="985" actId="571"/>
-          <ac:cxnSpMkLst>
-            <pc:docMk/>
-            <pc:sldMk cId="362378951" sldId="263"/>
-            <ac:cxnSpMk id="193" creationId="{46EEA459-AF53-4863-B9F6-E70329B0B365}"/>
-          </ac:cxnSpMkLst>
-        </pc:cxnChg>
-        <pc:cxnChg chg="add mod">
-          <ac:chgData name="Sebastian Meine" userId="f54488a2a6b7dc9e" providerId="LiveId" clId="{762C8129-56AC-41EC-ADD7-A8DEE5433772}" dt="2021-07-21T11:12:14.978" v="985" actId="571"/>
-          <ac:cxnSpMkLst>
-            <pc:docMk/>
-            <pc:sldMk cId="362378951" sldId="263"/>
-            <ac:cxnSpMk id="194" creationId="{78E35EFB-EC97-4799-B409-1B50B85A1F1C}"/>
-          </ac:cxnSpMkLst>
-        </pc:cxnChg>
-        <pc:cxnChg chg="add mod">
-          <ac:chgData name="Sebastian Meine" userId="f54488a2a6b7dc9e" providerId="LiveId" clId="{762C8129-56AC-41EC-ADD7-A8DEE5433772}" dt="2021-07-21T11:12:14.978" v="985" actId="571"/>
-          <ac:cxnSpMkLst>
-            <pc:docMk/>
-            <pc:sldMk cId="362378951" sldId="263"/>
-            <ac:cxnSpMk id="195" creationId="{C706C585-CF88-489E-A96C-8AA93CD5A6DE}"/>
-          </ac:cxnSpMkLst>
-        </pc:cxnChg>
-        <pc:cxnChg chg="add del">
-          <ac:chgData name="Sebastian Meine" userId="f54488a2a6b7dc9e" providerId="LiveId" clId="{762C8129-56AC-41EC-ADD7-A8DEE5433772}" dt="2021-07-21T11:22:40.952" v="1372" actId="11529"/>
-          <ac:cxnSpMkLst>
-            <pc:docMk/>
-            <pc:sldMk cId="362378951" sldId="263"/>
-            <ac:cxnSpMk id="197" creationId="{D3F7BC26-E73E-44EE-AD16-EC00CC42065A}"/>
-          </ac:cxnSpMkLst>
-        </pc:cxnChg>
-        <pc:cxnChg chg="add del">
-          <ac:chgData name="Sebastian Meine" userId="f54488a2a6b7dc9e" providerId="LiveId" clId="{762C8129-56AC-41EC-ADD7-A8DEE5433772}" dt="2021-07-21T11:23:04.575" v="1376" actId="478"/>
-          <ac:cxnSpMkLst>
-            <pc:docMk/>
-            <pc:sldMk cId="362378951" sldId="263"/>
-            <ac:cxnSpMk id="199" creationId="{ED8542D8-4AD3-4AF9-AC5B-8123E158E6D4}"/>
-          </ac:cxnSpMkLst>
-        </pc:cxnChg>
-        <pc:cxnChg chg="add del mod">
-          <ac:chgData name="Sebastian Meine" userId="f54488a2a6b7dc9e" providerId="LiveId" clId="{762C8129-56AC-41EC-ADD7-A8DEE5433772}" dt="2021-07-21T11:36:38.712" v="1471" actId="478"/>
-          <ac:cxnSpMkLst>
-            <pc:docMk/>
-            <pc:sldMk cId="362378951" sldId="263"/>
-            <ac:cxnSpMk id="200" creationId="{6BEFFDF0-5CA7-492E-89B4-84F24AF8297D}"/>
-          </ac:cxnSpMkLst>
-        </pc:cxnChg>
-        <pc:cxnChg chg="add del mod">
-          <ac:chgData name="Sebastian Meine" userId="f54488a2a6b7dc9e" providerId="LiveId" clId="{762C8129-56AC-41EC-ADD7-A8DEE5433772}" dt="2021-07-21T11:36:38.712" v="1471" actId="478"/>
-          <ac:cxnSpMkLst>
-            <pc:docMk/>
-            <pc:sldMk cId="362378951" sldId="263"/>
-            <ac:cxnSpMk id="201" creationId="{EE5E0DCA-B86E-4B83-BCBC-4781F40BE75B}"/>
-          </ac:cxnSpMkLst>
-        </pc:cxnChg>
-        <pc:cxnChg chg="add mod">
-          <ac:chgData name="Sebastian Meine" userId="f54488a2a6b7dc9e" providerId="LiveId" clId="{762C8129-56AC-41EC-ADD7-A8DEE5433772}" dt="2021-07-21T11:45:44.335" v="1570" actId="1076"/>
-          <ac:cxnSpMkLst>
-            <pc:docMk/>
-            <pc:sldMk cId="362378951" sldId="263"/>
-            <ac:cxnSpMk id="255" creationId="{20D4A4F4-223B-4BC5-9EF2-B1B020110540}"/>
-          </ac:cxnSpMkLst>
-        </pc:cxnChg>
-        <pc:cxnChg chg="add mod">
-          <ac:chgData name="Sebastian Meine" userId="f54488a2a6b7dc9e" providerId="LiveId" clId="{762C8129-56AC-41EC-ADD7-A8DEE5433772}" dt="2021-07-21T11:45:52.020" v="1571" actId="1076"/>
-          <ac:cxnSpMkLst>
-            <pc:docMk/>
-            <pc:sldMk cId="362378951" sldId="263"/>
-            <ac:cxnSpMk id="256" creationId="{8793CC38-00F7-48F2-ABDE-A148E43944EE}"/>
-          </ac:cxnSpMkLst>
-        </pc:cxnChg>
-      </pc:sldChg>
-      <pc:sldChg chg="addSp delSp modSp mod modAnim modNotesTx">
-        <pc:chgData name="Sebastian Meine" userId="f54488a2a6b7dc9e" providerId="LiveId" clId="{762C8129-56AC-41EC-ADD7-A8DEE5433772}" dt="2021-07-21T12:37:00.325" v="1952"/>
-        <pc:sldMkLst>
-          <pc:docMk/>
-          <pc:sldMk cId="301560968" sldId="264"/>
-        </pc:sldMkLst>
-        <pc:spChg chg="add del mod">
-          <ac:chgData name="Sebastian Meine" userId="f54488a2a6b7dc9e" providerId="LiveId" clId="{762C8129-56AC-41EC-ADD7-A8DEE5433772}" dt="2021-07-21T11:48:13.166" v="1579" actId="478"/>
-          <ac:spMkLst>
-            <pc:docMk/>
-            <pc:sldMk cId="301560968" sldId="264"/>
-            <ac:spMk id="3" creationId="{C4997BCA-02FF-490D-9FCC-91560F028483}"/>
-          </ac:spMkLst>
-        </pc:spChg>
-        <pc:spChg chg="add mod topLvl">
-          <ac:chgData name="Sebastian Meine" userId="f54488a2a6b7dc9e" providerId="LiveId" clId="{762C8129-56AC-41EC-ADD7-A8DEE5433772}" dt="2021-07-21T12:36:33.009" v="1949" actId="165"/>
-          <ac:spMkLst>
-            <pc:docMk/>
-            <pc:sldMk cId="301560968" sldId="264"/>
-            <ac:spMk id="4" creationId="{19812094-D1E7-4165-A8C9-F9374CD3E0A5}"/>
-          </ac:spMkLst>
-        </pc:spChg>
-        <pc:spChg chg="del">
-          <ac:chgData name="Sebastian Meine" userId="f54488a2a6b7dc9e" providerId="LiveId" clId="{762C8129-56AC-41EC-ADD7-A8DEE5433772}" dt="2021-07-21T11:48:06.211" v="1578" actId="478"/>
-          <ac:spMkLst>
-            <pc:docMk/>
-            <pc:sldMk cId="301560968" sldId="264"/>
-            <ac:spMk id="5" creationId="{BDF2C912-E02F-4E1F-82DF-351A88BA5B31}"/>
-          </ac:spMkLst>
-        </pc:spChg>
-        <pc:spChg chg="mod">
-          <ac:chgData name="Sebastian Meine" userId="f54488a2a6b7dc9e" providerId="LiveId" clId="{762C8129-56AC-41EC-ADD7-A8DEE5433772}" dt="2021-07-21T12:25:40.886" v="1770"/>
-          <ac:spMkLst>
-            <pc:docMk/>
-            <pc:sldMk cId="301560968" sldId="264"/>
-            <ac:spMk id="6" creationId="{67FD4DD5-46C1-4974-A569-BB95F27DCC4F}"/>
-          </ac:spMkLst>
-        </pc:spChg>
-        <pc:spChg chg="del">
-          <ac:chgData name="Sebastian Meine" userId="f54488a2a6b7dc9e" providerId="LiveId" clId="{762C8129-56AC-41EC-ADD7-A8DEE5433772}" dt="2021-07-21T11:48:15.805" v="1580" actId="478"/>
-          <ac:spMkLst>
-            <pc:docMk/>
-            <pc:sldMk cId="301560968" sldId="264"/>
-            <ac:spMk id="10" creationId="{690DB7ED-E155-43AE-8374-7155DA5DB857}"/>
-          </ac:spMkLst>
-        </pc:spChg>
-        <pc:spChg chg="add del mod">
-          <ac:chgData name="Sebastian Meine" userId="f54488a2a6b7dc9e" providerId="LiveId" clId="{762C8129-56AC-41EC-ADD7-A8DEE5433772}" dt="2021-07-21T11:48:18.854" v="1581" actId="478"/>
-          <ac:spMkLst>
-            <pc:docMk/>
-            <pc:sldMk cId="301560968" sldId="264"/>
-            <ac:spMk id="11" creationId="{6DBAB3B1-77AA-4893-96F9-D1DD3DA8FFA5}"/>
-          </ac:spMkLst>
-        </pc:spChg>
-        <pc:spChg chg="add mod">
-          <ac:chgData name="Sebastian Meine" userId="f54488a2a6b7dc9e" providerId="LiveId" clId="{762C8129-56AC-41EC-ADD7-A8DEE5433772}" dt="2021-07-21T12:14:23.454" v="1651" actId="20577"/>
-          <ac:spMkLst>
-            <pc:docMk/>
-            <pc:sldMk cId="301560968" sldId="264"/>
-            <ac:spMk id="12" creationId="{6772E62A-4790-40CC-B305-49388610D0DE}"/>
-          </ac:spMkLst>
-        </pc:spChg>
-        <pc:spChg chg="add del mod">
-          <ac:chgData name="Sebastian Meine" userId="f54488a2a6b7dc9e" providerId="LiveId" clId="{762C8129-56AC-41EC-ADD7-A8DEE5433772}" dt="2021-07-21T12:27:36.246" v="1789" actId="21"/>
-          <ac:spMkLst>
-            <pc:docMk/>
-            <pc:sldMk cId="301560968" sldId="264"/>
-            <ac:spMk id="13" creationId="{01F1B964-7570-4BF1-ACFF-2D319C55E4CA}"/>
-          </ac:spMkLst>
-        </pc:spChg>
-        <pc:spChg chg="add mod topLvl">
-          <ac:chgData name="Sebastian Meine" userId="f54488a2a6b7dc9e" providerId="LiveId" clId="{762C8129-56AC-41EC-ADD7-A8DEE5433772}" dt="2021-07-21T12:36:33.009" v="1949" actId="165"/>
-          <ac:spMkLst>
-            <pc:docMk/>
-            <pc:sldMk cId="301560968" sldId="264"/>
-            <ac:spMk id="14" creationId="{FFC261A3-1C9E-463D-AC85-FB2DCA619F40}"/>
-          </ac:spMkLst>
-        </pc:spChg>
-        <pc:spChg chg="add del mod">
-          <ac:chgData name="Sebastian Meine" userId="f54488a2a6b7dc9e" providerId="LiveId" clId="{762C8129-56AC-41EC-ADD7-A8DEE5433772}" dt="2021-07-21T12:30:56.161" v="1860" actId="478"/>
-          <ac:spMkLst>
-            <pc:docMk/>
-            <pc:sldMk cId="301560968" sldId="264"/>
-            <ac:spMk id="15" creationId="{2EA3E027-254D-40F1-B951-34F5BA3FF2D3}"/>
-          </ac:spMkLst>
-        </pc:spChg>
-        <pc:spChg chg="add del mod">
-          <ac:chgData name="Sebastian Meine" userId="f54488a2a6b7dc9e" providerId="LiveId" clId="{762C8129-56AC-41EC-ADD7-A8DEE5433772}" dt="2021-07-21T12:30:55.475" v="1859" actId="478"/>
-          <ac:spMkLst>
-            <pc:docMk/>
-            <pc:sldMk cId="301560968" sldId="264"/>
-            <ac:spMk id="16" creationId="{AB947B28-2052-40EE-ABFA-AFAD5CC2A2EE}"/>
-          </ac:spMkLst>
-        </pc:spChg>
-        <pc:spChg chg="add del mod">
-          <ac:chgData name="Sebastian Meine" userId="f54488a2a6b7dc9e" providerId="LiveId" clId="{762C8129-56AC-41EC-ADD7-A8DEE5433772}" dt="2021-07-21T12:30:55.475" v="1859" actId="478"/>
-          <ac:spMkLst>
-            <pc:docMk/>
-            <pc:sldMk cId="301560968" sldId="264"/>
-            <ac:spMk id="17" creationId="{2A5098C9-1D0D-46A0-BEB0-1D7F0B7490B8}"/>
-          </ac:spMkLst>
-        </pc:spChg>
-        <pc:spChg chg="add del mod topLvl">
-          <ac:chgData name="Sebastian Meine" userId="f54488a2a6b7dc9e" providerId="LiveId" clId="{762C8129-56AC-41EC-ADD7-A8DEE5433772}" dt="2021-07-21T12:36:33.009" v="1949" actId="165"/>
-          <ac:spMkLst>
-            <pc:docMk/>
-            <pc:sldMk cId="301560968" sldId="264"/>
-            <ac:spMk id="18" creationId="{733FAC86-D4B7-4C19-93A0-CB7973FD9526}"/>
-          </ac:spMkLst>
-        </pc:spChg>
-        <pc:spChg chg="add del mod topLvl">
-          <ac:chgData name="Sebastian Meine" userId="f54488a2a6b7dc9e" providerId="LiveId" clId="{762C8129-56AC-41EC-ADD7-A8DEE5433772}" dt="2021-07-21T12:36:33.009" v="1949" actId="165"/>
-          <ac:spMkLst>
-            <pc:docMk/>
-            <pc:sldMk cId="301560968" sldId="264"/>
-            <ac:spMk id="19" creationId="{3D541E82-5A44-4AB6-82DC-1DACADD3CC6D}"/>
-          </ac:spMkLst>
-        </pc:spChg>
-        <pc:spChg chg="add del mod topLvl">
-          <ac:chgData name="Sebastian Meine" userId="f54488a2a6b7dc9e" providerId="LiveId" clId="{762C8129-56AC-41EC-ADD7-A8DEE5433772}" dt="2021-07-21T12:36:33.009" v="1949" actId="165"/>
-          <ac:spMkLst>
-            <pc:docMk/>
-            <pc:sldMk cId="301560968" sldId="264"/>
-            <ac:spMk id="20" creationId="{347FEA3E-A9D5-413E-9392-92052CB836B3}"/>
-          </ac:spMkLst>
-        </pc:spChg>
-        <pc:spChg chg="add del mod">
-          <ac:chgData name="Sebastian Meine" userId="f54488a2a6b7dc9e" providerId="LiveId" clId="{762C8129-56AC-41EC-ADD7-A8DEE5433772}" dt="2021-07-21T12:30:59.815" v="1880"/>
-          <ac:spMkLst>
-            <pc:docMk/>
-            <pc:sldMk cId="301560968" sldId="264"/>
-            <ac:spMk id="21" creationId="{2108FB42-C6B3-4AAC-864D-05D04BD56594}"/>
-          </ac:spMkLst>
-        </pc:spChg>
-        <pc:spChg chg="add del mod">
-          <ac:chgData name="Sebastian Meine" userId="f54488a2a6b7dc9e" providerId="LiveId" clId="{762C8129-56AC-41EC-ADD7-A8DEE5433772}" dt="2021-07-21T12:30:59.815" v="1880"/>
-          <ac:spMkLst>
-            <pc:docMk/>
-            <pc:sldMk cId="301560968" sldId="264"/>
-            <ac:spMk id="22" creationId="{95492423-7A1D-457D-AB21-B5C9213951A9}"/>
-          </ac:spMkLst>
-        </pc:spChg>
-        <pc:spChg chg="add del mod">
-          <ac:chgData name="Sebastian Meine" userId="f54488a2a6b7dc9e" providerId="LiveId" clId="{762C8129-56AC-41EC-ADD7-A8DEE5433772}" dt="2021-07-21T12:30:59.594" v="1879"/>
-          <ac:spMkLst>
-            <pc:docMk/>
-            <pc:sldMk cId="301560968" sldId="264"/>
-            <ac:spMk id="23" creationId="{52667330-421D-4290-B1F8-FFEE6902FB1D}"/>
-          </ac:spMkLst>
-        </pc:spChg>
-        <pc:spChg chg="add del mod">
-          <ac:chgData name="Sebastian Meine" userId="f54488a2a6b7dc9e" providerId="LiveId" clId="{762C8129-56AC-41EC-ADD7-A8DEE5433772}" dt="2021-07-21T12:30:59.594" v="1879"/>
-          <ac:spMkLst>
-            <pc:docMk/>
-            <pc:sldMk cId="301560968" sldId="264"/>
-            <ac:spMk id="24" creationId="{86C8C93C-04F3-4EBE-8BD5-B46A5FEE4446}"/>
-          </ac:spMkLst>
-        </pc:spChg>
-        <pc:spChg chg="add mod">
-          <ac:chgData name="Sebastian Meine" userId="f54488a2a6b7dc9e" providerId="LiveId" clId="{762C8129-56AC-41EC-ADD7-A8DEE5433772}" dt="2021-07-21T12:36:02.978" v="1947" actId="1076"/>
-          <ac:spMkLst>
-            <pc:docMk/>
-            <pc:sldMk cId="301560968" sldId="264"/>
-            <ac:spMk id="26" creationId="{38265066-4A9F-4609-9233-9EA1F73B4DBE}"/>
-          </ac:spMkLst>
-        </pc:spChg>
-        <pc:grpChg chg="add del mod">
-          <ac:chgData name="Sebastian Meine" userId="f54488a2a6b7dc9e" providerId="LiveId" clId="{762C8129-56AC-41EC-ADD7-A8DEE5433772}" dt="2021-07-21T12:36:33.009" v="1949" actId="165"/>
-          <ac:grpSpMkLst>
-            <pc:docMk/>
-            <pc:sldMk cId="301560968" sldId="264"/>
-            <ac:grpSpMk id="25" creationId="{3E34EC59-EAAD-4B91-8B88-EBA33CDC9F4C}"/>
-          </ac:grpSpMkLst>
-        </pc:grpChg>
-      </pc:sldChg>
-      <pc:sldChg chg="addSp delSp modSp mod">
-        <pc:chgData name="Sebastian Meine" userId="f54488a2a6b7dc9e" providerId="LiveId" clId="{762C8129-56AC-41EC-ADD7-A8DEE5433772}" dt="2021-07-21T12:23:10.680" v="1740"/>
-        <pc:sldMkLst>
-          <pc:docMk/>
-          <pc:sldMk cId="2583088686" sldId="265"/>
-        </pc:sldMkLst>
-        <pc:spChg chg="add del mod">
-          <ac:chgData name="Sebastian Meine" userId="f54488a2a6b7dc9e" providerId="LiveId" clId="{762C8129-56AC-41EC-ADD7-A8DEE5433772}" dt="2021-07-21T12:23:01.520" v="1739" actId="478"/>
-          <ac:spMkLst>
-            <pc:docMk/>
-            <pc:sldMk cId="2583088686" sldId="265"/>
-            <ac:spMk id="3" creationId="{F2043F2D-3682-41EA-8011-9A35FD984FA4}"/>
-          </ac:spMkLst>
-        </pc:spChg>
-        <pc:spChg chg="del">
-          <ac:chgData name="Sebastian Meine" userId="f54488a2a6b7dc9e" providerId="LiveId" clId="{762C8129-56AC-41EC-ADD7-A8DEE5433772}" dt="2021-07-21T12:22:50.974" v="1737" actId="478"/>
-          <ac:spMkLst>
-            <pc:docMk/>
-            <pc:sldMk cId="2583088686" sldId="265"/>
-            <ac:spMk id="5" creationId="{BDF2C912-E02F-4E1F-82DF-351A88BA5B31}"/>
-          </ac:spMkLst>
-        </pc:spChg>
-        <pc:spChg chg="del">
-          <ac:chgData name="Sebastian Meine" userId="f54488a2a6b7dc9e" providerId="LiveId" clId="{762C8129-56AC-41EC-ADD7-A8DEE5433772}" dt="2021-07-21T12:22:49.823" v="1736" actId="478"/>
-          <ac:spMkLst>
-            <pc:docMk/>
-            <pc:sldMk cId="2583088686" sldId="265"/>
-            <ac:spMk id="10" creationId="{690DB7ED-E155-43AE-8374-7155DA5DB857}"/>
-          </ac:spMkLst>
-        </pc:spChg>
-        <pc:spChg chg="add mod">
-          <ac:chgData name="Sebastian Meine" userId="f54488a2a6b7dc9e" providerId="LiveId" clId="{762C8129-56AC-41EC-ADD7-A8DEE5433772}" dt="2021-07-21T12:23:10.680" v="1740"/>
-          <ac:spMkLst>
-            <pc:docMk/>
-            <pc:sldMk cId="2583088686" sldId="265"/>
-            <ac:spMk id="11" creationId="{B6318553-AE0A-4087-BF38-5C4151609CDE}"/>
-          </ac:spMkLst>
-        </pc:spChg>
-      </pc:sldChg>
-      <pc:sldChg chg="del">
-        <pc:chgData name="Sebastian Meine" userId="f54488a2a6b7dc9e" providerId="LiveId" clId="{762C8129-56AC-41EC-ADD7-A8DEE5433772}" dt="2021-07-21T12:50:23.092" v="1953" actId="47"/>
-        <pc:sldMkLst>
-          <pc:docMk/>
-          <pc:sldMk cId="4061852696" sldId="266"/>
-        </pc:sldMkLst>
-      </pc:sldChg>
-      <pc:sldChg chg="modSp del mod">
-        <pc:chgData name="Sebastian Meine" userId="f54488a2a6b7dc9e" providerId="LiveId" clId="{762C8129-56AC-41EC-ADD7-A8DEE5433772}" dt="2021-07-21T12:50:23.924" v="1954" actId="47"/>
-        <pc:sldMkLst>
-          <pc:docMk/>
-          <pc:sldMk cId="4132570687" sldId="267"/>
-        </pc:sldMkLst>
-        <pc:spChg chg="mod">
-          <ac:chgData name="Sebastian Meine" userId="f54488a2a6b7dc9e" providerId="LiveId" clId="{762C8129-56AC-41EC-ADD7-A8DEE5433772}" dt="2021-07-21T09:06:58.332" v="10" actId="1076"/>
-          <ac:spMkLst>
-            <pc:docMk/>
-            <pc:sldMk cId="4132570687" sldId="267"/>
-            <ac:spMk id="6" creationId="{67FD4DD5-46C1-4974-A569-BB95F27DCC4F}"/>
-          </ac:spMkLst>
-        </pc:spChg>
-      </pc:sldChg>
-      <pc:sldChg chg="del modNotesTx">
-        <pc:chgData name="Sebastian Meine" userId="f54488a2a6b7dc9e" providerId="LiveId" clId="{762C8129-56AC-41EC-ADD7-A8DEE5433772}" dt="2021-07-21T12:50:25.329" v="1955" actId="47"/>
-        <pc:sldMkLst>
-          <pc:docMk/>
-          <pc:sldMk cId="3832127478" sldId="268"/>
-        </pc:sldMkLst>
-      </pc:sldChg>
-    </pc:docChg>
-  </pc:docChgLst>
-  <pc:docChgLst>
     <pc:chgData name="Sebastian Meine" userId="f54488a2a6b7dc9e" providerId="LiveId" clId="{8A101DD7-8FB9-4D7A-87E8-10D597B9AFFD}"/>
     <pc:docChg chg="undo redo custSel addSld delSld modSld">
       <pc:chgData name="Sebastian Meine" userId="f54488a2a6b7dc9e" providerId="LiveId" clId="{8A101DD7-8FB9-4D7A-87E8-10D597B9AFFD}" dt="2021-07-20T19:39:34.708" v="1654"/>
@@ -2822,6 +776,2052 @@
             <pc:docMk/>
             <pc:sldMk cId="362378951" sldId="263"/>
             <ac:spMk id="11" creationId="{6B2275DD-736C-472F-9D1B-3BA6016BFD7F}"/>
+          </ac:spMkLst>
+        </pc:spChg>
+      </pc:sldChg>
+    </pc:docChg>
+  </pc:docChgLst>
+  <pc:docChgLst>
+    <pc:chgData name="Sebastian Meine" userId="f54488a2a6b7dc9e" providerId="LiveId" clId="{762C8129-56AC-41EC-ADD7-A8DEE5433772}"/>
+    <pc:docChg chg="undo redo custSel delSld modSld">
+      <pc:chgData name="Sebastian Meine" userId="f54488a2a6b7dc9e" providerId="LiveId" clId="{762C8129-56AC-41EC-ADD7-A8DEE5433772}" dt="2021-07-21T12:50:25.329" v="1955" actId="47"/>
+      <pc:docMkLst>
+        <pc:docMk/>
+      </pc:docMkLst>
+      <pc:sldChg chg="addSp delSp modSp mod delAnim modAnim">
+        <pc:chgData name="Sebastian Meine" userId="f54488a2a6b7dc9e" providerId="LiveId" clId="{762C8129-56AC-41EC-ADD7-A8DEE5433772}" dt="2021-07-21T12:35:41.887" v="1943" actId="478"/>
+        <pc:sldMkLst>
+          <pc:docMk/>
+          <pc:sldMk cId="2109793123" sldId="258"/>
+        </pc:sldMkLst>
+        <pc:spChg chg="mod">
+          <ac:chgData name="Sebastian Meine" userId="f54488a2a6b7dc9e" providerId="LiveId" clId="{762C8129-56AC-41EC-ADD7-A8DEE5433772}" dt="2021-07-21T10:06:02.075" v="15" actId="20577"/>
+          <ac:spMkLst>
+            <pc:docMk/>
+            <pc:sldMk cId="2109793123" sldId="258"/>
+            <ac:spMk id="5" creationId="{BDF2C912-E02F-4E1F-82DF-351A88BA5B31}"/>
+          </ac:spMkLst>
+        </pc:spChg>
+        <pc:spChg chg="mod">
+          <ac:chgData name="Sebastian Meine" userId="f54488a2a6b7dc9e" providerId="LiveId" clId="{762C8129-56AC-41EC-ADD7-A8DEE5433772}" dt="2021-07-21T12:14:40.255" v="1659" actId="20577"/>
+          <ac:spMkLst>
+            <pc:docMk/>
+            <pc:sldMk cId="2109793123" sldId="258"/>
+            <ac:spMk id="6" creationId="{67FD4DD5-46C1-4974-A569-BB95F27DCC4F}"/>
+          </ac:spMkLst>
+        </pc:spChg>
+        <pc:spChg chg="add del mod">
+          <ac:chgData name="Sebastian Meine" userId="f54488a2a6b7dc9e" providerId="LiveId" clId="{762C8129-56AC-41EC-ADD7-A8DEE5433772}" dt="2021-07-21T12:35:41.887" v="1943" actId="478"/>
+          <ac:spMkLst>
+            <pc:docMk/>
+            <pc:sldMk cId="2109793123" sldId="258"/>
+            <ac:spMk id="10" creationId="{94056F41-58DB-4319-B2B0-5E6A1EBD7407}"/>
+          </ac:spMkLst>
+        </pc:spChg>
+      </pc:sldChg>
+      <pc:sldChg chg="modSp">
+        <pc:chgData name="Sebastian Meine" userId="f54488a2a6b7dc9e" providerId="LiveId" clId="{762C8129-56AC-41EC-ADD7-A8DEE5433772}" dt="2021-07-21T08:50:15.407" v="8" actId="20577"/>
+        <pc:sldMkLst>
+          <pc:docMk/>
+          <pc:sldMk cId="3097966872" sldId="261"/>
+        </pc:sldMkLst>
+        <pc:spChg chg="mod">
+          <ac:chgData name="Sebastian Meine" userId="f54488a2a6b7dc9e" providerId="LiveId" clId="{762C8129-56AC-41EC-ADD7-A8DEE5433772}" dt="2021-07-21T08:50:15.407" v="8" actId="20577"/>
+          <ac:spMkLst>
+            <pc:docMk/>
+            <pc:sldMk cId="3097966872" sldId="261"/>
+            <ac:spMk id="2" creationId="{87B2046A-71C6-4A5C-90F4-24A921FBE6F2}"/>
+          </ac:spMkLst>
+        </pc:spChg>
+      </pc:sldChg>
+      <pc:sldChg chg="addSp delSp modSp mod addAnim delAnim modAnim">
+        <pc:chgData name="Sebastian Meine" userId="f54488a2a6b7dc9e" providerId="LiveId" clId="{762C8129-56AC-41EC-ADD7-A8DEE5433772}" dt="2021-07-21T11:47:02.551" v="1576"/>
+        <pc:sldMkLst>
+          <pc:docMk/>
+          <pc:sldMk cId="362378951" sldId="263"/>
+        </pc:sldMkLst>
+        <pc:spChg chg="add mod topLvl">
+          <ac:chgData name="Sebastian Meine" userId="f54488a2a6b7dc9e" providerId="LiveId" clId="{762C8129-56AC-41EC-ADD7-A8DEE5433772}" dt="2021-07-21T11:32:30.687" v="1432" actId="20577"/>
+          <ac:spMkLst>
+            <pc:docMk/>
+            <pc:sldMk cId="362378951" sldId="263"/>
+            <ac:spMk id="2" creationId="{972B3F78-D113-4547-A50D-DA495A29AB68}"/>
+          </ac:spMkLst>
+        </pc:spChg>
+        <pc:spChg chg="mod">
+          <ac:chgData name="Sebastian Meine" userId="f54488a2a6b7dc9e" providerId="LiveId" clId="{762C8129-56AC-41EC-ADD7-A8DEE5433772}" dt="2021-07-21T10:41:08.472" v="163"/>
+          <ac:spMkLst>
+            <pc:docMk/>
+            <pc:sldMk cId="362378951" sldId="263"/>
+            <ac:spMk id="5" creationId="{BDF2C912-E02F-4E1F-82DF-351A88BA5B31}"/>
+          </ac:spMkLst>
+        </pc:spChg>
+        <pc:spChg chg="mod ord">
+          <ac:chgData name="Sebastian Meine" userId="f54488a2a6b7dc9e" providerId="LiveId" clId="{762C8129-56AC-41EC-ADD7-A8DEE5433772}" dt="2021-07-21T11:21:30.368" v="1364" actId="167"/>
+          <ac:spMkLst>
+            <pc:docMk/>
+            <pc:sldMk cId="362378951" sldId="263"/>
+            <ac:spMk id="6" creationId="{67FD4DD5-46C1-4974-A569-BB95F27DCC4F}"/>
+          </ac:spMkLst>
+        </pc:spChg>
+        <pc:spChg chg="mod">
+          <ac:chgData name="Sebastian Meine" userId="f54488a2a6b7dc9e" providerId="LiveId" clId="{762C8129-56AC-41EC-ADD7-A8DEE5433772}" dt="2021-07-21T11:35:30.617" v="1469" actId="1076"/>
+          <ac:spMkLst>
+            <pc:docMk/>
+            <pc:sldMk cId="362378951" sldId="263"/>
+            <ac:spMk id="9" creationId="{4CB1546C-41E9-4CE9-A31D-18CB078FE5F0}"/>
+          </ac:spMkLst>
+        </pc:spChg>
+        <pc:spChg chg="add mod ord topLvl">
+          <ac:chgData name="Sebastian Meine" userId="f54488a2a6b7dc9e" providerId="LiveId" clId="{762C8129-56AC-41EC-ADD7-A8DEE5433772}" dt="2021-07-21T11:36:59.763" v="1474" actId="14100"/>
+          <ac:spMkLst>
+            <pc:docMk/>
+            <pc:sldMk cId="362378951" sldId="263"/>
+            <ac:spMk id="10" creationId="{03AE95DF-D228-4672-978C-1FFC5CEDC9A5}"/>
+          </ac:spMkLst>
+        </pc:spChg>
+        <pc:spChg chg="add mod ord topLvl">
+          <ac:chgData name="Sebastian Meine" userId="f54488a2a6b7dc9e" providerId="LiveId" clId="{762C8129-56AC-41EC-ADD7-A8DEE5433772}" dt="2021-07-21T11:36:51.739" v="1473" actId="14100"/>
+          <ac:spMkLst>
+            <pc:docMk/>
+            <pc:sldMk cId="362378951" sldId="263"/>
+            <ac:spMk id="11" creationId="{C28B403F-3451-484A-80FC-1EB5977D2530}"/>
+          </ac:spMkLst>
+        </pc:spChg>
+        <pc:spChg chg="add mod ord topLvl">
+          <ac:chgData name="Sebastian Meine" userId="f54488a2a6b7dc9e" providerId="LiveId" clId="{762C8129-56AC-41EC-ADD7-A8DEE5433772}" dt="2021-07-21T11:34:07.556" v="1461" actId="20577"/>
+          <ac:spMkLst>
+            <pc:docMk/>
+            <pc:sldMk cId="362378951" sldId="263"/>
+            <ac:spMk id="12" creationId="{7C3189DC-042F-4794-9BC2-797D08FF8DFE}"/>
+          </ac:spMkLst>
+        </pc:spChg>
+        <pc:spChg chg="add mod topLvl">
+          <ac:chgData name="Sebastian Meine" userId="f54488a2a6b7dc9e" providerId="LiveId" clId="{762C8129-56AC-41EC-ADD7-A8DEE5433772}" dt="2021-07-21T11:22:05.052" v="1368" actId="14100"/>
+          <ac:spMkLst>
+            <pc:docMk/>
+            <pc:sldMk cId="362378951" sldId="263"/>
+            <ac:spMk id="13" creationId="{4B4A749B-73C6-4A7F-BCE7-F97651B563B2}"/>
+          </ac:spMkLst>
+        </pc:spChg>
+        <pc:spChg chg="add mod topLvl">
+          <ac:chgData name="Sebastian Meine" userId="f54488a2a6b7dc9e" providerId="LiveId" clId="{762C8129-56AC-41EC-ADD7-A8DEE5433772}" dt="2021-07-21T11:42:19.087" v="1548" actId="1076"/>
+          <ac:spMkLst>
+            <pc:docMk/>
+            <pc:sldMk cId="362378951" sldId="263"/>
+            <ac:spMk id="14" creationId="{6E7AB4E2-E257-4BF5-BBA2-234F02910BD3}"/>
+          </ac:spMkLst>
+        </pc:spChg>
+        <pc:spChg chg="add mod topLvl">
+          <ac:chgData name="Sebastian Meine" userId="f54488a2a6b7dc9e" providerId="LiveId" clId="{762C8129-56AC-41EC-ADD7-A8DEE5433772}" dt="2021-07-21T11:43:54.729" v="1559" actId="1076"/>
+          <ac:spMkLst>
+            <pc:docMk/>
+            <pc:sldMk cId="362378951" sldId="263"/>
+            <ac:spMk id="15" creationId="{C1625AF7-F147-4389-93F1-490D89FF0FF8}"/>
+          </ac:spMkLst>
+        </pc:spChg>
+        <pc:spChg chg="add mod topLvl">
+          <ac:chgData name="Sebastian Meine" userId="f54488a2a6b7dc9e" providerId="LiveId" clId="{762C8129-56AC-41EC-ADD7-A8DEE5433772}" dt="2021-07-21T11:41:36.101" v="1542" actId="1076"/>
+          <ac:spMkLst>
+            <pc:docMk/>
+            <pc:sldMk cId="362378951" sldId="263"/>
+            <ac:spMk id="16" creationId="{C02D97ED-276C-4037-A4C6-62BC25219E64}"/>
+          </ac:spMkLst>
+        </pc:spChg>
+        <pc:spChg chg="add mod topLvl">
+          <ac:chgData name="Sebastian Meine" userId="f54488a2a6b7dc9e" providerId="LiveId" clId="{762C8129-56AC-41EC-ADD7-A8DEE5433772}" dt="2021-07-21T11:41:46.587" v="1544" actId="1076"/>
+          <ac:spMkLst>
+            <pc:docMk/>
+            <pc:sldMk cId="362378951" sldId="263"/>
+            <ac:spMk id="17" creationId="{22F7E587-EA14-4A8A-B0D4-F8ACCB0753E6}"/>
+          </ac:spMkLst>
+        </pc:spChg>
+        <pc:spChg chg="add mod topLvl">
+          <ac:chgData name="Sebastian Meine" userId="f54488a2a6b7dc9e" providerId="LiveId" clId="{762C8129-56AC-41EC-ADD7-A8DEE5433772}" dt="2021-07-21T11:42:08.650" v="1547" actId="1076"/>
+          <ac:spMkLst>
+            <pc:docMk/>
+            <pc:sldMk cId="362378951" sldId="263"/>
+            <ac:spMk id="18" creationId="{0FD847A6-D71C-4FF9-B033-84EFB64C863D}"/>
+          </ac:spMkLst>
+        </pc:spChg>
+        <pc:spChg chg="add mod topLvl">
+          <ac:chgData name="Sebastian Meine" userId="f54488a2a6b7dc9e" providerId="LiveId" clId="{762C8129-56AC-41EC-ADD7-A8DEE5433772}" dt="2021-07-21T11:41:36.101" v="1542" actId="1076"/>
+          <ac:spMkLst>
+            <pc:docMk/>
+            <pc:sldMk cId="362378951" sldId="263"/>
+            <ac:spMk id="19" creationId="{D2748CB7-70B6-4631-B8D7-D679978202FA}"/>
+          </ac:spMkLst>
+        </pc:spChg>
+        <pc:spChg chg="add mod topLvl">
+          <ac:chgData name="Sebastian Meine" userId="f54488a2a6b7dc9e" providerId="LiveId" clId="{762C8129-56AC-41EC-ADD7-A8DEE5433772}" dt="2021-07-21T11:41:46.587" v="1544" actId="1076"/>
+          <ac:spMkLst>
+            <pc:docMk/>
+            <pc:sldMk cId="362378951" sldId="263"/>
+            <ac:spMk id="20" creationId="{E765D55A-AE9A-4B17-8080-2C7734357AFD}"/>
+          </ac:spMkLst>
+        </pc:spChg>
+        <pc:spChg chg="add mod topLvl">
+          <ac:chgData name="Sebastian Meine" userId="f54488a2a6b7dc9e" providerId="LiveId" clId="{762C8129-56AC-41EC-ADD7-A8DEE5433772}" dt="2021-07-21T11:42:00.653" v="1546" actId="1076"/>
+          <ac:spMkLst>
+            <pc:docMk/>
+            <pc:sldMk cId="362378951" sldId="263"/>
+            <ac:spMk id="21" creationId="{BAD82757-60C4-4AC2-A91A-FE7E6E75396E}"/>
+          </ac:spMkLst>
+        </pc:spChg>
+        <pc:spChg chg="add mod topLvl">
+          <ac:chgData name="Sebastian Meine" userId="f54488a2a6b7dc9e" providerId="LiveId" clId="{762C8129-56AC-41EC-ADD7-A8DEE5433772}" dt="2021-07-21T11:41:27.372" v="1541" actId="1076"/>
+          <ac:spMkLst>
+            <pc:docMk/>
+            <pc:sldMk cId="362378951" sldId="263"/>
+            <ac:spMk id="22" creationId="{636C562F-4FA9-44B2-9E93-867CAF8E3554}"/>
+          </ac:spMkLst>
+        </pc:spChg>
+        <pc:spChg chg="add mod topLvl">
+          <ac:chgData name="Sebastian Meine" userId="f54488a2a6b7dc9e" providerId="LiveId" clId="{762C8129-56AC-41EC-ADD7-A8DEE5433772}" dt="2021-07-21T11:41:41.099" v="1543" actId="1076"/>
+          <ac:spMkLst>
+            <pc:docMk/>
+            <pc:sldMk cId="362378951" sldId="263"/>
+            <ac:spMk id="23" creationId="{D01852CB-B47F-4D6F-B9CE-D5399277C9C6}"/>
+          </ac:spMkLst>
+        </pc:spChg>
+        <pc:spChg chg="add mod topLvl">
+          <ac:chgData name="Sebastian Meine" userId="f54488a2a6b7dc9e" providerId="LiveId" clId="{762C8129-56AC-41EC-ADD7-A8DEE5433772}" dt="2021-07-21T11:42:00.653" v="1546" actId="1076"/>
+          <ac:spMkLst>
+            <pc:docMk/>
+            <pc:sldMk cId="362378951" sldId="263"/>
+            <ac:spMk id="24" creationId="{DE1326DD-5D51-4EF4-B701-21E504D23AB6}"/>
+          </ac:spMkLst>
+        </pc:spChg>
+        <pc:spChg chg="add mod topLvl">
+          <ac:chgData name="Sebastian Meine" userId="f54488a2a6b7dc9e" providerId="LiveId" clId="{762C8129-56AC-41EC-ADD7-A8DEE5433772}" dt="2021-07-21T11:41:27.372" v="1541" actId="1076"/>
+          <ac:spMkLst>
+            <pc:docMk/>
+            <pc:sldMk cId="362378951" sldId="263"/>
+            <ac:spMk id="25" creationId="{5C8A6270-3BFF-4726-8013-23AAFA66FB4C}"/>
+          </ac:spMkLst>
+        </pc:spChg>
+        <pc:spChg chg="add mod topLvl">
+          <ac:chgData name="Sebastian Meine" userId="f54488a2a6b7dc9e" providerId="LiveId" clId="{762C8129-56AC-41EC-ADD7-A8DEE5433772}" dt="2021-07-21T11:41:41.099" v="1543" actId="1076"/>
+          <ac:spMkLst>
+            <pc:docMk/>
+            <pc:sldMk cId="362378951" sldId="263"/>
+            <ac:spMk id="26" creationId="{FB2A26EF-B1FF-480C-B90B-6FD14DF4A762}"/>
+          </ac:spMkLst>
+        </pc:spChg>
+        <pc:spChg chg="add mod topLvl">
+          <ac:chgData name="Sebastian Meine" userId="f54488a2a6b7dc9e" providerId="LiveId" clId="{762C8129-56AC-41EC-ADD7-A8DEE5433772}" dt="2021-07-21T11:41:55.596" v="1545" actId="1076"/>
+          <ac:spMkLst>
+            <pc:docMk/>
+            <pc:sldMk cId="362378951" sldId="263"/>
+            <ac:spMk id="27" creationId="{F6A35869-32AF-4309-98F0-4331D6006EEF}"/>
+          </ac:spMkLst>
+        </pc:spChg>
+        <pc:spChg chg="add mod topLvl">
+          <ac:chgData name="Sebastian Meine" userId="f54488a2a6b7dc9e" providerId="LiveId" clId="{762C8129-56AC-41EC-ADD7-A8DEE5433772}" dt="2021-07-21T11:41:21.306" v="1540" actId="1076"/>
+          <ac:spMkLst>
+            <pc:docMk/>
+            <pc:sldMk cId="362378951" sldId="263"/>
+            <ac:spMk id="28" creationId="{0742766D-510A-43EA-8D4A-5B2291F4EBEC}"/>
+          </ac:spMkLst>
+        </pc:spChg>
+        <pc:spChg chg="add mod topLvl">
+          <ac:chgData name="Sebastian Meine" userId="f54488a2a6b7dc9e" providerId="LiveId" clId="{762C8129-56AC-41EC-ADD7-A8DEE5433772}" dt="2021-07-21T11:41:41.099" v="1543" actId="1076"/>
+          <ac:spMkLst>
+            <pc:docMk/>
+            <pc:sldMk cId="362378951" sldId="263"/>
+            <ac:spMk id="29" creationId="{8C532347-BD26-4199-BA1C-D040162B14D3}"/>
+          </ac:spMkLst>
+        </pc:spChg>
+        <pc:spChg chg="add mod topLvl">
+          <ac:chgData name="Sebastian Meine" userId="f54488a2a6b7dc9e" providerId="LiveId" clId="{762C8129-56AC-41EC-ADD7-A8DEE5433772}" dt="2021-07-21T11:41:55.596" v="1545" actId="1076"/>
+          <ac:spMkLst>
+            <pc:docMk/>
+            <pc:sldMk cId="362378951" sldId="263"/>
+            <ac:spMk id="30" creationId="{2E91BC08-61A1-440A-B267-6B0297178F95}"/>
+          </ac:spMkLst>
+        </pc:spChg>
+        <pc:spChg chg="add mod topLvl">
+          <ac:chgData name="Sebastian Meine" userId="f54488a2a6b7dc9e" providerId="LiveId" clId="{762C8129-56AC-41EC-ADD7-A8DEE5433772}" dt="2021-07-21T11:41:21.306" v="1540" actId="1076"/>
+          <ac:spMkLst>
+            <pc:docMk/>
+            <pc:sldMk cId="362378951" sldId="263"/>
+            <ac:spMk id="31" creationId="{3B7C6BF5-5FE5-4289-8083-A86866D97CEF}"/>
+          </ac:spMkLst>
+        </pc:spChg>
+        <pc:spChg chg="add mod topLvl">
+          <ac:chgData name="Sebastian Meine" userId="f54488a2a6b7dc9e" providerId="LiveId" clId="{762C8129-56AC-41EC-ADD7-A8DEE5433772}" dt="2021-07-21T11:41:02.962" v="1535" actId="1076"/>
+          <ac:spMkLst>
+            <pc:docMk/>
+            <pc:sldMk cId="362378951" sldId="263"/>
+            <ac:spMk id="32" creationId="{EF30DFCD-0DA1-4DB2-8304-82FDB639F5B6}"/>
+          </ac:spMkLst>
+        </pc:spChg>
+        <pc:spChg chg="add mod topLvl">
+          <ac:chgData name="Sebastian Meine" userId="f54488a2a6b7dc9e" providerId="LiveId" clId="{762C8129-56AC-41EC-ADD7-A8DEE5433772}" dt="2021-07-21T11:21:47.861" v="1365" actId="1076"/>
+          <ac:spMkLst>
+            <pc:docMk/>
+            <pc:sldMk cId="362378951" sldId="263"/>
+            <ac:spMk id="33" creationId="{401C70BE-B278-47CA-A82D-700F9E169DFA}"/>
+          </ac:spMkLst>
+        </pc:spChg>
+        <pc:spChg chg="add mod topLvl">
+          <ac:chgData name="Sebastian Meine" userId="f54488a2a6b7dc9e" providerId="LiveId" clId="{762C8129-56AC-41EC-ADD7-A8DEE5433772}" dt="2021-07-21T11:41:09.476" v="1537" actId="1076"/>
+          <ac:spMkLst>
+            <pc:docMk/>
+            <pc:sldMk cId="362378951" sldId="263"/>
+            <ac:spMk id="34" creationId="{05B1A237-A1A9-4A9F-A279-465474E76F71}"/>
+          </ac:spMkLst>
+        </pc:spChg>
+        <pc:spChg chg="add mod topLvl">
+          <ac:chgData name="Sebastian Meine" userId="f54488a2a6b7dc9e" providerId="LiveId" clId="{762C8129-56AC-41EC-ADD7-A8DEE5433772}" dt="2021-07-21T11:40:58.840" v="1534" actId="1076"/>
+          <ac:spMkLst>
+            <pc:docMk/>
+            <pc:sldMk cId="362378951" sldId="263"/>
+            <ac:spMk id="35" creationId="{740712E7-2808-44D4-95D1-E2089CF3F982}"/>
+          </ac:spMkLst>
+        </pc:spChg>
+        <pc:spChg chg="add mod topLvl">
+          <ac:chgData name="Sebastian Meine" userId="f54488a2a6b7dc9e" providerId="LiveId" clId="{762C8129-56AC-41EC-ADD7-A8DEE5433772}" dt="2021-07-21T11:40:10.401" v="1527" actId="1076"/>
+          <ac:spMkLst>
+            <pc:docMk/>
+            <pc:sldMk cId="362378951" sldId="263"/>
+            <ac:spMk id="36" creationId="{AA74FA46-7716-430E-907F-4E41CA8F613E}"/>
+          </ac:spMkLst>
+        </pc:spChg>
+        <pc:spChg chg="add mod topLvl">
+          <ac:chgData name="Sebastian Meine" userId="f54488a2a6b7dc9e" providerId="LiveId" clId="{762C8129-56AC-41EC-ADD7-A8DEE5433772}" dt="2021-07-21T11:41:05.142" v="1536" actId="1076"/>
+          <ac:spMkLst>
+            <pc:docMk/>
+            <pc:sldMk cId="362378951" sldId="263"/>
+            <ac:spMk id="37" creationId="{97055284-4E0C-4420-81E7-911298325F8D}"/>
+          </ac:spMkLst>
+        </pc:spChg>
+        <pc:spChg chg="add mod topLvl">
+          <ac:chgData name="Sebastian Meine" userId="f54488a2a6b7dc9e" providerId="LiveId" clId="{762C8129-56AC-41EC-ADD7-A8DEE5433772}" dt="2021-07-21T11:40:05.914" v="1525" actId="1076"/>
+          <ac:spMkLst>
+            <pc:docMk/>
+            <pc:sldMk cId="362378951" sldId="263"/>
+            <ac:spMk id="38" creationId="{6C25D959-E36E-4425-BF0D-589CDF7CCEB9}"/>
+          </ac:spMkLst>
+        </pc:spChg>
+        <pc:spChg chg="add mod topLvl">
+          <ac:chgData name="Sebastian Meine" userId="f54488a2a6b7dc9e" providerId="LiveId" clId="{762C8129-56AC-41EC-ADD7-A8DEE5433772}" dt="2021-07-21T11:40:07.527" v="1526" actId="1076"/>
+          <ac:spMkLst>
+            <pc:docMk/>
+            <pc:sldMk cId="362378951" sldId="263"/>
+            <ac:spMk id="39" creationId="{4033A8F9-B753-4118-8A25-5103CA6A8F35}"/>
+          </ac:spMkLst>
+        </pc:spChg>
+        <pc:spChg chg="add mod topLvl">
+          <ac:chgData name="Sebastian Meine" userId="f54488a2a6b7dc9e" providerId="LiveId" clId="{762C8129-56AC-41EC-ADD7-A8DEE5433772}" dt="2021-07-21T11:40:03.346" v="1524" actId="1076"/>
+          <ac:spMkLst>
+            <pc:docMk/>
+            <pc:sldMk cId="362378951" sldId="263"/>
+            <ac:spMk id="40" creationId="{2F60C297-08E2-4CB9-B754-E7E8C217F88E}"/>
+          </ac:spMkLst>
+        </pc:spChg>
+        <pc:spChg chg="add mod topLvl">
+          <ac:chgData name="Sebastian Meine" userId="f54488a2a6b7dc9e" providerId="LiveId" clId="{762C8129-56AC-41EC-ADD7-A8DEE5433772}" dt="2021-07-21T11:39:52.840" v="1522" actId="1076"/>
+          <ac:spMkLst>
+            <pc:docMk/>
+            <pc:sldMk cId="362378951" sldId="263"/>
+            <ac:spMk id="41" creationId="{2366BB95-A9E9-429E-8F35-E3DF06E4D9B3}"/>
+          </ac:spMkLst>
+        </pc:spChg>
+        <pc:spChg chg="add mod topLvl">
+          <ac:chgData name="Sebastian Meine" userId="f54488a2a6b7dc9e" providerId="LiveId" clId="{762C8129-56AC-41EC-ADD7-A8DEE5433772}" dt="2021-07-21T11:39:31.244" v="1517" actId="1076"/>
+          <ac:spMkLst>
+            <pc:docMk/>
+            <pc:sldMk cId="362378951" sldId="263"/>
+            <ac:spMk id="42" creationId="{AA7B3EDB-2A75-47B7-9985-806E8370EB25}"/>
+          </ac:spMkLst>
+        </pc:spChg>
+        <pc:spChg chg="add mod topLvl">
+          <ac:chgData name="Sebastian Meine" userId="f54488a2a6b7dc9e" providerId="LiveId" clId="{762C8129-56AC-41EC-ADD7-A8DEE5433772}" dt="2021-07-21T11:39:59.444" v="1523" actId="1076"/>
+          <ac:spMkLst>
+            <pc:docMk/>
+            <pc:sldMk cId="362378951" sldId="263"/>
+            <ac:spMk id="43" creationId="{79227F05-4966-4075-A8FA-61E8C137D6B7}"/>
+          </ac:spMkLst>
+        </pc:spChg>
+        <pc:spChg chg="add mod topLvl">
+          <ac:chgData name="Sebastian Meine" userId="f54488a2a6b7dc9e" providerId="LiveId" clId="{762C8129-56AC-41EC-ADD7-A8DEE5433772}" dt="2021-07-21T11:39:50.334" v="1521" actId="1076"/>
+          <ac:spMkLst>
+            <pc:docMk/>
+            <pc:sldMk cId="362378951" sldId="263"/>
+            <ac:spMk id="44" creationId="{3637F160-3DB8-4405-B45E-C2A8114808ED}"/>
+          </ac:spMkLst>
+        </pc:spChg>
+        <pc:spChg chg="add mod topLvl">
+          <ac:chgData name="Sebastian Meine" userId="f54488a2a6b7dc9e" providerId="LiveId" clId="{762C8129-56AC-41EC-ADD7-A8DEE5433772}" dt="2021-07-21T11:39:29.112" v="1516" actId="1076"/>
+          <ac:spMkLst>
+            <pc:docMk/>
+            <pc:sldMk cId="362378951" sldId="263"/>
+            <ac:spMk id="45" creationId="{B734E4A0-20C0-4E61-BFD0-B1B9DBF34AA9}"/>
+          </ac:spMkLst>
+        </pc:spChg>
+        <pc:spChg chg="add mod topLvl">
+          <ac:chgData name="Sebastian Meine" userId="f54488a2a6b7dc9e" providerId="LiveId" clId="{762C8129-56AC-41EC-ADD7-A8DEE5433772}" dt="2021-07-21T11:39:45.478" v="1520" actId="1076"/>
+          <ac:spMkLst>
+            <pc:docMk/>
+            <pc:sldMk cId="362378951" sldId="263"/>
+            <ac:spMk id="46" creationId="{205798F4-3165-41D9-A72D-BDBB72704EFF}"/>
+          </ac:spMkLst>
+        </pc:spChg>
+        <pc:spChg chg="add mod topLvl">
+          <ac:chgData name="Sebastian Meine" userId="f54488a2a6b7dc9e" providerId="LiveId" clId="{762C8129-56AC-41EC-ADD7-A8DEE5433772}" dt="2021-07-21T11:39:40.234" v="1519" actId="1076"/>
+          <ac:spMkLst>
+            <pc:docMk/>
+            <pc:sldMk cId="362378951" sldId="263"/>
+            <ac:spMk id="47" creationId="{659A3EDB-3F56-42C8-AB31-7181FAC9DC96}"/>
+          </ac:spMkLst>
+        </pc:spChg>
+        <pc:spChg chg="add mod topLvl">
+          <ac:chgData name="Sebastian Meine" userId="f54488a2a6b7dc9e" providerId="LiveId" clId="{762C8129-56AC-41EC-ADD7-A8DEE5433772}" dt="2021-07-21T11:21:47.861" v="1365" actId="1076"/>
+          <ac:spMkLst>
+            <pc:docMk/>
+            <pc:sldMk cId="362378951" sldId="263"/>
+            <ac:spMk id="48" creationId="{14950BCD-FC21-408B-AF20-5CBAD2C6BC19}"/>
+          </ac:spMkLst>
+        </pc:spChg>
+        <pc:spChg chg="add mod topLvl">
+          <ac:chgData name="Sebastian Meine" userId="f54488a2a6b7dc9e" providerId="LiveId" clId="{762C8129-56AC-41EC-ADD7-A8DEE5433772}" dt="2021-07-21T11:26:41.053" v="1389" actId="1076"/>
+          <ac:spMkLst>
+            <pc:docMk/>
+            <pc:sldMk cId="362378951" sldId="263"/>
+            <ac:spMk id="49" creationId="{99AE8D3D-1A10-40A6-A0D6-8A0BC8594168}"/>
+          </ac:spMkLst>
+        </pc:spChg>
+        <pc:spChg chg="add mod topLvl">
+          <ac:chgData name="Sebastian Meine" userId="f54488a2a6b7dc9e" providerId="LiveId" clId="{762C8129-56AC-41EC-ADD7-A8DEE5433772}" dt="2021-07-21T11:39:37.459" v="1518" actId="1076"/>
+          <ac:spMkLst>
+            <pc:docMk/>
+            <pc:sldMk cId="362378951" sldId="263"/>
+            <ac:spMk id="50" creationId="{0D6421C3-ECD4-4814-8433-AE9EC376DE8A}"/>
+          </ac:spMkLst>
+        </pc:spChg>
+        <pc:spChg chg="add mod topLvl">
+          <ac:chgData name="Sebastian Meine" userId="f54488a2a6b7dc9e" providerId="LiveId" clId="{762C8129-56AC-41EC-ADD7-A8DEE5433772}" dt="2021-07-21T11:21:47.861" v="1365" actId="1076"/>
+          <ac:spMkLst>
+            <pc:docMk/>
+            <pc:sldMk cId="362378951" sldId="263"/>
+            <ac:spMk id="51" creationId="{E6C0A146-03EA-459F-8F49-1126DAF66C6B}"/>
+          </ac:spMkLst>
+        </pc:spChg>
+        <pc:spChg chg="add del mod topLvl">
+          <ac:chgData name="Sebastian Meine" userId="f54488a2a6b7dc9e" providerId="LiveId" clId="{762C8129-56AC-41EC-ADD7-A8DEE5433772}" dt="2021-07-21T11:38:59.434" v="1512" actId="1076"/>
+          <ac:spMkLst>
+            <pc:docMk/>
+            <pc:sldMk cId="362378951" sldId="263"/>
+            <ac:spMk id="52" creationId="{2A2D80E6-E129-44B2-904E-CE22265E4158}"/>
+          </ac:spMkLst>
+        </pc:spChg>
+        <pc:spChg chg="add mod topLvl">
+          <ac:chgData name="Sebastian Meine" userId="f54488a2a6b7dc9e" providerId="LiveId" clId="{762C8129-56AC-41EC-ADD7-A8DEE5433772}" dt="2021-07-21T11:21:47.861" v="1365" actId="1076"/>
+          <ac:spMkLst>
+            <pc:docMk/>
+            <pc:sldMk cId="362378951" sldId="263"/>
+            <ac:spMk id="53" creationId="{7F6541AD-E739-4F90-BC30-071417425938}"/>
+          </ac:spMkLst>
+        </pc:spChg>
+        <pc:spChg chg="add mod topLvl">
+          <ac:chgData name="Sebastian Meine" userId="f54488a2a6b7dc9e" providerId="LiveId" clId="{762C8129-56AC-41EC-ADD7-A8DEE5433772}" dt="2021-07-21T11:24:59.028" v="1383" actId="1076"/>
+          <ac:spMkLst>
+            <pc:docMk/>
+            <pc:sldMk cId="362378951" sldId="263"/>
+            <ac:spMk id="54" creationId="{452031FF-D159-4E81-8E4A-9361D3B9723F}"/>
+          </ac:spMkLst>
+        </pc:spChg>
+        <pc:spChg chg="add mod topLvl">
+          <ac:chgData name="Sebastian Meine" userId="f54488a2a6b7dc9e" providerId="LiveId" clId="{762C8129-56AC-41EC-ADD7-A8DEE5433772}" dt="2021-07-21T11:24:59.028" v="1383" actId="1076"/>
+          <ac:spMkLst>
+            <pc:docMk/>
+            <pc:sldMk cId="362378951" sldId="263"/>
+            <ac:spMk id="55" creationId="{33BEDFAC-B41C-4322-8E30-7A7D29BBB230}"/>
+          </ac:spMkLst>
+        </pc:spChg>
+        <pc:spChg chg="add mod topLvl">
+          <ac:chgData name="Sebastian Meine" userId="f54488a2a6b7dc9e" providerId="LiveId" clId="{762C8129-56AC-41EC-ADD7-A8DEE5433772}" dt="2021-07-21T11:24:59.028" v="1383" actId="1076"/>
+          <ac:spMkLst>
+            <pc:docMk/>
+            <pc:sldMk cId="362378951" sldId="263"/>
+            <ac:spMk id="56" creationId="{69CCB8A5-FD7A-44EC-A796-C3D53B96FCFC}"/>
+          </ac:spMkLst>
+        </pc:spChg>
+        <pc:spChg chg="add mod topLvl">
+          <ac:chgData name="Sebastian Meine" userId="f54488a2a6b7dc9e" providerId="LiveId" clId="{762C8129-56AC-41EC-ADD7-A8DEE5433772}" dt="2021-07-21T11:24:59.028" v="1383" actId="1076"/>
+          <ac:spMkLst>
+            <pc:docMk/>
+            <pc:sldMk cId="362378951" sldId="263"/>
+            <ac:spMk id="57" creationId="{60ADF56E-68A6-434E-A524-54539AA4CCB0}"/>
+          </ac:spMkLst>
+        </pc:spChg>
+        <pc:spChg chg="add mod topLvl">
+          <ac:chgData name="Sebastian Meine" userId="f54488a2a6b7dc9e" providerId="LiveId" clId="{762C8129-56AC-41EC-ADD7-A8DEE5433772}" dt="2021-07-21T11:24:59.028" v="1383" actId="1076"/>
+          <ac:spMkLst>
+            <pc:docMk/>
+            <pc:sldMk cId="362378951" sldId="263"/>
+            <ac:spMk id="58" creationId="{17D175CD-CABE-46AE-BBF8-D1BF373C7868}"/>
+          </ac:spMkLst>
+        </pc:spChg>
+        <pc:spChg chg="add mod topLvl">
+          <ac:chgData name="Sebastian Meine" userId="f54488a2a6b7dc9e" providerId="LiveId" clId="{762C8129-56AC-41EC-ADD7-A8DEE5433772}" dt="2021-07-21T11:24:59.028" v="1383" actId="1076"/>
+          <ac:spMkLst>
+            <pc:docMk/>
+            <pc:sldMk cId="362378951" sldId="263"/>
+            <ac:spMk id="59" creationId="{163B1371-3F8E-46B6-BCF1-19E4301C26BF}"/>
+          </ac:spMkLst>
+        </pc:spChg>
+        <pc:spChg chg="add mod topLvl">
+          <ac:chgData name="Sebastian Meine" userId="f54488a2a6b7dc9e" providerId="LiveId" clId="{762C8129-56AC-41EC-ADD7-A8DEE5433772}" dt="2021-07-21T11:25:17.710" v="1385" actId="1076"/>
+          <ac:spMkLst>
+            <pc:docMk/>
+            <pc:sldMk cId="362378951" sldId="263"/>
+            <ac:spMk id="134" creationId="{3F94E448-A9CC-475F-8FE1-0ED55C9AF953}"/>
+          </ac:spMkLst>
+        </pc:spChg>
+        <pc:spChg chg="add mod">
+          <ac:chgData name="Sebastian Meine" userId="f54488a2a6b7dc9e" providerId="LiveId" clId="{762C8129-56AC-41EC-ADD7-A8DEE5433772}" dt="2021-07-21T11:12:15.534" v="986" actId="571"/>
+          <ac:spMkLst>
+            <pc:docMk/>
+            <pc:sldMk cId="362378951" sldId="263"/>
+            <ac:spMk id="138" creationId="{2CE26DDC-5FA5-446E-BE5F-19BF4DD1B773}"/>
+          </ac:spMkLst>
+        </pc:spChg>
+        <pc:spChg chg="add mod">
+          <ac:chgData name="Sebastian Meine" userId="f54488a2a6b7dc9e" providerId="LiveId" clId="{762C8129-56AC-41EC-ADD7-A8DEE5433772}" dt="2021-07-21T11:12:15.534" v="986" actId="571"/>
+          <ac:spMkLst>
+            <pc:docMk/>
+            <pc:sldMk cId="362378951" sldId="263"/>
+            <ac:spMk id="140" creationId="{58252E9A-5052-439B-9D78-ADE83C2FD3EF}"/>
+          </ac:spMkLst>
+        </pc:spChg>
+        <pc:spChg chg="add mod">
+          <ac:chgData name="Sebastian Meine" userId="f54488a2a6b7dc9e" providerId="LiveId" clId="{762C8129-56AC-41EC-ADD7-A8DEE5433772}" dt="2021-07-21T11:12:14.978" v="985" actId="571"/>
+          <ac:spMkLst>
+            <pc:docMk/>
+            <pc:sldMk cId="362378951" sldId="263"/>
+            <ac:spMk id="158" creationId="{CA08DCBB-5D97-4D82-B05E-BA132E27E64D}"/>
+          </ac:spMkLst>
+        </pc:spChg>
+        <pc:spChg chg="add mod">
+          <ac:chgData name="Sebastian Meine" userId="f54488a2a6b7dc9e" providerId="LiveId" clId="{762C8129-56AC-41EC-ADD7-A8DEE5433772}" dt="2021-07-21T11:12:14.978" v="985" actId="571"/>
+          <ac:spMkLst>
+            <pc:docMk/>
+            <pc:sldMk cId="362378951" sldId="263"/>
+            <ac:spMk id="159" creationId="{66BB14C0-2AF6-452B-9C74-EC412C9330E4}"/>
+          </ac:spMkLst>
+        </pc:spChg>
+        <pc:spChg chg="add mod">
+          <ac:chgData name="Sebastian Meine" userId="f54488a2a6b7dc9e" providerId="LiveId" clId="{762C8129-56AC-41EC-ADD7-A8DEE5433772}" dt="2021-07-21T11:12:14.978" v="985" actId="571"/>
+          <ac:spMkLst>
+            <pc:docMk/>
+            <pc:sldMk cId="362378951" sldId="263"/>
+            <ac:spMk id="160" creationId="{D6EFCC58-7069-4E1E-B662-1F5B800D12B2}"/>
+          </ac:spMkLst>
+        </pc:spChg>
+        <pc:spChg chg="add mod">
+          <ac:chgData name="Sebastian Meine" userId="f54488a2a6b7dc9e" providerId="LiveId" clId="{762C8129-56AC-41EC-ADD7-A8DEE5433772}" dt="2021-07-21T11:12:14.978" v="985" actId="571"/>
+          <ac:spMkLst>
+            <pc:docMk/>
+            <pc:sldMk cId="362378951" sldId="263"/>
+            <ac:spMk id="161" creationId="{D50C8597-5811-4296-88AB-A2FA6DD1D53E}"/>
+          </ac:spMkLst>
+        </pc:spChg>
+        <pc:spChg chg="add mod">
+          <ac:chgData name="Sebastian Meine" userId="f54488a2a6b7dc9e" providerId="LiveId" clId="{762C8129-56AC-41EC-ADD7-A8DEE5433772}" dt="2021-07-21T11:12:14.978" v="985" actId="571"/>
+          <ac:spMkLst>
+            <pc:docMk/>
+            <pc:sldMk cId="362378951" sldId="263"/>
+            <ac:spMk id="162" creationId="{D4D12FD1-EF1B-4DAE-AAD9-2EF2888E3D4E}"/>
+          </ac:spMkLst>
+        </pc:spChg>
+        <pc:spChg chg="add mod">
+          <ac:chgData name="Sebastian Meine" userId="f54488a2a6b7dc9e" providerId="LiveId" clId="{762C8129-56AC-41EC-ADD7-A8DEE5433772}" dt="2021-07-21T11:12:14.978" v="985" actId="571"/>
+          <ac:spMkLst>
+            <pc:docMk/>
+            <pc:sldMk cId="362378951" sldId="263"/>
+            <ac:spMk id="163" creationId="{444BB898-48DB-4E07-8264-CF362C3A493A}"/>
+          </ac:spMkLst>
+        </pc:spChg>
+        <pc:spChg chg="add mod">
+          <ac:chgData name="Sebastian Meine" userId="f54488a2a6b7dc9e" providerId="LiveId" clId="{762C8129-56AC-41EC-ADD7-A8DEE5433772}" dt="2021-07-21T11:12:14.978" v="985" actId="571"/>
+          <ac:spMkLst>
+            <pc:docMk/>
+            <pc:sldMk cId="362378951" sldId="263"/>
+            <ac:spMk id="164" creationId="{9497D5AE-CB1F-4FB2-A238-771CDF522061}"/>
+          </ac:spMkLst>
+        </pc:spChg>
+        <pc:spChg chg="add mod">
+          <ac:chgData name="Sebastian Meine" userId="f54488a2a6b7dc9e" providerId="LiveId" clId="{762C8129-56AC-41EC-ADD7-A8DEE5433772}" dt="2021-07-21T11:12:14.978" v="985" actId="571"/>
+          <ac:spMkLst>
+            <pc:docMk/>
+            <pc:sldMk cId="362378951" sldId="263"/>
+            <ac:spMk id="165" creationId="{1A1C3FB0-1097-4301-996E-71ECE3A8AC21}"/>
+          </ac:spMkLst>
+        </pc:spChg>
+        <pc:spChg chg="add mod">
+          <ac:chgData name="Sebastian Meine" userId="f54488a2a6b7dc9e" providerId="LiveId" clId="{762C8129-56AC-41EC-ADD7-A8DEE5433772}" dt="2021-07-21T11:12:14.978" v="985" actId="571"/>
+          <ac:spMkLst>
+            <pc:docMk/>
+            <pc:sldMk cId="362378951" sldId="263"/>
+            <ac:spMk id="166" creationId="{E989C434-143A-4B6A-9A18-5A3A85854D70}"/>
+          </ac:spMkLst>
+        </pc:spChg>
+        <pc:spChg chg="add mod">
+          <ac:chgData name="Sebastian Meine" userId="f54488a2a6b7dc9e" providerId="LiveId" clId="{762C8129-56AC-41EC-ADD7-A8DEE5433772}" dt="2021-07-21T11:12:14.978" v="985" actId="571"/>
+          <ac:spMkLst>
+            <pc:docMk/>
+            <pc:sldMk cId="362378951" sldId="263"/>
+            <ac:spMk id="167" creationId="{54462E02-F994-4931-9F69-DF9C3D91BDCB}"/>
+          </ac:spMkLst>
+        </pc:spChg>
+        <pc:spChg chg="add mod">
+          <ac:chgData name="Sebastian Meine" userId="f54488a2a6b7dc9e" providerId="LiveId" clId="{762C8129-56AC-41EC-ADD7-A8DEE5433772}" dt="2021-07-21T11:12:14.978" v="985" actId="571"/>
+          <ac:spMkLst>
+            <pc:docMk/>
+            <pc:sldMk cId="362378951" sldId="263"/>
+            <ac:spMk id="168" creationId="{6052E854-BCB5-4AD7-8AA8-266ED594D14A}"/>
+          </ac:spMkLst>
+        </pc:spChg>
+        <pc:spChg chg="add mod">
+          <ac:chgData name="Sebastian Meine" userId="f54488a2a6b7dc9e" providerId="LiveId" clId="{762C8129-56AC-41EC-ADD7-A8DEE5433772}" dt="2021-07-21T11:12:14.978" v="985" actId="571"/>
+          <ac:spMkLst>
+            <pc:docMk/>
+            <pc:sldMk cId="362378951" sldId="263"/>
+            <ac:spMk id="169" creationId="{F05D6D8E-C42E-487E-9939-E708552355AA}"/>
+          </ac:spMkLst>
+        </pc:spChg>
+        <pc:spChg chg="add mod">
+          <ac:chgData name="Sebastian Meine" userId="f54488a2a6b7dc9e" providerId="LiveId" clId="{762C8129-56AC-41EC-ADD7-A8DEE5433772}" dt="2021-07-21T11:12:14.978" v="985" actId="571"/>
+          <ac:spMkLst>
+            <pc:docMk/>
+            <pc:sldMk cId="362378951" sldId="263"/>
+            <ac:spMk id="170" creationId="{44FAD2F4-4715-46A0-A549-F614C24D560A}"/>
+          </ac:spMkLst>
+        </pc:spChg>
+        <pc:spChg chg="add mod">
+          <ac:chgData name="Sebastian Meine" userId="f54488a2a6b7dc9e" providerId="LiveId" clId="{762C8129-56AC-41EC-ADD7-A8DEE5433772}" dt="2021-07-21T11:12:14.978" v="985" actId="571"/>
+          <ac:spMkLst>
+            <pc:docMk/>
+            <pc:sldMk cId="362378951" sldId="263"/>
+            <ac:spMk id="171" creationId="{5777BB2F-6E96-49AC-B5A8-80D913ED3EF3}"/>
+          </ac:spMkLst>
+        </pc:spChg>
+        <pc:spChg chg="add mod">
+          <ac:chgData name="Sebastian Meine" userId="f54488a2a6b7dc9e" providerId="LiveId" clId="{762C8129-56AC-41EC-ADD7-A8DEE5433772}" dt="2021-07-21T11:12:14.978" v="985" actId="571"/>
+          <ac:spMkLst>
+            <pc:docMk/>
+            <pc:sldMk cId="362378951" sldId="263"/>
+            <ac:spMk id="172" creationId="{E63EC859-8045-43D6-AD7D-C3F4DBDA8276}"/>
+          </ac:spMkLst>
+        </pc:spChg>
+        <pc:spChg chg="add mod">
+          <ac:chgData name="Sebastian Meine" userId="f54488a2a6b7dc9e" providerId="LiveId" clId="{762C8129-56AC-41EC-ADD7-A8DEE5433772}" dt="2021-07-21T11:12:14.978" v="985" actId="571"/>
+          <ac:spMkLst>
+            <pc:docMk/>
+            <pc:sldMk cId="362378951" sldId="263"/>
+            <ac:spMk id="173" creationId="{8D7AEB7D-D779-4F7B-9D64-86863DB88785}"/>
+          </ac:spMkLst>
+        </pc:spChg>
+        <pc:spChg chg="add mod">
+          <ac:chgData name="Sebastian Meine" userId="f54488a2a6b7dc9e" providerId="LiveId" clId="{762C8129-56AC-41EC-ADD7-A8DEE5433772}" dt="2021-07-21T11:12:14.978" v="985" actId="571"/>
+          <ac:spMkLst>
+            <pc:docMk/>
+            <pc:sldMk cId="362378951" sldId="263"/>
+            <ac:spMk id="176" creationId="{BA7116D5-ED03-45F7-89D0-D4A71B2E4190}"/>
+          </ac:spMkLst>
+        </pc:spChg>
+        <pc:spChg chg="add mod">
+          <ac:chgData name="Sebastian Meine" userId="f54488a2a6b7dc9e" providerId="LiveId" clId="{762C8129-56AC-41EC-ADD7-A8DEE5433772}" dt="2021-07-21T11:12:14.978" v="985" actId="571"/>
+          <ac:spMkLst>
+            <pc:docMk/>
+            <pc:sldMk cId="362378951" sldId="263"/>
+            <ac:spMk id="178" creationId="{50946BC0-7C5D-4C75-A665-2896642C8AC9}"/>
+          </ac:spMkLst>
+        </pc:spChg>
+        <pc:spChg chg="add del mod">
+          <ac:chgData name="Sebastian Meine" userId="f54488a2a6b7dc9e" providerId="LiveId" clId="{762C8129-56AC-41EC-ADD7-A8DEE5433772}" dt="2021-07-21T11:38:59.966" v="1514"/>
+          <ac:spMkLst>
+            <pc:docMk/>
+            <pc:sldMk cId="362378951" sldId="263"/>
+            <ac:spMk id="232" creationId="{1C163E1D-F58D-4FAA-938A-573D6ECAF09C}"/>
+          </ac:spMkLst>
+        </pc:spChg>
+        <pc:spChg chg="add del mod">
+          <ac:chgData name="Sebastian Meine" userId="f54488a2a6b7dc9e" providerId="LiveId" clId="{762C8129-56AC-41EC-ADD7-A8DEE5433772}" dt="2021-07-21T11:38:57.886" v="1507"/>
+          <ac:spMkLst>
+            <pc:docMk/>
+            <pc:sldMk cId="362378951" sldId="263"/>
+            <ac:spMk id="233" creationId="{35DE4188-A991-4589-B793-528803450203}"/>
+          </ac:spMkLst>
+        </pc:spChg>
+        <pc:spChg chg="add del mod">
+          <ac:chgData name="Sebastian Meine" userId="f54488a2a6b7dc9e" providerId="LiveId" clId="{762C8129-56AC-41EC-ADD7-A8DEE5433772}" dt="2021-07-21T11:38:57.886" v="1507"/>
+          <ac:spMkLst>
+            <pc:docMk/>
+            <pc:sldMk cId="362378951" sldId="263"/>
+            <ac:spMk id="234" creationId="{8DE91337-3387-4DB7-891D-249F8202ADD6}"/>
+          </ac:spMkLst>
+        </pc:spChg>
+        <pc:spChg chg="add del mod">
+          <ac:chgData name="Sebastian Meine" userId="f54488a2a6b7dc9e" providerId="LiveId" clId="{762C8129-56AC-41EC-ADD7-A8DEE5433772}" dt="2021-07-21T11:38:57.886" v="1507"/>
+          <ac:spMkLst>
+            <pc:docMk/>
+            <pc:sldMk cId="362378951" sldId="263"/>
+            <ac:spMk id="235" creationId="{3C6A63A0-44B7-464A-8EB1-D63F2AAE5D69}"/>
+          </ac:spMkLst>
+        </pc:spChg>
+        <pc:spChg chg="add del mod">
+          <ac:chgData name="Sebastian Meine" userId="f54488a2a6b7dc9e" providerId="LiveId" clId="{762C8129-56AC-41EC-ADD7-A8DEE5433772}" dt="2021-07-21T11:38:57.565" v="1505"/>
+          <ac:spMkLst>
+            <pc:docMk/>
+            <pc:sldMk cId="362378951" sldId="263"/>
+            <ac:spMk id="236" creationId="{7761084A-D2E4-40FB-AE91-07BE1761BAFC}"/>
+          </ac:spMkLst>
+        </pc:spChg>
+        <pc:spChg chg="add del mod">
+          <ac:chgData name="Sebastian Meine" userId="f54488a2a6b7dc9e" providerId="LiveId" clId="{762C8129-56AC-41EC-ADD7-A8DEE5433772}" dt="2021-07-21T11:38:57.167" v="1503"/>
+          <ac:spMkLst>
+            <pc:docMk/>
+            <pc:sldMk cId="362378951" sldId="263"/>
+            <ac:spMk id="237" creationId="{982EEB1A-D38A-45A9-8B72-464CB222AA73}"/>
+          </ac:spMkLst>
+        </pc:spChg>
+        <pc:spChg chg="add del mod">
+          <ac:chgData name="Sebastian Meine" userId="f54488a2a6b7dc9e" providerId="LiveId" clId="{762C8129-56AC-41EC-ADD7-A8DEE5433772}" dt="2021-07-21T11:38:56.171" v="1499"/>
+          <ac:spMkLst>
+            <pc:docMk/>
+            <pc:sldMk cId="362378951" sldId="263"/>
+            <ac:spMk id="238" creationId="{21BCAF66-48F2-4EE0-BB67-6EFE1CC4669F}"/>
+          </ac:spMkLst>
+        </pc:spChg>
+        <pc:spChg chg="add del mod">
+          <ac:chgData name="Sebastian Meine" userId="f54488a2a6b7dc9e" providerId="LiveId" clId="{762C8129-56AC-41EC-ADD7-A8DEE5433772}" dt="2021-07-21T11:38:55.701" v="1496"/>
+          <ac:spMkLst>
+            <pc:docMk/>
+            <pc:sldMk cId="362378951" sldId="263"/>
+            <ac:spMk id="239" creationId="{985921B7-8350-4D11-AAD8-A68837B30626}"/>
+          </ac:spMkLst>
+        </pc:spChg>
+        <pc:spChg chg="add del mod">
+          <ac:chgData name="Sebastian Meine" userId="f54488a2a6b7dc9e" providerId="LiveId" clId="{762C8129-56AC-41EC-ADD7-A8DEE5433772}" dt="2021-07-21T11:38:55.701" v="1496"/>
+          <ac:spMkLst>
+            <pc:docMk/>
+            <pc:sldMk cId="362378951" sldId="263"/>
+            <ac:spMk id="240" creationId="{0B1B0FDA-D1C6-4BB4-B1D2-2ECF996C20EB}"/>
+          </ac:spMkLst>
+        </pc:spChg>
+        <pc:spChg chg="add del mod">
+          <ac:chgData name="Sebastian Meine" userId="f54488a2a6b7dc9e" providerId="LiveId" clId="{762C8129-56AC-41EC-ADD7-A8DEE5433772}" dt="2021-07-21T11:38:55.701" v="1496"/>
+          <ac:spMkLst>
+            <pc:docMk/>
+            <pc:sldMk cId="362378951" sldId="263"/>
+            <ac:spMk id="241" creationId="{CE3A4BBE-6A22-41A0-9E2B-7A29FBCE868F}"/>
+          </ac:spMkLst>
+        </pc:spChg>
+        <pc:spChg chg="add mod">
+          <ac:chgData name="Sebastian Meine" userId="f54488a2a6b7dc9e" providerId="LiveId" clId="{762C8129-56AC-41EC-ADD7-A8DEE5433772}" dt="2021-07-21T11:40:29.209" v="1529" actId="1076"/>
+          <ac:spMkLst>
+            <pc:docMk/>
+            <pc:sldMk cId="362378951" sldId="263"/>
+            <ac:spMk id="242" creationId="{F9041B7D-8114-4312-B2BE-79CD332103C7}"/>
+          </ac:spMkLst>
+        </pc:spChg>
+        <pc:spChg chg="add mod">
+          <ac:chgData name="Sebastian Meine" userId="f54488a2a6b7dc9e" providerId="LiveId" clId="{762C8129-56AC-41EC-ADD7-A8DEE5433772}" dt="2021-07-21T11:40:44.647" v="1532" actId="1076"/>
+          <ac:spMkLst>
+            <pc:docMk/>
+            <pc:sldMk cId="362378951" sldId="263"/>
+            <ac:spMk id="243" creationId="{F54FF04F-086D-4DB5-A714-C9A6C43B3DD5}"/>
+          </ac:spMkLst>
+        </pc:spChg>
+        <pc:spChg chg="add mod">
+          <ac:chgData name="Sebastian Meine" userId="f54488a2a6b7dc9e" providerId="LiveId" clId="{762C8129-56AC-41EC-ADD7-A8DEE5433772}" dt="2021-07-21T11:42:29.124" v="1550" actId="1076"/>
+          <ac:spMkLst>
+            <pc:docMk/>
+            <pc:sldMk cId="362378951" sldId="263"/>
+            <ac:spMk id="244" creationId="{EF80AF76-1D40-4E4A-8E62-CB6C5EE180B5}"/>
+          </ac:spMkLst>
+        </pc:spChg>
+        <pc:spChg chg="add mod">
+          <ac:chgData name="Sebastian Meine" userId="f54488a2a6b7dc9e" providerId="LiveId" clId="{762C8129-56AC-41EC-ADD7-A8DEE5433772}" dt="2021-07-21T11:42:29.124" v="1550" actId="1076"/>
+          <ac:spMkLst>
+            <pc:docMk/>
+            <pc:sldMk cId="362378951" sldId="263"/>
+            <ac:spMk id="245" creationId="{2C688EE4-A8BD-49A6-AFD9-17C9E1CCBA68}"/>
+          </ac:spMkLst>
+        </pc:spChg>
+        <pc:spChg chg="add mod">
+          <ac:chgData name="Sebastian Meine" userId="f54488a2a6b7dc9e" providerId="LiveId" clId="{762C8129-56AC-41EC-ADD7-A8DEE5433772}" dt="2021-07-21T11:42:29.124" v="1550" actId="1076"/>
+          <ac:spMkLst>
+            <pc:docMk/>
+            <pc:sldMk cId="362378951" sldId="263"/>
+            <ac:spMk id="246" creationId="{4AB66913-76DE-47C4-9602-A5DE98FA6348}"/>
+          </ac:spMkLst>
+        </pc:spChg>
+        <pc:spChg chg="add mod">
+          <ac:chgData name="Sebastian Meine" userId="f54488a2a6b7dc9e" providerId="LiveId" clId="{762C8129-56AC-41EC-ADD7-A8DEE5433772}" dt="2021-07-21T11:43:54.729" v="1559" actId="1076"/>
+          <ac:spMkLst>
+            <pc:docMk/>
+            <pc:sldMk cId="362378951" sldId="263"/>
+            <ac:spMk id="247" creationId="{C59ABEE1-3DC9-4EF0-985B-ED0E7529F7E3}"/>
+          </ac:spMkLst>
+        </pc:spChg>
+        <pc:spChg chg="add mod">
+          <ac:chgData name="Sebastian Meine" userId="f54488a2a6b7dc9e" providerId="LiveId" clId="{762C8129-56AC-41EC-ADD7-A8DEE5433772}" dt="2021-07-21T11:43:54.729" v="1559" actId="1076"/>
+          <ac:spMkLst>
+            <pc:docMk/>
+            <pc:sldMk cId="362378951" sldId="263"/>
+            <ac:spMk id="248" creationId="{2EF969AB-4B0F-4896-A520-02BF15ABD16A}"/>
+          </ac:spMkLst>
+        </pc:spChg>
+        <pc:spChg chg="add mod">
+          <ac:chgData name="Sebastian Meine" userId="f54488a2a6b7dc9e" providerId="LiveId" clId="{762C8129-56AC-41EC-ADD7-A8DEE5433772}" dt="2021-07-21T11:43:41.267" v="1558" actId="1076"/>
+          <ac:spMkLst>
+            <pc:docMk/>
+            <pc:sldMk cId="362378951" sldId="263"/>
+            <ac:spMk id="249" creationId="{121ADEB6-CB71-4DF5-9148-F99238421ED2}"/>
+          </ac:spMkLst>
+        </pc:spChg>
+        <pc:spChg chg="add mod">
+          <ac:chgData name="Sebastian Meine" userId="f54488a2a6b7dc9e" providerId="LiveId" clId="{762C8129-56AC-41EC-ADD7-A8DEE5433772}" dt="2021-07-21T11:43:41.267" v="1558" actId="1076"/>
+          <ac:spMkLst>
+            <pc:docMk/>
+            <pc:sldMk cId="362378951" sldId="263"/>
+            <ac:spMk id="250" creationId="{0E4D9A70-2F09-4F80-8D31-14BCB05B8888}"/>
+          </ac:spMkLst>
+        </pc:spChg>
+        <pc:spChg chg="add mod">
+          <ac:chgData name="Sebastian Meine" userId="f54488a2a6b7dc9e" providerId="LiveId" clId="{762C8129-56AC-41EC-ADD7-A8DEE5433772}" dt="2021-07-21T11:43:41.267" v="1558" actId="1076"/>
+          <ac:spMkLst>
+            <pc:docMk/>
+            <pc:sldMk cId="362378951" sldId="263"/>
+            <ac:spMk id="251" creationId="{1AF7C8E0-7E63-4DB8-A5AE-DF0F6F822BD5}"/>
+          </ac:spMkLst>
+        </pc:spChg>
+        <pc:spChg chg="add mod">
+          <ac:chgData name="Sebastian Meine" userId="f54488a2a6b7dc9e" providerId="LiveId" clId="{762C8129-56AC-41EC-ADD7-A8DEE5433772}" dt="2021-07-21T11:44:06.462" v="1561" actId="1076"/>
+          <ac:spMkLst>
+            <pc:docMk/>
+            <pc:sldMk cId="362378951" sldId="263"/>
+            <ac:spMk id="252" creationId="{E95400F4-1697-43A4-B16E-DCFD401F993F}"/>
+          </ac:spMkLst>
+        </pc:spChg>
+        <pc:spChg chg="add mod">
+          <ac:chgData name="Sebastian Meine" userId="f54488a2a6b7dc9e" providerId="LiveId" clId="{762C8129-56AC-41EC-ADD7-A8DEE5433772}" dt="2021-07-21T11:44:06.462" v="1561" actId="1076"/>
+          <ac:spMkLst>
+            <pc:docMk/>
+            <pc:sldMk cId="362378951" sldId="263"/>
+            <ac:spMk id="253" creationId="{9ECA579C-4CC7-4FFD-8D34-78420AAC26B4}"/>
+          </ac:spMkLst>
+        </pc:spChg>
+        <pc:spChg chg="add mod">
+          <ac:chgData name="Sebastian Meine" userId="f54488a2a6b7dc9e" providerId="LiveId" clId="{762C8129-56AC-41EC-ADD7-A8DEE5433772}" dt="2021-07-21T11:44:06.462" v="1561" actId="1076"/>
+          <ac:spMkLst>
+            <pc:docMk/>
+            <pc:sldMk cId="362378951" sldId="263"/>
+            <ac:spMk id="254" creationId="{9B2CB008-0475-4A7D-A762-391918A05C25}"/>
+          </ac:spMkLst>
+        </pc:spChg>
+        <pc:grpChg chg="add del mod">
+          <ac:chgData name="Sebastian Meine" userId="f54488a2a6b7dc9e" providerId="LiveId" clId="{762C8129-56AC-41EC-ADD7-A8DEE5433772}" dt="2021-07-21T11:05:04.452" v="926" actId="165"/>
+          <ac:grpSpMkLst>
+            <pc:docMk/>
+            <pc:sldMk cId="362378951" sldId="263"/>
+            <ac:grpSpMk id="135" creationId="{2BD12A9B-C543-4272-AC01-FC8AFF5601AC}"/>
+          </ac:grpSpMkLst>
+        </pc:grpChg>
+        <pc:grpChg chg="add mod ord">
+          <ac:chgData name="Sebastian Meine" userId="f54488a2a6b7dc9e" providerId="LiveId" clId="{762C8129-56AC-41EC-ADD7-A8DEE5433772}" dt="2021-07-21T11:25:11.407" v="1384" actId="14100"/>
+          <ac:grpSpMkLst>
+            <pc:docMk/>
+            <pc:sldMk cId="362378951" sldId="263"/>
+            <ac:grpSpMk id="136" creationId="{D694CDF6-9EE0-4E29-B79D-EF3BFEF9243D}"/>
+          </ac:grpSpMkLst>
+        </pc:grpChg>
+        <pc:cxnChg chg="add del mod">
+          <ac:chgData name="Sebastian Meine" userId="f54488a2a6b7dc9e" providerId="LiveId" clId="{762C8129-56AC-41EC-ADD7-A8DEE5433772}" dt="2021-07-21T10:50:40.058" v="547" actId="478"/>
+          <ac:cxnSpMkLst>
+            <pc:docMk/>
+            <pc:sldMk cId="362378951" sldId="263"/>
+            <ac:cxnSpMk id="4" creationId="{E564E939-8E6B-4CCC-A23A-BE4A7A8E8D8B}"/>
+          </ac:cxnSpMkLst>
+        </pc:cxnChg>
+        <pc:cxnChg chg="add del mod topLvl">
+          <ac:chgData name="Sebastian Meine" userId="f54488a2a6b7dc9e" providerId="LiveId" clId="{762C8129-56AC-41EC-ADD7-A8DEE5433772}" dt="2021-07-21T11:36:38.712" v="1471" actId="478"/>
+          <ac:cxnSpMkLst>
+            <pc:docMk/>
+            <pc:sldMk cId="362378951" sldId="263"/>
+            <ac:cxnSpMk id="62" creationId="{641C89C7-AAD9-4ADA-B116-D4F842B46E01}"/>
+          </ac:cxnSpMkLst>
+        </pc:cxnChg>
+        <pc:cxnChg chg="add del mod topLvl">
+          <ac:chgData name="Sebastian Meine" userId="f54488a2a6b7dc9e" providerId="LiveId" clId="{762C8129-56AC-41EC-ADD7-A8DEE5433772}" dt="2021-07-21T11:35:52.566" v="1470" actId="478"/>
+          <ac:cxnSpMkLst>
+            <pc:docMk/>
+            <pc:sldMk cId="362378951" sldId="263"/>
+            <ac:cxnSpMk id="64" creationId="{11C587F0-E9DE-421F-9987-A4B2A9CF0100}"/>
+          </ac:cxnSpMkLst>
+        </pc:cxnChg>
+        <pc:cxnChg chg="add del mod ord topLvl">
+          <ac:chgData name="Sebastian Meine" userId="f54488a2a6b7dc9e" providerId="LiveId" clId="{762C8129-56AC-41EC-ADD7-A8DEE5433772}" dt="2021-07-21T11:36:38.712" v="1471" actId="478"/>
+          <ac:cxnSpMkLst>
+            <pc:docMk/>
+            <pc:sldMk cId="362378951" sldId="263"/>
+            <ac:cxnSpMk id="68" creationId="{51FE51BC-649C-4C3F-871F-5E8863A9D413}"/>
+          </ac:cxnSpMkLst>
+        </pc:cxnChg>
+        <pc:cxnChg chg="add del mod ord topLvl">
+          <ac:chgData name="Sebastian Meine" userId="f54488a2a6b7dc9e" providerId="LiveId" clId="{762C8129-56AC-41EC-ADD7-A8DEE5433772}" dt="2021-07-21T11:36:38.712" v="1471" actId="478"/>
+          <ac:cxnSpMkLst>
+            <pc:docMk/>
+            <pc:sldMk cId="362378951" sldId="263"/>
+            <ac:cxnSpMk id="73" creationId="{4375D169-34E2-4853-891A-E246B3B32ECF}"/>
+          </ac:cxnSpMkLst>
+        </pc:cxnChg>
+        <pc:cxnChg chg="add del mod topLvl">
+          <ac:chgData name="Sebastian Meine" userId="f54488a2a6b7dc9e" providerId="LiveId" clId="{762C8129-56AC-41EC-ADD7-A8DEE5433772}" dt="2021-07-21T11:35:52.566" v="1470" actId="478"/>
+          <ac:cxnSpMkLst>
+            <pc:docMk/>
+            <pc:sldMk cId="362378951" sldId="263"/>
+            <ac:cxnSpMk id="76" creationId="{50167718-8ED9-4F15-B8D7-6E7C6522C9E9}"/>
+          </ac:cxnSpMkLst>
+        </pc:cxnChg>
+        <pc:cxnChg chg="add del mod topLvl">
+          <ac:chgData name="Sebastian Meine" userId="f54488a2a6b7dc9e" providerId="LiveId" clId="{762C8129-56AC-41EC-ADD7-A8DEE5433772}" dt="2021-07-21T11:36:38.712" v="1471" actId="478"/>
+          <ac:cxnSpMkLst>
+            <pc:docMk/>
+            <pc:sldMk cId="362378951" sldId="263"/>
+            <ac:cxnSpMk id="80" creationId="{5CA63747-A5D2-4C82-9A67-0B7BDCC37689}"/>
+          </ac:cxnSpMkLst>
+        </pc:cxnChg>
+        <pc:cxnChg chg="add del mod topLvl">
+          <ac:chgData name="Sebastian Meine" userId="f54488a2a6b7dc9e" providerId="LiveId" clId="{762C8129-56AC-41EC-ADD7-A8DEE5433772}" dt="2021-07-21T11:36:38.712" v="1471" actId="478"/>
+          <ac:cxnSpMkLst>
+            <pc:docMk/>
+            <pc:sldMk cId="362378951" sldId="263"/>
+            <ac:cxnSpMk id="81" creationId="{C3052F66-9B5A-4D90-A8C8-505FDE8188DF}"/>
+          </ac:cxnSpMkLst>
+        </pc:cxnChg>
+        <pc:cxnChg chg="add del mod topLvl">
+          <ac:chgData name="Sebastian Meine" userId="f54488a2a6b7dc9e" providerId="LiveId" clId="{762C8129-56AC-41EC-ADD7-A8DEE5433772}" dt="2021-07-21T11:35:52.566" v="1470" actId="478"/>
+          <ac:cxnSpMkLst>
+            <pc:docMk/>
+            <pc:sldMk cId="362378951" sldId="263"/>
+            <ac:cxnSpMk id="82" creationId="{FAE93A71-60BC-4150-BE14-D517A0887F23}"/>
+          </ac:cxnSpMkLst>
+        </pc:cxnChg>
+        <pc:cxnChg chg="add del mod">
+          <ac:chgData name="Sebastian Meine" userId="f54488a2a6b7dc9e" providerId="LiveId" clId="{762C8129-56AC-41EC-ADD7-A8DEE5433772}" dt="2021-07-21T10:54:59.872" v="717"/>
+          <ac:cxnSpMkLst>
+            <pc:docMk/>
+            <pc:sldMk cId="362378951" sldId="263"/>
+            <ac:cxnSpMk id="83" creationId="{30BB1F1B-3DDB-4DC2-86C3-E8EA18EB74E1}"/>
+          </ac:cxnSpMkLst>
+        </pc:cxnChg>
+        <pc:cxnChg chg="add del mod">
+          <ac:chgData name="Sebastian Meine" userId="f54488a2a6b7dc9e" providerId="LiveId" clId="{762C8129-56AC-41EC-ADD7-A8DEE5433772}" dt="2021-07-21T10:54:59.872" v="717"/>
+          <ac:cxnSpMkLst>
+            <pc:docMk/>
+            <pc:sldMk cId="362378951" sldId="263"/>
+            <ac:cxnSpMk id="84" creationId="{282A8C56-A98C-4A6E-AE59-28B10106A0C2}"/>
+          </ac:cxnSpMkLst>
+        </pc:cxnChg>
+        <pc:cxnChg chg="add del mod">
+          <ac:chgData name="Sebastian Meine" userId="f54488a2a6b7dc9e" providerId="LiveId" clId="{762C8129-56AC-41EC-ADD7-A8DEE5433772}" dt="2021-07-21T10:54:59.872" v="717"/>
+          <ac:cxnSpMkLst>
+            <pc:docMk/>
+            <pc:sldMk cId="362378951" sldId="263"/>
+            <ac:cxnSpMk id="85" creationId="{E3723346-7C2D-4DE4-A190-B9880F32A8DE}"/>
+          </ac:cxnSpMkLst>
+        </pc:cxnChg>
+        <pc:cxnChg chg="add del mod topLvl">
+          <ac:chgData name="Sebastian Meine" userId="f54488a2a6b7dc9e" providerId="LiveId" clId="{762C8129-56AC-41EC-ADD7-A8DEE5433772}" dt="2021-07-21T11:36:38.712" v="1471" actId="478"/>
+          <ac:cxnSpMkLst>
+            <pc:docMk/>
+            <pc:sldMk cId="362378951" sldId="263"/>
+            <ac:cxnSpMk id="86" creationId="{FBF51318-D1B1-42C9-8BF4-B70B0564CB4D}"/>
+          </ac:cxnSpMkLst>
+        </pc:cxnChg>
+        <pc:cxnChg chg="add del mod topLvl">
+          <ac:chgData name="Sebastian Meine" userId="f54488a2a6b7dc9e" providerId="LiveId" clId="{762C8129-56AC-41EC-ADD7-A8DEE5433772}" dt="2021-07-21T11:36:38.712" v="1471" actId="478"/>
+          <ac:cxnSpMkLst>
+            <pc:docMk/>
+            <pc:sldMk cId="362378951" sldId="263"/>
+            <ac:cxnSpMk id="87" creationId="{866DF66F-D875-410E-8616-3D1202A12D58}"/>
+          </ac:cxnSpMkLst>
+        </pc:cxnChg>
+        <pc:cxnChg chg="add del mod topLvl">
+          <ac:chgData name="Sebastian Meine" userId="f54488a2a6b7dc9e" providerId="LiveId" clId="{762C8129-56AC-41EC-ADD7-A8DEE5433772}" dt="2021-07-21T11:35:52.566" v="1470" actId="478"/>
+          <ac:cxnSpMkLst>
+            <pc:docMk/>
+            <pc:sldMk cId="362378951" sldId="263"/>
+            <ac:cxnSpMk id="88" creationId="{3D57836C-837A-409E-BE93-848712BF5981}"/>
+          </ac:cxnSpMkLst>
+        </pc:cxnChg>
+        <pc:cxnChg chg="add del mod topLvl">
+          <ac:chgData name="Sebastian Meine" userId="f54488a2a6b7dc9e" providerId="LiveId" clId="{762C8129-56AC-41EC-ADD7-A8DEE5433772}" dt="2021-07-21T11:36:38.712" v="1471" actId="478"/>
+          <ac:cxnSpMkLst>
+            <pc:docMk/>
+            <pc:sldMk cId="362378951" sldId="263"/>
+            <ac:cxnSpMk id="89" creationId="{AA44D446-644B-4371-8E5A-8F3D65328F65}"/>
+          </ac:cxnSpMkLst>
+        </pc:cxnChg>
+        <pc:cxnChg chg="add del mod topLvl">
+          <ac:chgData name="Sebastian Meine" userId="f54488a2a6b7dc9e" providerId="LiveId" clId="{762C8129-56AC-41EC-ADD7-A8DEE5433772}" dt="2021-07-21T11:36:38.712" v="1471" actId="478"/>
+          <ac:cxnSpMkLst>
+            <pc:docMk/>
+            <pc:sldMk cId="362378951" sldId="263"/>
+            <ac:cxnSpMk id="90" creationId="{977A07A0-6614-4EC4-B5B0-30F3E5198FDB}"/>
+          </ac:cxnSpMkLst>
+        </pc:cxnChg>
+        <pc:cxnChg chg="add del mod topLvl">
+          <ac:chgData name="Sebastian Meine" userId="f54488a2a6b7dc9e" providerId="LiveId" clId="{762C8129-56AC-41EC-ADD7-A8DEE5433772}" dt="2021-07-21T11:35:52.566" v="1470" actId="478"/>
+          <ac:cxnSpMkLst>
+            <pc:docMk/>
+            <pc:sldMk cId="362378951" sldId="263"/>
+            <ac:cxnSpMk id="91" creationId="{6309E462-89C3-49C6-A8DC-E5C2368A4A81}"/>
+          </ac:cxnSpMkLst>
+        </pc:cxnChg>
+        <pc:cxnChg chg="add del mod topLvl">
+          <ac:chgData name="Sebastian Meine" userId="f54488a2a6b7dc9e" providerId="LiveId" clId="{762C8129-56AC-41EC-ADD7-A8DEE5433772}" dt="2021-07-21T11:36:38.712" v="1471" actId="478"/>
+          <ac:cxnSpMkLst>
+            <pc:docMk/>
+            <pc:sldMk cId="362378951" sldId="263"/>
+            <ac:cxnSpMk id="92" creationId="{5945FE7C-971F-482A-802E-153E983CBED9}"/>
+          </ac:cxnSpMkLst>
+        </pc:cxnChg>
+        <pc:cxnChg chg="add del mod topLvl">
+          <ac:chgData name="Sebastian Meine" userId="f54488a2a6b7dc9e" providerId="LiveId" clId="{762C8129-56AC-41EC-ADD7-A8DEE5433772}" dt="2021-07-21T11:36:38.712" v="1471" actId="478"/>
+          <ac:cxnSpMkLst>
+            <pc:docMk/>
+            <pc:sldMk cId="362378951" sldId="263"/>
+            <ac:cxnSpMk id="93" creationId="{D5E6647E-0185-4281-9BB5-C6A22215F917}"/>
+          </ac:cxnSpMkLst>
+        </pc:cxnChg>
+        <pc:cxnChg chg="add del mod topLvl">
+          <ac:chgData name="Sebastian Meine" userId="f54488a2a6b7dc9e" providerId="LiveId" clId="{762C8129-56AC-41EC-ADD7-A8DEE5433772}" dt="2021-07-21T11:35:52.566" v="1470" actId="478"/>
+          <ac:cxnSpMkLst>
+            <pc:docMk/>
+            <pc:sldMk cId="362378951" sldId="263"/>
+            <ac:cxnSpMk id="94" creationId="{0FDE8CB8-A594-4146-836A-48730F80877A}"/>
+          </ac:cxnSpMkLst>
+        </pc:cxnChg>
+        <pc:cxnChg chg="add del mod topLvl">
+          <ac:chgData name="Sebastian Meine" userId="f54488a2a6b7dc9e" providerId="LiveId" clId="{762C8129-56AC-41EC-ADD7-A8DEE5433772}" dt="2021-07-21T11:36:38.712" v="1471" actId="478"/>
+          <ac:cxnSpMkLst>
+            <pc:docMk/>
+            <pc:sldMk cId="362378951" sldId="263"/>
+            <ac:cxnSpMk id="95" creationId="{F133D6BC-971F-49F9-8075-260EC1759729}"/>
+          </ac:cxnSpMkLst>
+        </pc:cxnChg>
+        <pc:cxnChg chg="add del mod topLvl">
+          <ac:chgData name="Sebastian Meine" userId="f54488a2a6b7dc9e" providerId="LiveId" clId="{762C8129-56AC-41EC-ADD7-A8DEE5433772}" dt="2021-07-21T11:36:38.712" v="1471" actId="478"/>
+          <ac:cxnSpMkLst>
+            <pc:docMk/>
+            <pc:sldMk cId="362378951" sldId="263"/>
+            <ac:cxnSpMk id="96" creationId="{9D301A9A-7D57-4EC7-BBD5-9E451FB76AD7}"/>
+          </ac:cxnSpMkLst>
+        </pc:cxnChg>
+        <pc:cxnChg chg="add del mod topLvl">
+          <ac:chgData name="Sebastian Meine" userId="f54488a2a6b7dc9e" providerId="LiveId" clId="{762C8129-56AC-41EC-ADD7-A8DEE5433772}" dt="2021-07-21T11:35:52.566" v="1470" actId="478"/>
+          <ac:cxnSpMkLst>
+            <pc:docMk/>
+            <pc:sldMk cId="362378951" sldId="263"/>
+            <ac:cxnSpMk id="97" creationId="{95E91D7A-E522-41FE-AA2B-14F2F275F54F}"/>
+          </ac:cxnSpMkLst>
+        </pc:cxnChg>
+        <pc:cxnChg chg="add del mod topLvl">
+          <ac:chgData name="Sebastian Meine" userId="f54488a2a6b7dc9e" providerId="LiveId" clId="{762C8129-56AC-41EC-ADD7-A8DEE5433772}" dt="2021-07-21T11:36:38.712" v="1471" actId="478"/>
+          <ac:cxnSpMkLst>
+            <pc:docMk/>
+            <pc:sldMk cId="362378951" sldId="263"/>
+            <ac:cxnSpMk id="98" creationId="{38F4F638-3ADC-4D29-94CA-EE3DAE69F487}"/>
+          </ac:cxnSpMkLst>
+        </pc:cxnChg>
+        <pc:cxnChg chg="add del mod topLvl">
+          <ac:chgData name="Sebastian Meine" userId="f54488a2a6b7dc9e" providerId="LiveId" clId="{762C8129-56AC-41EC-ADD7-A8DEE5433772}" dt="2021-07-21T11:36:38.712" v="1471" actId="478"/>
+          <ac:cxnSpMkLst>
+            <pc:docMk/>
+            <pc:sldMk cId="362378951" sldId="263"/>
+            <ac:cxnSpMk id="99" creationId="{4631C8F0-621E-4A55-8CD0-4010D3012922}"/>
+          </ac:cxnSpMkLst>
+        </pc:cxnChg>
+        <pc:cxnChg chg="add del mod">
+          <ac:chgData name="Sebastian Meine" userId="f54488a2a6b7dc9e" providerId="LiveId" clId="{762C8129-56AC-41EC-ADD7-A8DEE5433772}" dt="2021-07-21T10:55:51.613" v="730" actId="478"/>
+          <ac:cxnSpMkLst>
+            <pc:docMk/>
+            <pc:sldMk cId="362378951" sldId="263"/>
+            <ac:cxnSpMk id="100" creationId="{67C1D83A-10C6-490F-8BF6-E9E7B1CCC0C6}"/>
+          </ac:cxnSpMkLst>
+        </pc:cxnChg>
+        <pc:cxnChg chg="add del mod topLvl">
+          <ac:chgData name="Sebastian Meine" userId="f54488a2a6b7dc9e" providerId="LiveId" clId="{762C8129-56AC-41EC-ADD7-A8DEE5433772}" dt="2021-07-21T11:36:38.712" v="1471" actId="478"/>
+          <ac:cxnSpMkLst>
+            <pc:docMk/>
+            <pc:sldMk cId="362378951" sldId="263"/>
+            <ac:cxnSpMk id="101" creationId="{CBD09E57-DF97-44D0-8EE2-CDD713CF3616}"/>
+          </ac:cxnSpMkLst>
+        </pc:cxnChg>
+        <pc:cxnChg chg="add del mod topLvl">
+          <ac:chgData name="Sebastian Meine" userId="f54488a2a6b7dc9e" providerId="LiveId" clId="{762C8129-56AC-41EC-ADD7-A8DEE5433772}" dt="2021-07-21T11:36:38.712" v="1471" actId="478"/>
+          <ac:cxnSpMkLst>
+            <pc:docMk/>
+            <pc:sldMk cId="362378951" sldId="263"/>
+            <ac:cxnSpMk id="102" creationId="{D56D64AC-BCBA-401A-8BD8-356903ADB112}"/>
+          </ac:cxnSpMkLst>
+        </pc:cxnChg>
+        <pc:cxnChg chg="add del mod topLvl">
+          <ac:chgData name="Sebastian Meine" userId="f54488a2a6b7dc9e" providerId="LiveId" clId="{762C8129-56AC-41EC-ADD7-A8DEE5433772}" dt="2021-07-21T11:35:52.566" v="1470" actId="478"/>
+          <ac:cxnSpMkLst>
+            <pc:docMk/>
+            <pc:sldMk cId="362378951" sldId="263"/>
+            <ac:cxnSpMk id="103" creationId="{0DF22BED-7B3C-4B4E-9EA6-2207A0C99582}"/>
+          </ac:cxnSpMkLst>
+        </pc:cxnChg>
+        <pc:cxnChg chg="add del mod topLvl">
+          <ac:chgData name="Sebastian Meine" userId="f54488a2a6b7dc9e" providerId="LiveId" clId="{762C8129-56AC-41EC-ADD7-A8DEE5433772}" dt="2021-07-21T11:36:38.712" v="1471" actId="478"/>
+          <ac:cxnSpMkLst>
+            <pc:docMk/>
+            <pc:sldMk cId="362378951" sldId="263"/>
+            <ac:cxnSpMk id="108" creationId="{D1A0BB38-0980-461B-B0AC-AEBFE3183D29}"/>
+          </ac:cxnSpMkLst>
+        </pc:cxnChg>
+        <pc:cxnChg chg="add del mod topLvl">
+          <ac:chgData name="Sebastian Meine" userId="f54488a2a6b7dc9e" providerId="LiveId" clId="{762C8129-56AC-41EC-ADD7-A8DEE5433772}" dt="2021-07-21T11:36:38.712" v="1471" actId="478"/>
+          <ac:cxnSpMkLst>
+            <pc:docMk/>
+            <pc:sldMk cId="362378951" sldId="263"/>
+            <ac:cxnSpMk id="109" creationId="{1800DCEE-7977-4B86-A77A-2C4661D78BD7}"/>
+          </ac:cxnSpMkLst>
+        </pc:cxnChg>
+        <pc:cxnChg chg="add del mod topLvl">
+          <ac:chgData name="Sebastian Meine" userId="f54488a2a6b7dc9e" providerId="LiveId" clId="{762C8129-56AC-41EC-ADD7-A8DEE5433772}" dt="2021-07-21T11:35:52.566" v="1470" actId="478"/>
+          <ac:cxnSpMkLst>
+            <pc:docMk/>
+            <pc:sldMk cId="362378951" sldId="263"/>
+            <ac:cxnSpMk id="110" creationId="{02F55A8F-46F2-4728-B417-DC7DEA230A14}"/>
+          </ac:cxnSpMkLst>
+        </pc:cxnChg>
+        <pc:cxnChg chg="add del mod topLvl">
+          <ac:chgData name="Sebastian Meine" userId="f54488a2a6b7dc9e" providerId="LiveId" clId="{762C8129-56AC-41EC-ADD7-A8DEE5433772}" dt="2021-07-21T11:36:38.712" v="1471" actId="478"/>
+          <ac:cxnSpMkLst>
+            <pc:docMk/>
+            <pc:sldMk cId="362378951" sldId="263"/>
+            <ac:cxnSpMk id="111" creationId="{059613AD-3F30-4D25-B8E6-BA3084CBD16B}"/>
+          </ac:cxnSpMkLst>
+        </pc:cxnChg>
+        <pc:cxnChg chg="add del mod topLvl">
+          <ac:chgData name="Sebastian Meine" userId="f54488a2a6b7dc9e" providerId="LiveId" clId="{762C8129-56AC-41EC-ADD7-A8DEE5433772}" dt="2021-07-21T11:36:38.712" v="1471" actId="478"/>
+          <ac:cxnSpMkLst>
+            <pc:docMk/>
+            <pc:sldMk cId="362378951" sldId="263"/>
+            <ac:cxnSpMk id="112" creationId="{25120E7B-51A7-432C-B1D5-EEE699E41F47}"/>
+          </ac:cxnSpMkLst>
+        </pc:cxnChg>
+        <pc:cxnChg chg="add del mod topLvl">
+          <ac:chgData name="Sebastian Meine" userId="f54488a2a6b7dc9e" providerId="LiveId" clId="{762C8129-56AC-41EC-ADD7-A8DEE5433772}" dt="2021-07-21T11:35:52.566" v="1470" actId="478"/>
+          <ac:cxnSpMkLst>
+            <pc:docMk/>
+            <pc:sldMk cId="362378951" sldId="263"/>
+            <ac:cxnSpMk id="113" creationId="{2FE4CB73-92BB-4082-9BB1-E6796D523AE8}"/>
+          </ac:cxnSpMkLst>
+        </pc:cxnChg>
+        <pc:cxnChg chg="add del mod">
+          <ac:chgData name="Sebastian Meine" userId="f54488a2a6b7dc9e" providerId="LiveId" clId="{762C8129-56AC-41EC-ADD7-A8DEE5433772}" dt="2021-07-21T10:58:00.114" v="865"/>
+          <ac:cxnSpMkLst>
+            <pc:docMk/>
+            <pc:sldMk cId="362378951" sldId="263"/>
+            <ac:cxnSpMk id="114" creationId="{8B38866D-0AA0-472E-954F-C5B13DEEC04D}"/>
+          </ac:cxnSpMkLst>
+        </pc:cxnChg>
+        <pc:cxnChg chg="add del mod">
+          <ac:chgData name="Sebastian Meine" userId="f54488a2a6b7dc9e" providerId="LiveId" clId="{762C8129-56AC-41EC-ADD7-A8DEE5433772}" dt="2021-07-21T10:58:00.114" v="865"/>
+          <ac:cxnSpMkLst>
+            <pc:docMk/>
+            <pc:sldMk cId="362378951" sldId="263"/>
+            <ac:cxnSpMk id="115" creationId="{46CAA9EB-7B94-4D34-AF8F-17D4A847B535}"/>
+          </ac:cxnSpMkLst>
+        </pc:cxnChg>
+        <pc:cxnChg chg="add del mod">
+          <ac:chgData name="Sebastian Meine" userId="f54488a2a6b7dc9e" providerId="LiveId" clId="{762C8129-56AC-41EC-ADD7-A8DEE5433772}" dt="2021-07-21T10:58:00.114" v="865"/>
+          <ac:cxnSpMkLst>
+            <pc:docMk/>
+            <pc:sldMk cId="362378951" sldId="263"/>
+            <ac:cxnSpMk id="116" creationId="{E0512FA2-63FA-404F-B509-8F9413E6CE18}"/>
+          </ac:cxnSpMkLst>
+        </pc:cxnChg>
+        <pc:cxnChg chg="add del mod topLvl">
+          <ac:chgData name="Sebastian Meine" userId="f54488a2a6b7dc9e" providerId="LiveId" clId="{762C8129-56AC-41EC-ADD7-A8DEE5433772}" dt="2021-07-21T11:36:38.712" v="1471" actId="478"/>
+          <ac:cxnSpMkLst>
+            <pc:docMk/>
+            <pc:sldMk cId="362378951" sldId="263"/>
+            <ac:cxnSpMk id="117" creationId="{A2D009C4-9F9A-4AB1-9CFD-CBD7948A3B4D}"/>
+          </ac:cxnSpMkLst>
+        </pc:cxnChg>
+        <pc:cxnChg chg="add del mod topLvl">
+          <ac:chgData name="Sebastian Meine" userId="f54488a2a6b7dc9e" providerId="LiveId" clId="{762C8129-56AC-41EC-ADD7-A8DEE5433772}" dt="2021-07-21T11:36:38.712" v="1471" actId="478"/>
+          <ac:cxnSpMkLst>
+            <pc:docMk/>
+            <pc:sldMk cId="362378951" sldId="263"/>
+            <ac:cxnSpMk id="118" creationId="{AEB4E4B7-CC4C-4875-9903-014BD200A5DC}"/>
+          </ac:cxnSpMkLst>
+        </pc:cxnChg>
+        <pc:cxnChg chg="add del mod topLvl">
+          <ac:chgData name="Sebastian Meine" userId="f54488a2a6b7dc9e" providerId="LiveId" clId="{762C8129-56AC-41EC-ADD7-A8DEE5433772}" dt="2021-07-21T11:35:52.566" v="1470" actId="478"/>
+          <ac:cxnSpMkLst>
+            <pc:docMk/>
+            <pc:sldMk cId="362378951" sldId="263"/>
+            <ac:cxnSpMk id="119" creationId="{184527EA-91AC-47C0-9CAA-3D3057672776}"/>
+          </ac:cxnSpMkLst>
+        </pc:cxnChg>
+        <pc:cxnChg chg="add del mod topLvl">
+          <ac:chgData name="Sebastian Meine" userId="f54488a2a6b7dc9e" providerId="LiveId" clId="{762C8129-56AC-41EC-ADD7-A8DEE5433772}" dt="2021-07-21T11:36:38.712" v="1471" actId="478"/>
+          <ac:cxnSpMkLst>
+            <pc:docMk/>
+            <pc:sldMk cId="362378951" sldId="263"/>
+            <ac:cxnSpMk id="120" creationId="{1FFDA1DD-C077-4680-AA24-0C9A4853627F}"/>
+          </ac:cxnSpMkLst>
+        </pc:cxnChg>
+        <pc:cxnChg chg="add del mod topLvl">
+          <ac:chgData name="Sebastian Meine" userId="f54488a2a6b7dc9e" providerId="LiveId" clId="{762C8129-56AC-41EC-ADD7-A8DEE5433772}" dt="2021-07-21T11:36:38.712" v="1471" actId="478"/>
+          <ac:cxnSpMkLst>
+            <pc:docMk/>
+            <pc:sldMk cId="362378951" sldId="263"/>
+            <ac:cxnSpMk id="121" creationId="{74224497-0F7D-495D-A4DA-3DAE395521CE}"/>
+          </ac:cxnSpMkLst>
+        </pc:cxnChg>
+        <pc:cxnChg chg="add del mod topLvl">
+          <ac:chgData name="Sebastian Meine" userId="f54488a2a6b7dc9e" providerId="LiveId" clId="{762C8129-56AC-41EC-ADD7-A8DEE5433772}" dt="2021-07-21T11:35:52.566" v="1470" actId="478"/>
+          <ac:cxnSpMkLst>
+            <pc:docMk/>
+            <pc:sldMk cId="362378951" sldId="263"/>
+            <ac:cxnSpMk id="122" creationId="{75DD3674-22F2-424B-897C-1BEF90149A84}"/>
+          </ac:cxnSpMkLst>
+        </pc:cxnChg>
+        <pc:cxnChg chg="add del mod topLvl">
+          <ac:chgData name="Sebastian Meine" userId="f54488a2a6b7dc9e" providerId="LiveId" clId="{762C8129-56AC-41EC-ADD7-A8DEE5433772}" dt="2021-07-21T11:35:52.566" v="1470" actId="478"/>
+          <ac:cxnSpMkLst>
+            <pc:docMk/>
+            <pc:sldMk cId="362378951" sldId="263"/>
+            <ac:cxnSpMk id="123" creationId="{2EB260D9-22D4-4682-9393-FEE846165C41}"/>
+          </ac:cxnSpMkLst>
+        </pc:cxnChg>
+        <pc:cxnChg chg="add del mod topLvl">
+          <ac:chgData name="Sebastian Meine" userId="f54488a2a6b7dc9e" providerId="LiveId" clId="{762C8129-56AC-41EC-ADD7-A8DEE5433772}" dt="2021-07-21T11:36:38.712" v="1471" actId="478"/>
+          <ac:cxnSpMkLst>
+            <pc:docMk/>
+            <pc:sldMk cId="362378951" sldId="263"/>
+            <ac:cxnSpMk id="124" creationId="{C7BA54DF-D0C7-45A9-83C2-1AD500CB3E9E}"/>
+          </ac:cxnSpMkLst>
+        </pc:cxnChg>
+        <pc:cxnChg chg="add del mod topLvl">
+          <ac:chgData name="Sebastian Meine" userId="f54488a2a6b7dc9e" providerId="LiveId" clId="{762C8129-56AC-41EC-ADD7-A8DEE5433772}" dt="2021-07-21T11:35:52.566" v="1470" actId="478"/>
+          <ac:cxnSpMkLst>
+            <pc:docMk/>
+            <pc:sldMk cId="362378951" sldId="263"/>
+            <ac:cxnSpMk id="125" creationId="{91EE1DC4-E184-4DAB-A8CC-15BC134B5106}"/>
+          </ac:cxnSpMkLst>
+        </pc:cxnChg>
+        <pc:cxnChg chg="add del mod topLvl">
+          <ac:chgData name="Sebastian Meine" userId="f54488a2a6b7dc9e" providerId="LiveId" clId="{762C8129-56AC-41EC-ADD7-A8DEE5433772}" dt="2021-07-21T11:35:20.640" v="1462" actId="478"/>
+          <ac:cxnSpMkLst>
+            <pc:docMk/>
+            <pc:sldMk cId="362378951" sldId="263"/>
+            <ac:cxnSpMk id="126" creationId="{5B1E355E-84C8-4FFF-886F-BE2350CD5884}"/>
+          </ac:cxnSpMkLst>
+        </pc:cxnChg>
+        <pc:cxnChg chg="add del mod topLvl">
+          <ac:chgData name="Sebastian Meine" userId="f54488a2a6b7dc9e" providerId="LiveId" clId="{762C8129-56AC-41EC-ADD7-A8DEE5433772}" dt="2021-07-21T11:35:21.677" v="1463" actId="478"/>
+          <ac:cxnSpMkLst>
+            <pc:docMk/>
+            <pc:sldMk cId="362378951" sldId="263"/>
+            <ac:cxnSpMk id="127" creationId="{B7F335C2-6ECF-48B4-ADE2-696F9380E134}"/>
+          </ac:cxnSpMkLst>
+        </pc:cxnChg>
+        <pc:cxnChg chg="add del mod topLvl">
+          <ac:chgData name="Sebastian Meine" userId="f54488a2a6b7dc9e" providerId="LiveId" clId="{762C8129-56AC-41EC-ADD7-A8DEE5433772}" dt="2021-07-21T11:35:22.698" v="1464" actId="478"/>
+          <ac:cxnSpMkLst>
+            <pc:docMk/>
+            <pc:sldMk cId="362378951" sldId="263"/>
+            <ac:cxnSpMk id="128" creationId="{1C530278-2743-483F-B1D9-EEAD1476B3A8}"/>
+          </ac:cxnSpMkLst>
+        </pc:cxnChg>
+        <pc:cxnChg chg="add del mod topLvl">
+          <ac:chgData name="Sebastian Meine" userId="f54488a2a6b7dc9e" providerId="LiveId" clId="{762C8129-56AC-41EC-ADD7-A8DEE5433772}" dt="2021-07-21T11:35:23.404" v="1465" actId="478"/>
+          <ac:cxnSpMkLst>
+            <pc:docMk/>
+            <pc:sldMk cId="362378951" sldId="263"/>
+            <ac:cxnSpMk id="129" creationId="{EC9C998B-E07E-47BB-BC01-22A1B96321E5}"/>
+          </ac:cxnSpMkLst>
+        </pc:cxnChg>
+        <pc:cxnChg chg="add del mod topLvl">
+          <ac:chgData name="Sebastian Meine" userId="f54488a2a6b7dc9e" providerId="LiveId" clId="{762C8129-56AC-41EC-ADD7-A8DEE5433772}" dt="2021-07-21T11:35:24.297" v="1466" actId="478"/>
+          <ac:cxnSpMkLst>
+            <pc:docMk/>
+            <pc:sldMk cId="362378951" sldId="263"/>
+            <ac:cxnSpMk id="130" creationId="{F77C2736-08F1-451F-AB7D-17039071E728}"/>
+          </ac:cxnSpMkLst>
+        </pc:cxnChg>
+        <pc:cxnChg chg="add del mod topLvl">
+          <ac:chgData name="Sebastian Meine" userId="f54488a2a6b7dc9e" providerId="LiveId" clId="{762C8129-56AC-41EC-ADD7-A8DEE5433772}" dt="2021-07-21T11:35:25.312" v="1467" actId="478"/>
+          <ac:cxnSpMkLst>
+            <pc:docMk/>
+            <pc:sldMk cId="362378951" sldId="263"/>
+            <ac:cxnSpMk id="131" creationId="{DD4D6E6D-4EC3-4E24-831A-B4539B79C7BF}"/>
+          </ac:cxnSpMkLst>
+        </pc:cxnChg>
+        <pc:cxnChg chg="add mod topLvl">
+          <ac:chgData name="Sebastian Meine" userId="f54488a2a6b7dc9e" providerId="LiveId" clId="{762C8129-56AC-41EC-ADD7-A8DEE5433772}" dt="2021-07-21T11:25:17.710" v="1385" actId="1076"/>
+          <ac:cxnSpMkLst>
+            <pc:docMk/>
+            <pc:sldMk cId="362378951" sldId="263"/>
+            <ac:cxnSpMk id="133" creationId="{D4A04664-43DE-4D6D-8612-ED0EFFCB70BC}"/>
+          </ac:cxnSpMkLst>
+        </pc:cxnChg>
+        <pc:cxnChg chg="add mod">
+          <ac:chgData name="Sebastian Meine" userId="f54488a2a6b7dc9e" providerId="LiveId" clId="{762C8129-56AC-41EC-ADD7-A8DEE5433772}" dt="2021-07-21T11:12:15.534" v="986" actId="571"/>
+          <ac:cxnSpMkLst>
+            <pc:docMk/>
+            <pc:sldMk cId="362378951" sldId="263"/>
+            <ac:cxnSpMk id="137" creationId="{E45DAFFB-D025-4201-8EFE-678A3E5E2435}"/>
+          </ac:cxnSpMkLst>
+        </pc:cxnChg>
+        <pc:cxnChg chg="add mod">
+          <ac:chgData name="Sebastian Meine" userId="f54488a2a6b7dc9e" providerId="LiveId" clId="{762C8129-56AC-41EC-ADD7-A8DEE5433772}" dt="2021-07-21T11:12:15.534" v="986" actId="571"/>
+          <ac:cxnSpMkLst>
+            <pc:docMk/>
+            <pc:sldMk cId="362378951" sldId="263"/>
+            <ac:cxnSpMk id="139" creationId="{721E7C5D-F9CB-4FEB-A3DB-F32E8B3EA3EF}"/>
+          </ac:cxnSpMkLst>
+        </pc:cxnChg>
+        <pc:cxnChg chg="add mod">
+          <ac:chgData name="Sebastian Meine" userId="f54488a2a6b7dc9e" providerId="LiveId" clId="{762C8129-56AC-41EC-ADD7-A8DEE5433772}" dt="2021-07-21T11:12:15.534" v="986" actId="571"/>
+          <ac:cxnSpMkLst>
+            <pc:docMk/>
+            <pc:sldMk cId="362378951" sldId="263"/>
+            <ac:cxnSpMk id="141" creationId="{654962E0-6256-4BCD-B3E2-3FB11D640FBF}"/>
+          </ac:cxnSpMkLst>
+        </pc:cxnChg>
+        <pc:cxnChg chg="add mod">
+          <ac:chgData name="Sebastian Meine" userId="f54488a2a6b7dc9e" providerId="LiveId" clId="{762C8129-56AC-41EC-ADD7-A8DEE5433772}" dt="2021-07-21T11:12:15.534" v="986" actId="571"/>
+          <ac:cxnSpMkLst>
+            <pc:docMk/>
+            <pc:sldMk cId="362378951" sldId="263"/>
+            <ac:cxnSpMk id="142" creationId="{BB6CF6F0-BFBB-4B08-8F38-0BBA948631DD}"/>
+          </ac:cxnSpMkLst>
+        </pc:cxnChg>
+        <pc:cxnChg chg="add mod">
+          <ac:chgData name="Sebastian Meine" userId="f54488a2a6b7dc9e" providerId="LiveId" clId="{762C8129-56AC-41EC-ADD7-A8DEE5433772}" dt="2021-07-21T11:12:15.534" v="986" actId="571"/>
+          <ac:cxnSpMkLst>
+            <pc:docMk/>
+            <pc:sldMk cId="362378951" sldId="263"/>
+            <ac:cxnSpMk id="143" creationId="{D594E35F-1E97-4C51-9CA3-2AC13B4F57B7}"/>
+          </ac:cxnSpMkLst>
+        </pc:cxnChg>
+        <pc:cxnChg chg="add mod">
+          <ac:chgData name="Sebastian Meine" userId="f54488a2a6b7dc9e" providerId="LiveId" clId="{762C8129-56AC-41EC-ADD7-A8DEE5433772}" dt="2021-07-21T11:12:15.534" v="986" actId="571"/>
+          <ac:cxnSpMkLst>
+            <pc:docMk/>
+            <pc:sldMk cId="362378951" sldId="263"/>
+            <ac:cxnSpMk id="144" creationId="{A9E0F8B6-AEF7-44F8-B8E6-BA771A2E354D}"/>
+          </ac:cxnSpMkLst>
+        </pc:cxnChg>
+        <pc:cxnChg chg="add mod">
+          <ac:chgData name="Sebastian Meine" userId="f54488a2a6b7dc9e" providerId="LiveId" clId="{762C8129-56AC-41EC-ADD7-A8DEE5433772}" dt="2021-07-21T11:12:15.534" v="986" actId="571"/>
+          <ac:cxnSpMkLst>
+            <pc:docMk/>
+            <pc:sldMk cId="362378951" sldId="263"/>
+            <ac:cxnSpMk id="145" creationId="{2EDBAFA9-D285-476D-AF65-512CE9C62AA0}"/>
+          </ac:cxnSpMkLst>
+        </pc:cxnChg>
+        <pc:cxnChg chg="add mod">
+          <ac:chgData name="Sebastian Meine" userId="f54488a2a6b7dc9e" providerId="LiveId" clId="{762C8129-56AC-41EC-ADD7-A8DEE5433772}" dt="2021-07-21T11:12:15.534" v="986" actId="571"/>
+          <ac:cxnSpMkLst>
+            <pc:docMk/>
+            <pc:sldMk cId="362378951" sldId="263"/>
+            <ac:cxnSpMk id="146" creationId="{97AEF6BC-EF71-4FE3-A966-DF4BE0841FC2}"/>
+          </ac:cxnSpMkLst>
+        </pc:cxnChg>
+        <pc:cxnChg chg="add mod">
+          <ac:chgData name="Sebastian Meine" userId="f54488a2a6b7dc9e" providerId="LiveId" clId="{762C8129-56AC-41EC-ADD7-A8DEE5433772}" dt="2021-07-21T11:12:15.534" v="986" actId="571"/>
+          <ac:cxnSpMkLst>
+            <pc:docMk/>
+            <pc:sldMk cId="362378951" sldId="263"/>
+            <ac:cxnSpMk id="147" creationId="{021FAB41-21CE-412C-9757-33EFCDD9191E}"/>
+          </ac:cxnSpMkLst>
+        </pc:cxnChg>
+        <pc:cxnChg chg="add mod">
+          <ac:chgData name="Sebastian Meine" userId="f54488a2a6b7dc9e" providerId="LiveId" clId="{762C8129-56AC-41EC-ADD7-A8DEE5433772}" dt="2021-07-21T11:12:15.534" v="986" actId="571"/>
+          <ac:cxnSpMkLst>
+            <pc:docMk/>
+            <pc:sldMk cId="362378951" sldId="263"/>
+            <ac:cxnSpMk id="148" creationId="{B8EC6A24-1FC6-446E-9665-14186AFA4582}"/>
+          </ac:cxnSpMkLst>
+        </pc:cxnChg>
+        <pc:cxnChg chg="add mod">
+          <ac:chgData name="Sebastian Meine" userId="f54488a2a6b7dc9e" providerId="LiveId" clId="{762C8129-56AC-41EC-ADD7-A8DEE5433772}" dt="2021-07-21T11:12:15.534" v="986" actId="571"/>
+          <ac:cxnSpMkLst>
+            <pc:docMk/>
+            <pc:sldMk cId="362378951" sldId="263"/>
+            <ac:cxnSpMk id="149" creationId="{26349E5D-5F80-4310-95E1-28021AAB14B1}"/>
+          </ac:cxnSpMkLst>
+        </pc:cxnChg>
+        <pc:cxnChg chg="add mod">
+          <ac:chgData name="Sebastian Meine" userId="f54488a2a6b7dc9e" providerId="LiveId" clId="{762C8129-56AC-41EC-ADD7-A8DEE5433772}" dt="2021-07-21T11:12:15.534" v="986" actId="571"/>
+          <ac:cxnSpMkLst>
+            <pc:docMk/>
+            <pc:sldMk cId="362378951" sldId="263"/>
+            <ac:cxnSpMk id="150" creationId="{36C29BA8-0F2C-4F14-8D64-5DCAA6DCEF23}"/>
+          </ac:cxnSpMkLst>
+        </pc:cxnChg>
+        <pc:cxnChg chg="add mod">
+          <ac:chgData name="Sebastian Meine" userId="f54488a2a6b7dc9e" providerId="LiveId" clId="{762C8129-56AC-41EC-ADD7-A8DEE5433772}" dt="2021-07-21T11:12:15.534" v="986" actId="571"/>
+          <ac:cxnSpMkLst>
+            <pc:docMk/>
+            <pc:sldMk cId="362378951" sldId="263"/>
+            <ac:cxnSpMk id="151" creationId="{CCF44DFA-30D9-4691-B273-BF49E38D8233}"/>
+          </ac:cxnSpMkLst>
+        </pc:cxnChg>
+        <pc:cxnChg chg="add mod">
+          <ac:chgData name="Sebastian Meine" userId="f54488a2a6b7dc9e" providerId="LiveId" clId="{762C8129-56AC-41EC-ADD7-A8DEE5433772}" dt="2021-07-21T11:12:15.534" v="986" actId="571"/>
+          <ac:cxnSpMkLst>
+            <pc:docMk/>
+            <pc:sldMk cId="362378951" sldId="263"/>
+            <ac:cxnSpMk id="152" creationId="{E2D1EE7D-EDC2-4779-903A-DCD38F4243FD}"/>
+          </ac:cxnSpMkLst>
+        </pc:cxnChg>
+        <pc:cxnChg chg="add mod">
+          <ac:chgData name="Sebastian Meine" userId="f54488a2a6b7dc9e" providerId="LiveId" clId="{762C8129-56AC-41EC-ADD7-A8DEE5433772}" dt="2021-07-21T11:12:15.534" v="986" actId="571"/>
+          <ac:cxnSpMkLst>
+            <pc:docMk/>
+            <pc:sldMk cId="362378951" sldId="263"/>
+            <ac:cxnSpMk id="153" creationId="{D4F7D47B-6D87-401C-A446-5E0844A3BBD5}"/>
+          </ac:cxnSpMkLst>
+        </pc:cxnChg>
+        <pc:cxnChg chg="add mod">
+          <ac:chgData name="Sebastian Meine" userId="f54488a2a6b7dc9e" providerId="LiveId" clId="{762C8129-56AC-41EC-ADD7-A8DEE5433772}" dt="2021-07-21T11:12:15.534" v="986" actId="571"/>
+          <ac:cxnSpMkLst>
+            <pc:docMk/>
+            <pc:sldMk cId="362378951" sldId="263"/>
+            <ac:cxnSpMk id="154" creationId="{5842CEA3-C8A0-4D32-A3E0-93BD9B124D92}"/>
+          </ac:cxnSpMkLst>
+        </pc:cxnChg>
+        <pc:cxnChg chg="add mod">
+          <ac:chgData name="Sebastian Meine" userId="f54488a2a6b7dc9e" providerId="LiveId" clId="{762C8129-56AC-41EC-ADD7-A8DEE5433772}" dt="2021-07-21T11:12:15.534" v="986" actId="571"/>
+          <ac:cxnSpMkLst>
+            <pc:docMk/>
+            <pc:sldMk cId="362378951" sldId="263"/>
+            <ac:cxnSpMk id="155" creationId="{97FE16B8-5CAE-4C24-9520-15208BC25BEB}"/>
+          </ac:cxnSpMkLst>
+        </pc:cxnChg>
+        <pc:cxnChg chg="add mod">
+          <ac:chgData name="Sebastian Meine" userId="f54488a2a6b7dc9e" providerId="LiveId" clId="{762C8129-56AC-41EC-ADD7-A8DEE5433772}" dt="2021-07-21T11:12:15.534" v="986" actId="571"/>
+          <ac:cxnSpMkLst>
+            <pc:docMk/>
+            <pc:sldMk cId="362378951" sldId="263"/>
+            <ac:cxnSpMk id="156" creationId="{790571E1-C439-4288-BCDC-2D907CDBE472}"/>
+          </ac:cxnSpMkLst>
+        </pc:cxnChg>
+        <pc:cxnChg chg="add mod">
+          <ac:chgData name="Sebastian Meine" userId="f54488a2a6b7dc9e" providerId="LiveId" clId="{762C8129-56AC-41EC-ADD7-A8DEE5433772}" dt="2021-07-21T11:12:15.534" v="986" actId="571"/>
+          <ac:cxnSpMkLst>
+            <pc:docMk/>
+            <pc:sldMk cId="362378951" sldId="263"/>
+            <ac:cxnSpMk id="157" creationId="{CB3E2CC3-4D01-4025-B2D2-CAC269011DAE}"/>
+          </ac:cxnSpMkLst>
+        </pc:cxnChg>
+        <pc:cxnChg chg="add mod">
+          <ac:chgData name="Sebastian Meine" userId="f54488a2a6b7dc9e" providerId="LiveId" clId="{762C8129-56AC-41EC-ADD7-A8DEE5433772}" dt="2021-07-21T11:12:14.978" v="985" actId="571"/>
+          <ac:cxnSpMkLst>
+            <pc:docMk/>
+            <pc:sldMk cId="362378951" sldId="263"/>
+            <ac:cxnSpMk id="174" creationId="{F83BF8FE-F617-4503-B3EB-39E5416CB9AC}"/>
+          </ac:cxnSpMkLst>
+        </pc:cxnChg>
+        <pc:cxnChg chg="add mod">
+          <ac:chgData name="Sebastian Meine" userId="f54488a2a6b7dc9e" providerId="LiveId" clId="{762C8129-56AC-41EC-ADD7-A8DEE5433772}" dt="2021-07-21T11:12:14.978" v="985" actId="571"/>
+          <ac:cxnSpMkLst>
+            <pc:docMk/>
+            <pc:sldMk cId="362378951" sldId="263"/>
+            <ac:cxnSpMk id="175" creationId="{D938618D-574E-4730-A7CB-ABB16292E8F9}"/>
+          </ac:cxnSpMkLst>
+        </pc:cxnChg>
+        <pc:cxnChg chg="add mod">
+          <ac:chgData name="Sebastian Meine" userId="f54488a2a6b7dc9e" providerId="LiveId" clId="{762C8129-56AC-41EC-ADD7-A8DEE5433772}" dt="2021-07-21T11:12:14.978" v="985" actId="571"/>
+          <ac:cxnSpMkLst>
+            <pc:docMk/>
+            <pc:sldMk cId="362378951" sldId="263"/>
+            <ac:cxnSpMk id="177" creationId="{0D1EC9C5-DD96-4C5C-B30F-C72A321D9E75}"/>
+          </ac:cxnSpMkLst>
+        </pc:cxnChg>
+        <pc:cxnChg chg="add mod">
+          <ac:chgData name="Sebastian Meine" userId="f54488a2a6b7dc9e" providerId="LiveId" clId="{762C8129-56AC-41EC-ADD7-A8DEE5433772}" dt="2021-07-21T11:12:14.978" v="985" actId="571"/>
+          <ac:cxnSpMkLst>
+            <pc:docMk/>
+            <pc:sldMk cId="362378951" sldId="263"/>
+            <ac:cxnSpMk id="179" creationId="{4761D53E-BA6F-4009-B5F9-6E0875D1EB2A}"/>
+          </ac:cxnSpMkLst>
+        </pc:cxnChg>
+        <pc:cxnChg chg="add mod">
+          <ac:chgData name="Sebastian Meine" userId="f54488a2a6b7dc9e" providerId="LiveId" clId="{762C8129-56AC-41EC-ADD7-A8DEE5433772}" dt="2021-07-21T11:12:14.978" v="985" actId="571"/>
+          <ac:cxnSpMkLst>
+            <pc:docMk/>
+            <pc:sldMk cId="362378951" sldId="263"/>
+            <ac:cxnSpMk id="180" creationId="{7454FB4A-9937-49F6-A37F-744F1F7419AE}"/>
+          </ac:cxnSpMkLst>
+        </pc:cxnChg>
+        <pc:cxnChg chg="add mod">
+          <ac:chgData name="Sebastian Meine" userId="f54488a2a6b7dc9e" providerId="LiveId" clId="{762C8129-56AC-41EC-ADD7-A8DEE5433772}" dt="2021-07-21T11:12:14.978" v="985" actId="571"/>
+          <ac:cxnSpMkLst>
+            <pc:docMk/>
+            <pc:sldMk cId="362378951" sldId="263"/>
+            <ac:cxnSpMk id="181" creationId="{5F78F936-B03A-4B61-B839-A820C761EE29}"/>
+          </ac:cxnSpMkLst>
+        </pc:cxnChg>
+        <pc:cxnChg chg="add mod">
+          <ac:chgData name="Sebastian Meine" userId="f54488a2a6b7dc9e" providerId="LiveId" clId="{762C8129-56AC-41EC-ADD7-A8DEE5433772}" dt="2021-07-21T11:12:14.978" v="985" actId="571"/>
+          <ac:cxnSpMkLst>
+            <pc:docMk/>
+            <pc:sldMk cId="362378951" sldId="263"/>
+            <ac:cxnSpMk id="182" creationId="{650EDD3D-C5BB-43D9-B7FD-897F98D715D2}"/>
+          </ac:cxnSpMkLst>
+        </pc:cxnChg>
+        <pc:cxnChg chg="add mod">
+          <ac:chgData name="Sebastian Meine" userId="f54488a2a6b7dc9e" providerId="LiveId" clId="{762C8129-56AC-41EC-ADD7-A8DEE5433772}" dt="2021-07-21T11:12:14.978" v="985" actId="571"/>
+          <ac:cxnSpMkLst>
+            <pc:docMk/>
+            <pc:sldMk cId="362378951" sldId="263"/>
+            <ac:cxnSpMk id="183" creationId="{FC05760F-3CA7-4EB3-B403-88F4651C8570}"/>
+          </ac:cxnSpMkLst>
+        </pc:cxnChg>
+        <pc:cxnChg chg="add mod">
+          <ac:chgData name="Sebastian Meine" userId="f54488a2a6b7dc9e" providerId="LiveId" clId="{762C8129-56AC-41EC-ADD7-A8DEE5433772}" dt="2021-07-21T11:12:14.978" v="985" actId="571"/>
+          <ac:cxnSpMkLst>
+            <pc:docMk/>
+            <pc:sldMk cId="362378951" sldId="263"/>
+            <ac:cxnSpMk id="184" creationId="{0E9DA758-F250-49CD-8452-3A092D4BD22C}"/>
+          </ac:cxnSpMkLst>
+        </pc:cxnChg>
+        <pc:cxnChg chg="add mod">
+          <ac:chgData name="Sebastian Meine" userId="f54488a2a6b7dc9e" providerId="LiveId" clId="{762C8129-56AC-41EC-ADD7-A8DEE5433772}" dt="2021-07-21T11:12:14.978" v="985" actId="571"/>
+          <ac:cxnSpMkLst>
+            <pc:docMk/>
+            <pc:sldMk cId="362378951" sldId="263"/>
+            <ac:cxnSpMk id="185" creationId="{7E1EC040-9EBD-433B-944A-FF6A56B5D4A3}"/>
+          </ac:cxnSpMkLst>
+        </pc:cxnChg>
+        <pc:cxnChg chg="add mod">
+          <ac:chgData name="Sebastian Meine" userId="f54488a2a6b7dc9e" providerId="LiveId" clId="{762C8129-56AC-41EC-ADD7-A8DEE5433772}" dt="2021-07-21T11:12:14.978" v="985" actId="571"/>
+          <ac:cxnSpMkLst>
+            <pc:docMk/>
+            <pc:sldMk cId="362378951" sldId="263"/>
+            <ac:cxnSpMk id="186" creationId="{DE4928AC-0584-4E84-917B-F28BC84095E5}"/>
+          </ac:cxnSpMkLst>
+        </pc:cxnChg>
+        <pc:cxnChg chg="add mod">
+          <ac:chgData name="Sebastian Meine" userId="f54488a2a6b7dc9e" providerId="LiveId" clId="{762C8129-56AC-41EC-ADD7-A8DEE5433772}" dt="2021-07-21T11:12:14.978" v="985" actId="571"/>
+          <ac:cxnSpMkLst>
+            <pc:docMk/>
+            <pc:sldMk cId="362378951" sldId="263"/>
+            <ac:cxnSpMk id="187" creationId="{2F9A6ED6-E08D-4ED6-9DA7-69400889D21A}"/>
+          </ac:cxnSpMkLst>
+        </pc:cxnChg>
+        <pc:cxnChg chg="add mod">
+          <ac:chgData name="Sebastian Meine" userId="f54488a2a6b7dc9e" providerId="LiveId" clId="{762C8129-56AC-41EC-ADD7-A8DEE5433772}" dt="2021-07-21T11:12:14.978" v="985" actId="571"/>
+          <ac:cxnSpMkLst>
+            <pc:docMk/>
+            <pc:sldMk cId="362378951" sldId="263"/>
+            <ac:cxnSpMk id="188" creationId="{0898A8E4-50E1-4545-BAE9-FBFB63E1B8E2}"/>
+          </ac:cxnSpMkLst>
+        </pc:cxnChg>
+        <pc:cxnChg chg="add mod">
+          <ac:chgData name="Sebastian Meine" userId="f54488a2a6b7dc9e" providerId="LiveId" clId="{762C8129-56AC-41EC-ADD7-A8DEE5433772}" dt="2021-07-21T11:12:14.978" v="985" actId="571"/>
+          <ac:cxnSpMkLst>
+            <pc:docMk/>
+            <pc:sldMk cId="362378951" sldId="263"/>
+            <ac:cxnSpMk id="189" creationId="{682890B5-ADF3-44B6-977D-1311AEBC7B52}"/>
+          </ac:cxnSpMkLst>
+        </pc:cxnChg>
+        <pc:cxnChg chg="add mod">
+          <ac:chgData name="Sebastian Meine" userId="f54488a2a6b7dc9e" providerId="LiveId" clId="{762C8129-56AC-41EC-ADD7-A8DEE5433772}" dt="2021-07-21T11:12:14.978" v="985" actId="571"/>
+          <ac:cxnSpMkLst>
+            <pc:docMk/>
+            <pc:sldMk cId="362378951" sldId="263"/>
+            <ac:cxnSpMk id="190" creationId="{6D290FA0-FC8C-4FF3-8C99-3D7FE7DF6339}"/>
+          </ac:cxnSpMkLst>
+        </pc:cxnChg>
+        <pc:cxnChg chg="add mod">
+          <ac:chgData name="Sebastian Meine" userId="f54488a2a6b7dc9e" providerId="LiveId" clId="{762C8129-56AC-41EC-ADD7-A8DEE5433772}" dt="2021-07-21T11:12:14.978" v="985" actId="571"/>
+          <ac:cxnSpMkLst>
+            <pc:docMk/>
+            <pc:sldMk cId="362378951" sldId="263"/>
+            <ac:cxnSpMk id="191" creationId="{E3B35F09-E5E6-4D84-B330-493041DCAAB6}"/>
+          </ac:cxnSpMkLst>
+        </pc:cxnChg>
+        <pc:cxnChg chg="add mod">
+          <ac:chgData name="Sebastian Meine" userId="f54488a2a6b7dc9e" providerId="LiveId" clId="{762C8129-56AC-41EC-ADD7-A8DEE5433772}" dt="2021-07-21T11:12:14.978" v="985" actId="571"/>
+          <ac:cxnSpMkLst>
+            <pc:docMk/>
+            <pc:sldMk cId="362378951" sldId="263"/>
+            <ac:cxnSpMk id="192" creationId="{CEE58F86-3E46-423E-B68C-CD8FB4B5584E}"/>
+          </ac:cxnSpMkLst>
+        </pc:cxnChg>
+        <pc:cxnChg chg="add mod">
+          <ac:chgData name="Sebastian Meine" userId="f54488a2a6b7dc9e" providerId="LiveId" clId="{762C8129-56AC-41EC-ADD7-A8DEE5433772}" dt="2021-07-21T11:12:14.978" v="985" actId="571"/>
+          <ac:cxnSpMkLst>
+            <pc:docMk/>
+            <pc:sldMk cId="362378951" sldId="263"/>
+            <ac:cxnSpMk id="193" creationId="{46EEA459-AF53-4863-B9F6-E70329B0B365}"/>
+          </ac:cxnSpMkLst>
+        </pc:cxnChg>
+        <pc:cxnChg chg="add mod">
+          <ac:chgData name="Sebastian Meine" userId="f54488a2a6b7dc9e" providerId="LiveId" clId="{762C8129-56AC-41EC-ADD7-A8DEE5433772}" dt="2021-07-21T11:12:14.978" v="985" actId="571"/>
+          <ac:cxnSpMkLst>
+            <pc:docMk/>
+            <pc:sldMk cId="362378951" sldId="263"/>
+            <ac:cxnSpMk id="194" creationId="{78E35EFB-EC97-4799-B409-1B50B85A1F1C}"/>
+          </ac:cxnSpMkLst>
+        </pc:cxnChg>
+        <pc:cxnChg chg="add mod">
+          <ac:chgData name="Sebastian Meine" userId="f54488a2a6b7dc9e" providerId="LiveId" clId="{762C8129-56AC-41EC-ADD7-A8DEE5433772}" dt="2021-07-21T11:12:14.978" v="985" actId="571"/>
+          <ac:cxnSpMkLst>
+            <pc:docMk/>
+            <pc:sldMk cId="362378951" sldId="263"/>
+            <ac:cxnSpMk id="195" creationId="{C706C585-CF88-489E-A96C-8AA93CD5A6DE}"/>
+          </ac:cxnSpMkLst>
+        </pc:cxnChg>
+        <pc:cxnChg chg="add del">
+          <ac:chgData name="Sebastian Meine" userId="f54488a2a6b7dc9e" providerId="LiveId" clId="{762C8129-56AC-41EC-ADD7-A8DEE5433772}" dt="2021-07-21T11:22:40.952" v="1372" actId="11529"/>
+          <ac:cxnSpMkLst>
+            <pc:docMk/>
+            <pc:sldMk cId="362378951" sldId="263"/>
+            <ac:cxnSpMk id="197" creationId="{D3F7BC26-E73E-44EE-AD16-EC00CC42065A}"/>
+          </ac:cxnSpMkLst>
+        </pc:cxnChg>
+        <pc:cxnChg chg="add del">
+          <ac:chgData name="Sebastian Meine" userId="f54488a2a6b7dc9e" providerId="LiveId" clId="{762C8129-56AC-41EC-ADD7-A8DEE5433772}" dt="2021-07-21T11:23:04.575" v="1376" actId="478"/>
+          <ac:cxnSpMkLst>
+            <pc:docMk/>
+            <pc:sldMk cId="362378951" sldId="263"/>
+            <ac:cxnSpMk id="199" creationId="{ED8542D8-4AD3-4AF9-AC5B-8123E158E6D4}"/>
+          </ac:cxnSpMkLst>
+        </pc:cxnChg>
+        <pc:cxnChg chg="add del mod">
+          <ac:chgData name="Sebastian Meine" userId="f54488a2a6b7dc9e" providerId="LiveId" clId="{762C8129-56AC-41EC-ADD7-A8DEE5433772}" dt="2021-07-21T11:36:38.712" v="1471" actId="478"/>
+          <ac:cxnSpMkLst>
+            <pc:docMk/>
+            <pc:sldMk cId="362378951" sldId="263"/>
+            <ac:cxnSpMk id="200" creationId="{6BEFFDF0-5CA7-492E-89B4-84F24AF8297D}"/>
+          </ac:cxnSpMkLst>
+        </pc:cxnChg>
+        <pc:cxnChg chg="add del mod">
+          <ac:chgData name="Sebastian Meine" userId="f54488a2a6b7dc9e" providerId="LiveId" clId="{762C8129-56AC-41EC-ADD7-A8DEE5433772}" dt="2021-07-21T11:36:38.712" v="1471" actId="478"/>
+          <ac:cxnSpMkLst>
+            <pc:docMk/>
+            <pc:sldMk cId="362378951" sldId="263"/>
+            <ac:cxnSpMk id="201" creationId="{EE5E0DCA-B86E-4B83-BCBC-4781F40BE75B}"/>
+          </ac:cxnSpMkLst>
+        </pc:cxnChg>
+        <pc:cxnChg chg="add mod">
+          <ac:chgData name="Sebastian Meine" userId="f54488a2a6b7dc9e" providerId="LiveId" clId="{762C8129-56AC-41EC-ADD7-A8DEE5433772}" dt="2021-07-21T11:45:44.335" v="1570" actId="1076"/>
+          <ac:cxnSpMkLst>
+            <pc:docMk/>
+            <pc:sldMk cId="362378951" sldId="263"/>
+            <ac:cxnSpMk id="255" creationId="{20D4A4F4-223B-4BC5-9EF2-B1B020110540}"/>
+          </ac:cxnSpMkLst>
+        </pc:cxnChg>
+        <pc:cxnChg chg="add mod">
+          <ac:chgData name="Sebastian Meine" userId="f54488a2a6b7dc9e" providerId="LiveId" clId="{762C8129-56AC-41EC-ADD7-A8DEE5433772}" dt="2021-07-21T11:45:52.020" v="1571" actId="1076"/>
+          <ac:cxnSpMkLst>
+            <pc:docMk/>
+            <pc:sldMk cId="362378951" sldId="263"/>
+            <ac:cxnSpMk id="256" creationId="{8793CC38-00F7-48F2-ABDE-A148E43944EE}"/>
+          </ac:cxnSpMkLst>
+        </pc:cxnChg>
+      </pc:sldChg>
+      <pc:sldChg chg="addSp delSp modSp mod modAnim modNotesTx">
+        <pc:chgData name="Sebastian Meine" userId="f54488a2a6b7dc9e" providerId="LiveId" clId="{762C8129-56AC-41EC-ADD7-A8DEE5433772}" dt="2021-07-21T12:37:00.325" v="1952"/>
+        <pc:sldMkLst>
+          <pc:docMk/>
+          <pc:sldMk cId="301560968" sldId="264"/>
+        </pc:sldMkLst>
+        <pc:spChg chg="add del mod">
+          <ac:chgData name="Sebastian Meine" userId="f54488a2a6b7dc9e" providerId="LiveId" clId="{762C8129-56AC-41EC-ADD7-A8DEE5433772}" dt="2021-07-21T11:48:13.166" v="1579" actId="478"/>
+          <ac:spMkLst>
+            <pc:docMk/>
+            <pc:sldMk cId="301560968" sldId="264"/>
+            <ac:spMk id="3" creationId="{C4997BCA-02FF-490D-9FCC-91560F028483}"/>
+          </ac:spMkLst>
+        </pc:spChg>
+        <pc:spChg chg="add mod topLvl">
+          <ac:chgData name="Sebastian Meine" userId="f54488a2a6b7dc9e" providerId="LiveId" clId="{762C8129-56AC-41EC-ADD7-A8DEE5433772}" dt="2021-07-21T12:36:33.009" v="1949" actId="165"/>
+          <ac:spMkLst>
+            <pc:docMk/>
+            <pc:sldMk cId="301560968" sldId="264"/>
+            <ac:spMk id="4" creationId="{19812094-D1E7-4165-A8C9-F9374CD3E0A5}"/>
+          </ac:spMkLst>
+        </pc:spChg>
+        <pc:spChg chg="del">
+          <ac:chgData name="Sebastian Meine" userId="f54488a2a6b7dc9e" providerId="LiveId" clId="{762C8129-56AC-41EC-ADD7-A8DEE5433772}" dt="2021-07-21T11:48:06.211" v="1578" actId="478"/>
+          <ac:spMkLst>
+            <pc:docMk/>
+            <pc:sldMk cId="301560968" sldId="264"/>
+            <ac:spMk id="5" creationId="{BDF2C912-E02F-4E1F-82DF-351A88BA5B31}"/>
+          </ac:spMkLst>
+        </pc:spChg>
+        <pc:spChg chg="mod">
+          <ac:chgData name="Sebastian Meine" userId="f54488a2a6b7dc9e" providerId="LiveId" clId="{762C8129-56AC-41EC-ADD7-A8DEE5433772}" dt="2021-07-21T12:25:40.886" v="1770"/>
+          <ac:spMkLst>
+            <pc:docMk/>
+            <pc:sldMk cId="301560968" sldId="264"/>
+            <ac:spMk id="6" creationId="{67FD4DD5-46C1-4974-A569-BB95F27DCC4F}"/>
+          </ac:spMkLst>
+        </pc:spChg>
+        <pc:spChg chg="del">
+          <ac:chgData name="Sebastian Meine" userId="f54488a2a6b7dc9e" providerId="LiveId" clId="{762C8129-56AC-41EC-ADD7-A8DEE5433772}" dt="2021-07-21T11:48:15.805" v="1580" actId="478"/>
+          <ac:spMkLst>
+            <pc:docMk/>
+            <pc:sldMk cId="301560968" sldId="264"/>
+            <ac:spMk id="10" creationId="{690DB7ED-E155-43AE-8374-7155DA5DB857}"/>
+          </ac:spMkLst>
+        </pc:spChg>
+        <pc:spChg chg="add del mod">
+          <ac:chgData name="Sebastian Meine" userId="f54488a2a6b7dc9e" providerId="LiveId" clId="{762C8129-56AC-41EC-ADD7-A8DEE5433772}" dt="2021-07-21T11:48:18.854" v="1581" actId="478"/>
+          <ac:spMkLst>
+            <pc:docMk/>
+            <pc:sldMk cId="301560968" sldId="264"/>
+            <ac:spMk id="11" creationId="{6DBAB3B1-77AA-4893-96F9-D1DD3DA8FFA5}"/>
+          </ac:spMkLst>
+        </pc:spChg>
+        <pc:spChg chg="add mod">
+          <ac:chgData name="Sebastian Meine" userId="f54488a2a6b7dc9e" providerId="LiveId" clId="{762C8129-56AC-41EC-ADD7-A8DEE5433772}" dt="2021-07-21T12:14:23.454" v="1651" actId="20577"/>
+          <ac:spMkLst>
+            <pc:docMk/>
+            <pc:sldMk cId="301560968" sldId="264"/>
+            <ac:spMk id="12" creationId="{6772E62A-4790-40CC-B305-49388610D0DE}"/>
+          </ac:spMkLst>
+        </pc:spChg>
+        <pc:spChg chg="add del mod">
+          <ac:chgData name="Sebastian Meine" userId="f54488a2a6b7dc9e" providerId="LiveId" clId="{762C8129-56AC-41EC-ADD7-A8DEE5433772}" dt="2021-07-21T12:27:36.246" v="1789" actId="21"/>
+          <ac:spMkLst>
+            <pc:docMk/>
+            <pc:sldMk cId="301560968" sldId="264"/>
+            <ac:spMk id="13" creationId="{01F1B964-7570-4BF1-ACFF-2D319C55E4CA}"/>
+          </ac:spMkLst>
+        </pc:spChg>
+        <pc:spChg chg="add mod topLvl">
+          <ac:chgData name="Sebastian Meine" userId="f54488a2a6b7dc9e" providerId="LiveId" clId="{762C8129-56AC-41EC-ADD7-A8DEE5433772}" dt="2021-07-21T12:36:33.009" v="1949" actId="165"/>
+          <ac:spMkLst>
+            <pc:docMk/>
+            <pc:sldMk cId="301560968" sldId="264"/>
+            <ac:spMk id="14" creationId="{FFC261A3-1C9E-463D-AC85-FB2DCA619F40}"/>
+          </ac:spMkLst>
+        </pc:spChg>
+        <pc:spChg chg="add del mod">
+          <ac:chgData name="Sebastian Meine" userId="f54488a2a6b7dc9e" providerId="LiveId" clId="{762C8129-56AC-41EC-ADD7-A8DEE5433772}" dt="2021-07-21T12:30:56.161" v="1860" actId="478"/>
+          <ac:spMkLst>
+            <pc:docMk/>
+            <pc:sldMk cId="301560968" sldId="264"/>
+            <ac:spMk id="15" creationId="{2EA3E027-254D-40F1-B951-34F5BA3FF2D3}"/>
+          </ac:spMkLst>
+        </pc:spChg>
+        <pc:spChg chg="add del mod">
+          <ac:chgData name="Sebastian Meine" userId="f54488a2a6b7dc9e" providerId="LiveId" clId="{762C8129-56AC-41EC-ADD7-A8DEE5433772}" dt="2021-07-21T12:30:55.475" v="1859" actId="478"/>
+          <ac:spMkLst>
+            <pc:docMk/>
+            <pc:sldMk cId="301560968" sldId="264"/>
+            <ac:spMk id="16" creationId="{AB947B28-2052-40EE-ABFA-AFAD5CC2A2EE}"/>
+          </ac:spMkLst>
+        </pc:spChg>
+        <pc:spChg chg="add del mod">
+          <ac:chgData name="Sebastian Meine" userId="f54488a2a6b7dc9e" providerId="LiveId" clId="{762C8129-56AC-41EC-ADD7-A8DEE5433772}" dt="2021-07-21T12:30:55.475" v="1859" actId="478"/>
+          <ac:spMkLst>
+            <pc:docMk/>
+            <pc:sldMk cId="301560968" sldId="264"/>
+            <ac:spMk id="17" creationId="{2A5098C9-1D0D-46A0-BEB0-1D7F0B7490B8}"/>
+          </ac:spMkLst>
+        </pc:spChg>
+        <pc:spChg chg="add del mod topLvl">
+          <ac:chgData name="Sebastian Meine" userId="f54488a2a6b7dc9e" providerId="LiveId" clId="{762C8129-56AC-41EC-ADD7-A8DEE5433772}" dt="2021-07-21T12:36:33.009" v="1949" actId="165"/>
+          <ac:spMkLst>
+            <pc:docMk/>
+            <pc:sldMk cId="301560968" sldId="264"/>
+            <ac:spMk id="18" creationId="{733FAC86-D4B7-4C19-93A0-CB7973FD9526}"/>
+          </ac:spMkLst>
+        </pc:spChg>
+        <pc:spChg chg="add del mod topLvl">
+          <ac:chgData name="Sebastian Meine" userId="f54488a2a6b7dc9e" providerId="LiveId" clId="{762C8129-56AC-41EC-ADD7-A8DEE5433772}" dt="2021-07-21T12:36:33.009" v="1949" actId="165"/>
+          <ac:spMkLst>
+            <pc:docMk/>
+            <pc:sldMk cId="301560968" sldId="264"/>
+            <ac:spMk id="19" creationId="{3D541E82-5A44-4AB6-82DC-1DACADD3CC6D}"/>
+          </ac:spMkLst>
+        </pc:spChg>
+        <pc:spChg chg="add del mod topLvl">
+          <ac:chgData name="Sebastian Meine" userId="f54488a2a6b7dc9e" providerId="LiveId" clId="{762C8129-56AC-41EC-ADD7-A8DEE5433772}" dt="2021-07-21T12:36:33.009" v="1949" actId="165"/>
+          <ac:spMkLst>
+            <pc:docMk/>
+            <pc:sldMk cId="301560968" sldId="264"/>
+            <ac:spMk id="20" creationId="{347FEA3E-A9D5-413E-9392-92052CB836B3}"/>
+          </ac:spMkLst>
+        </pc:spChg>
+        <pc:spChg chg="add del mod">
+          <ac:chgData name="Sebastian Meine" userId="f54488a2a6b7dc9e" providerId="LiveId" clId="{762C8129-56AC-41EC-ADD7-A8DEE5433772}" dt="2021-07-21T12:30:59.815" v="1880"/>
+          <ac:spMkLst>
+            <pc:docMk/>
+            <pc:sldMk cId="301560968" sldId="264"/>
+            <ac:spMk id="21" creationId="{2108FB42-C6B3-4AAC-864D-05D04BD56594}"/>
+          </ac:spMkLst>
+        </pc:spChg>
+        <pc:spChg chg="add del mod">
+          <ac:chgData name="Sebastian Meine" userId="f54488a2a6b7dc9e" providerId="LiveId" clId="{762C8129-56AC-41EC-ADD7-A8DEE5433772}" dt="2021-07-21T12:30:59.815" v="1880"/>
+          <ac:spMkLst>
+            <pc:docMk/>
+            <pc:sldMk cId="301560968" sldId="264"/>
+            <ac:spMk id="22" creationId="{95492423-7A1D-457D-AB21-B5C9213951A9}"/>
+          </ac:spMkLst>
+        </pc:spChg>
+        <pc:spChg chg="add del mod">
+          <ac:chgData name="Sebastian Meine" userId="f54488a2a6b7dc9e" providerId="LiveId" clId="{762C8129-56AC-41EC-ADD7-A8DEE5433772}" dt="2021-07-21T12:30:59.594" v="1879"/>
+          <ac:spMkLst>
+            <pc:docMk/>
+            <pc:sldMk cId="301560968" sldId="264"/>
+            <ac:spMk id="23" creationId="{52667330-421D-4290-B1F8-FFEE6902FB1D}"/>
+          </ac:spMkLst>
+        </pc:spChg>
+        <pc:spChg chg="add del mod">
+          <ac:chgData name="Sebastian Meine" userId="f54488a2a6b7dc9e" providerId="LiveId" clId="{762C8129-56AC-41EC-ADD7-A8DEE5433772}" dt="2021-07-21T12:30:59.594" v="1879"/>
+          <ac:spMkLst>
+            <pc:docMk/>
+            <pc:sldMk cId="301560968" sldId="264"/>
+            <ac:spMk id="24" creationId="{86C8C93C-04F3-4EBE-8BD5-B46A5FEE4446}"/>
+          </ac:spMkLst>
+        </pc:spChg>
+        <pc:spChg chg="add mod">
+          <ac:chgData name="Sebastian Meine" userId="f54488a2a6b7dc9e" providerId="LiveId" clId="{762C8129-56AC-41EC-ADD7-A8DEE5433772}" dt="2021-07-21T12:36:02.978" v="1947" actId="1076"/>
+          <ac:spMkLst>
+            <pc:docMk/>
+            <pc:sldMk cId="301560968" sldId="264"/>
+            <ac:spMk id="26" creationId="{38265066-4A9F-4609-9233-9EA1F73B4DBE}"/>
+          </ac:spMkLst>
+        </pc:spChg>
+        <pc:grpChg chg="add del mod">
+          <ac:chgData name="Sebastian Meine" userId="f54488a2a6b7dc9e" providerId="LiveId" clId="{762C8129-56AC-41EC-ADD7-A8DEE5433772}" dt="2021-07-21T12:36:33.009" v="1949" actId="165"/>
+          <ac:grpSpMkLst>
+            <pc:docMk/>
+            <pc:sldMk cId="301560968" sldId="264"/>
+            <ac:grpSpMk id="25" creationId="{3E34EC59-EAAD-4B91-8B88-EBA33CDC9F4C}"/>
+          </ac:grpSpMkLst>
+        </pc:grpChg>
+      </pc:sldChg>
+      <pc:sldChg chg="addSp delSp modSp mod">
+        <pc:chgData name="Sebastian Meine" userId="f54488a2a6b7dc9e" providerId="LiveId" clId="{762C8129-56AC-41EC-ADD7-A8DEE5433772}" dt="2021-07-21T12:23:10.680" v="1740"/>
+        <pc:sldMkLst>
+          <pc:docMk/>
+          <pc:sldMk cId="2583088686" sldId="265"/>
+        </pc:sldMkLst>
+        <pc:spChg chg="add del mod">
+          <ac:chgData name="Sebastian Meine" userId="f54488a2a6b7dc9e" providerId="LiveId" clId="{762C8129-56AC-41EC-ADD7-A8DEE5433772}" dt="2021-07-21T12:23:01.520" v="1739" actId="478"/>
+          <ac:spMkLst>
+            <pc:docMk/>
+            <pc:sldMk cId="2583088686" sldId="265"/>
+            <ac:spMk id="3" creationId="{F2043F2D-3682-41EA-8011-9A35FD984FA4}"/>
+          </ac:spMkLst>
+        </pc:spChg>
+        <pc:spChg chg="del">
+          <ac:chgData name="Sebastian Meine" userId="f54488a2a6b7dc9e" providerId="LiveId" clId="{762C8129-56AC-41EC-ADD7-A8DEE5433772}" dt="2021-07-21T12:22:50.974" v="1737" actId="478"/>
+          <ac:spMkLst>
+            <pc:docMk/>
+            <pc:sldMk cId="2583088686" sldId="265"/>
+            <ac:spMk id="5" creationId="{BDF2C912-E02F-4E1F-82DF-351A88BA5B31}"/>
+          </ac:spMkLst>
+        </pc:spChg>
+        <pc:spChg chg="del">
+          <ac:chgData name="Sebastian Meine" userId="f54488a2a6b7dc9e" providerId="LiveId" clId="{762C8129-56AC-41EC-ADD7-A8DEE5433772}" dt="2021-07-21T12:22:49.823" v="1736" actId="478"/>
+          <ac:spMkLst>
+            <pc:docMk/>
+            <pc:sldMk cId="2583088686" sldId="265"/>
+            <ac:spMk id="10" creationId="{690DB7ED-E155-43AE-8374-7155DA5DB857}"/>
+          </ac:spMkLst>
+        </pc:spChg>
+        <pc:spChg chg="add mod">
+          <ac:chgData name="Sebastian Meine" userId="f54488a2a6b7dc9e" providerId="LiveId" clId="{762C8129-56AC-41EC-ADD7-A8DEE5433772}" dt="2021-07-21T12:23:10.680" v="1740"/>
+          <ac:spMkLst>
+            <pc:docMk/>
+            <pc:sldMk cId="2583088686" sldId="265"/>
+            <ac:spMk id="11" creationId="{B6318553-AE0A-4087-BF38-5C4151609CDE}"/>
+          </ac:spMkLst>
+        </pc:spChg>
+      </pc:sldChg>
+      <pc:sldChg chg="del">
+        <pc:chgData name="Sebastian Meine" userId="f54488a2a6b7dc9e" providerId="LiveId" clId="{762C8129-56AC-41EC-ADD7-A8DEE5433772}" dt="2021-07-21T12:50:23.092" v="1953" actId="47"/>
+        <pc:sldMkLst>
+          <pc:docMk/>
+          <pc:sldMk cId="4061852696" sldId="266"/>
+        </pc:sldMkLst>
+      </pc:sldChg>
+      <pc:sldChg chg="modSp del mod">
+        <pc:chgData name="Sebastian Meine" userId="f54488a2a6b7dc9e" providerId="LiveId" clId="{762C8129-56AC-41EC-ADD7-A8DEE5433772}" dt="2021-07-21T12:50:23.924" v="1954" actId="47"/>
+        <pc:sldMkLst>
+          <pc:docMk/>
+          <pc:sldMk cId="4132570687" sldId="267"/>
+        </pc:sldMkLst>
+        <pc:spChg chg="mod">
+          <ac:chgData name="Sebastian Meine" userId="f54488a2a6b7dc9e" providerId="LiveId" clId="{762C8129-56AC-41EC-ADD7-A8DEE5433772}" dt="2021-07-21T09:06:58.332" v="10" actId="1076"/>
+          <ac:spMkLst>
+            <pc:docMk/>
+            <pc:sldMk cId="4132570687" sldId="267"/>
+            <ac:spMk id="6" creationId="{67FD4DD5-46C1-4974-A569-BB95F27DCC4F}"/>
+          </ac:spMkLst>
+        </pc:spChg>
+      </pc:sldChg>
+      <pc:sldChg chg="del modNotesTx">
+        <pc:chgData name="Sebastian Meine" userId="f54488a2a6b7dc9e" providerId="LiveId" clId="{762C8129-56AC-41EC-ADD7-A8DEE5433772}" dt="2021-07-21T12:50:25.329" v="1955" actId="47"/>
+        <pc:sldMkLst>
+          <pc:docMk/>
+          <pc:sldMk cId="3832127478" sldId="268"/>
+        </pc:sldMkLst>
+      </pc:sldChg>
+    </pc:docChg>
+  </pc:docChgLst>
+  <pc:docChgLst>
+    <pc:chgData name="Sebastian Meine" userId="f54488a2a6b7dc9e" providerId="LiveId" clId="{BE1DB9F4-E304-4C37-970B-A53B13E8E1BC}"/>
+    <pc:docChg chg="custSel modSld">
+      <pc:chgData name="Sebastian Meine" userId="f54488a2a6b7dc9e" providerId="LiveId" clId="{BE1DB9F4-E304-4C37-970B-A53B13E8E1BC}" dt="2021-07-04T14:49:22.515" v="9"/>
+      <pc:docMkLst>
+        <pc:docMk/>
+      </pc:docMkLst>
+      <pc:sldChg chg="addSp delSp modSp mod">
+        <pc:chgData name="Sebastian Meine" userId="f54488a2a6b7dc9e" providerId="LiveId" clId="{BE1DB9F4-E304-4C37-970B-A53B13E8E1BC}" dt="2021-07-04T14:48:58.033" v="5" actId="478"/>
+        <pc:sldMkLst>
+          <pc:docMk/>
+          <pc:sldMk cId="238189655" sldId="256"/>
+        </pc:sldMkLst>
+        <pc:spChg chg="mod">
+          <ac:chgData name="Sebastian Meine" userId="f54488a2a6b7dc9e" providerId="LiveId" clId="{BE1DB9F4-E304-4C37-970B-A53B13E8E1BC}" dt="2021-07-04T14:43:23.278" v="0" actId="403"/>
+          <ac:spMkLst>
+            <pc:docMk/>
+            <pc:sldMk cId="238189655" sldId="256"/>
+            <ac:spMk id="2" creationId="{87B2046A-71C6-4A5C-90F4-24A921FBE6F2}"/>
+          </ac:spMkLst>
+        </pc:spChg>
+        <pc:spChg chg="add mod">
+          <ac:chgData name="Sebastian Meine" userId="f54488a2a6b7dc9e" providerId="LiveId" clId="{BE1DB9F4-E304-4C37-970B-A53B13E8E1BC}" dt="2021-07-04T14:48:51.469" v="1"/>
+          <ac:spMkLst>
+            <pc:docMk/>
+            <pc:sldMk cId="238189655" sldId="256"/>
+            <ac:spMk id="4" creationId="{59758521-4940-4667-AD02-D9159FCBA0AA}"/>
+          </ac:spMkLst>
+        </pc:spChg>
+        <pc:spChg chg="add del mod">
+          <ac:chgData name="Sebastian Meine" userId="f54488a2a6b7dc9e" providerId="LiveId" clId="{BE1DB9F4-E304-4C37-970B-A53B13E8E1BC}" dt="2021-07-04T14:48:58.033" v="5" actId="478"/>
+          <ac:spMkLst>
+            <pc:docMk/>
+            <pc:sldMk cId="238189655" sldId="256"/>
+            <ac:spMk id="5" creationId="{D8F788BF-858C-49A4-ACB1-BF0BB9B551DE}"/>
+          </ac:spMkLst>
+        </pc:spChg>
+        <pc:spChg chg="add mod">
+          <ac:chgData name="Sebastian Meine" userId="f54488a2a6b7dc9e" providerId="LiveId" clId="{BE1DB9F4-E304-4C37-970B-A53B13E8E1BC}" dt="2021-07-04T14:48:51.469" v="1"/>
+          <ac:spMkLst>
+            <pc:docMk/>
+            <pc:sldMk cId="238189655" sldId="256"/>
+            <ac:spMk id="6" creationId="{16C5E0D0-4B8D-4ABD-AB1C-C34B838619DA}"/>
+          </ac:spMkLst>
+        </pc:spChg>
+      </pc:sldChg>
+      <pc:sldChg chg="addSp delSp modSp mod">
+        <pc:chgData name="Sebastian Meine" userId="f54488a2a6b7dc9e" providerId="LiveId" clId="{BE1DB9F4-E304-4C37-970B-A53B13E8E1BC}" dt="2021-07-04T14:49:01.825" v="6" actId="478"/>
+        <pc:sldMkLst>
+          <pc:docMk/>
+          <pc:sldMk cId="821808063" sldId="257"/>
+        </pc:sldMkLst>
+        <pc:spChg chg="add mod">
+          <ac:chgData name="Sebastian Meine" userId="f54488a2a6b7dc9e" providerId="LiveId" clId="{BE1DB9F4-E304-4C37-970B-A53B13E8E1BC}" dt="2021-07-04T14:48:53.513" v="2"/>
+          <ac:spMkLst>
+            <pc:docMk/>
+            <pc:sldMk cId="821808063" sldId="257"/>
+            <ac:spMk id="6" creationId="{18E16722-5125-474B-813B-7E7FCAD73050}"/>
+          </ac:spMkLst>
+        </pc:spChg>
+        <pc:spChg chg="add del mod">
+          <ac:chgData name="Sebastian Meine" userId="f54488a2a6b7dc9e" providerId="LiveId" clId="{BE1DB9F4-E304-4C37-970B-A53B13E8E1BC}" dt="2021-07-04T14:49:01.825" v="6" actId="478"/>
+          <ac:spMkLst>
+            <pc:docMk/>
+            <pc:sldMk cId="821808063" sldId="257"/>
+            <ac:spMk id="7" creationId="{A3CC68E1-34E3-46EA-8054-08C955DEDCF0}"/>
+          </ac:spMkLst>
+        </pc:spChg>
+        <pc:spChg chg="add mod">
+          <ac:chgData name="Sebastian Meine" userId="f54488a2a6b7dc9e" providerId="LiveId" clId="{BE1DB9F4-E304-4C37-970B-A53B13E8E1BC}" dt="2021-07-04T14:48:53.513" v="2"/>
+          <ac:spMkLst>
+            <pc:docMk/>
+            <pc:sldMk cId="821808063" sldId="257"/>
+            <ac:spMk id="8" creationId="{F93989BF-3261-4820-A19C-59C495FFE0B5}"/>
+          </ac:spMkLst>
+        </pc:spChg>
+      </pc:sldChg>
+      <pc:sldChg chg="addSp modSp mod">
+        <pc:chgData name="Sebastian Meine" userId="f54488a2a6b7dc9e" providerId="LiveId" clId="{BE1DB9F4-E304-4C37-970B-A53B13E8E1BC}" dt="2021-07-04T14:49:17.421" v="8" actId="122"/>
+        <pc:sldMkLst>
+          <pc:docMk/>
+          <pc:sldMk cId="2109793123" sldId="258"/>
+        </pc:sldMkLst>
+        <pc:spChg chg="add mod">
+          <ac:chgData name="Sebastian Meine" userId="f54488a2a6b7dc9e" providerId="LiveId" clId="{BE1DB9F4-E304-4C37-970B-A53B13E8E1BC}" dt="2021-07-04T14:48:54.185" v="3"/>
+          <ac:spMkLst>
+            <pc:docMk/>
+            <pc:sldMk cId="2109793123" sldId="258"/>
+            <ac:spMk id="7" creationId="{18705B3C-262D-45A3-8C90-9FC26244A8CC}"/>
+          </ac:spMkLst>
+        </pc:spChg>
+        <pc:spChg chg="add mod">
+          <ac:chgData name="Sebastian Meine" userId="f54488a2a6b7dc9e" providerId="LiveId" clId="{BE1DB9F4-E304-4C37-970B-A53B13E8E1BC}" dt="2021-07-04T14:49:17.421" v="8" actId="122"/>
+          <ac:spMkLst>
+            <pc:docMk/>
+            <pc:sldMk cId="2109793123" sldId="258"/>
+            <ac:spMk id="8" creationId="{6833897F-8945-43C1-8EE1-2E83FF8331D9}"/>
+          </ac:spMkLst>
+        </pc:spChg>
+        <pc:spChg chg="add mod">
+          <ac:chgData name="Sebastian Meine" userId="f54488a2a6b7dc9e" providerId="LiveId" clId="{BE1DB9F4-E304-4C37-970B-A53B13E8E1BC}" dt="2021-07-04T14:48:54.185" v="3"/>
+          <ac:spMkLst>
+            <pc:docMk/>
+            <pc:sldMk cId="2109793123" sldId="258"/>
+            <ac:spMk id="9" creationId="{4CB1546C-41E9-4CE9-A31D-18CB078FE5F0}"/>
+          </ac:spMkLst>
+        </pc:spChg>
+      </pc:sldChg>
+      <pc:sldChg chg="addSp modSp mod">
+        <pc:chgData name="Sebastian Meine" userId="f54488a2a6b7dc9e" providerId="LiveId" clId="{BE1DB9F4-E304-4C37-970B-A53B13E8E1BC}" dt="2021-07-04T14:49:22.515" v="9"/>
+        <pc:sldMkLst>
+          <pc:docMk/>
+          <pc:sldMk cId="583026924" sldId="259"/>
+        </pc:sldMkLst>
+        <pc:spChg chg="add mod">
+          <ac:chgData name="Sebastian Meine" userId="f54488a2a6b7dc9e" providerId="LiveId" clId="{BE1DB9F4-E304-4C37-970B-A53B13E8E1BC}" dt="2021-07-04T14:48:54.870" v="4"/>
+          <ac:spMkLst>
+            <pc:docMk/>
+            <pc:sldMk cId="583026924" sldId="259"/>
+            <ac:spMk id="7" creationId="{10FFBAAD-19F5-4D04-A8CB-A12454F58FFD}"/>
+          </ac:spMkLst>
+        </pc:spChg>
+        <pc:spChg chg="add mod">
+          <ac:chgData name="Sebastian Meine" userId="f54488a2a6b7dc9e" providerId="LiveId" clId="{BE1DB9F4-E304-4C37-970B-A53B13E8E1BC}" dt="2021-07-04T14:49:22.515" v="9"/>
+          <ac:spMkLst>
+            <pc:docMk/>
+            <pc:sldMk cId="583026924" sldId="259"/>
+            <ac:spMk id="8" creationId="{3B4D951D-CFCF-46C6-91EB-50913F6DFC4D}"/>
+          </ac:spMkLst>
+        </pc:spChg>
+        <pc:spChg chg="add mod">
+          <ac:chgData name="Sebastian Meine" userId="f54488a2a6b7dc9e" providerId="LiveId" clId="{BE1DB9F4-E304-4C37-970B-A53B13E8E1BC}" dt="2021-07-04T14:48:54.870" v="4"/>
+          <ac:spMkLst>
+            <pc:docMk/>
+            <pc:sldMk cId="583026924" sldId="259"/>
+            <ac:spMk id="9" creationId="{3690FB59-357D-44F2-A4A7-2F771FE7F7EF}"/>
           </ac:spMkLst>
         </pc:spChg>
       </pc:sldChg>
@@ -2912,7 +2912,7 @@
           <a:p>
             <a:fld id="{7EEA6D30-C85F-4C90-B3D4-A5F73A560177}" type="datetimeFigureOut">
               <a:rPr lang="de-DE" smtClean="0"/>
-              <a:t>21.07.2021</a:t>
+              <a:t>25.07.21</a:t>
             </a:fld>
             <a:endParaRPr lang="de-DE"/>
           </a:p>
@@ -3654,7 +3654,7 @@
           <a:p>
             <a:fld id="{D4AD37E9-5A10-49A7-855D-CAA2D2E848B6}" type="datetimeFigureOut">
               <a:rPr lang="de-DE" smtClean="0"/>
-              <a:t>21.07.2021</a:t>
+              <a:t>25.07.21</a:t>
             </a:fld>
             <a:endParaRPr lang="de-DE"/>
           </a:p>
@@ -3935,7 +3935,7 @@
           <a:p>
             <a:fld id="{D4AD37E9-5A10-49A7-855D-CAA2D2E848B6}" type="datetimeFigureOut">
               <a:rPr lang="de-DE" smtClean="0"/>
-              <a:t>21.07.2021</a:t>
+              <a:t>25.07.21</a:t>
             </a:fld>
             <a:endParaRPr lang="de-DE"/>
           </a:p>
@@ -4127,7 +4127,7 @@
           <a:p>
             <a:fld id="{D4AD37E9-5A10-49A7-855D-CAA2D2E848B6}" type="datetimeFigureOut">
               <a:rPr lang="de-DE" smtClean="0"/>
-              <a:t>21.07.2021</a:t>
+              <a:t>25.07.21</a:t>
             </a:fld>
             <a:endParaRPr lang="de-DE"/>
           </a:p>
@@ -4388,7 +4388,7 @@
           <a:p>
             <a:fld id="{D4AD37E9-5A10-49A7-855D-CAA2D2E848B6}" type="datetimeFigureOut">
               <a:rPr lang="de-DE" smtClean="0"/>
-              <a:t>21.07.2021</a:t>
+              <a:t>25.07.21</a:t>
             </a:fld>
             <a:endParaRPr lang="de-DE"/>
           </a:p>
@@ -4814,7 +4814,7 @@
           <a:p>
             <a:fld id="{D4AD37E9-5A10-49A7-855D-CAA2D2E848B6}" type="datetimeFigureOut">
               <a:rPr lang="de-DE" smtClean="0"/>
-              <a:t>21.07.2021</a:t>
+              <a:t>25.07.21</a:t>
             </a:fld>
             <a:endParaRPr lang="de-DE"/>
           </a:p>
@@ -5360,7 +5360,7 @@
           <a:p>
             <a:fld id="{D4AD37E9-5A10-49A7-855D-CAA2D2E848B6}" type="datetimeFigureOut">
               <a:rPr lang="de-DE" smtClean="0"/>
-              <a:t>21.07.2021</a:t>
+              <a:t>25.07.21</a:t>
             </a:fld>
             <a:endParaRPr lang="de-DE"/>
           </a:p>
@@ -6191,7 +6191,7 @@
           <a:p>
             <a:fld id="{D4AD37E9-5A10-49A7-855D-CAA2D2E848B6}" type="datetimeFigureOut">
               <a:rPr lang="de-DE" smtClean="0"/>
-              <a:t>21.07.2021</a:t>
+              <a:t>25.07.21</a:t>
             </a:fld>
             <a:endParaRPr lang="de-DE"/>
           </a:p>
@@ -6361,7 +6361,7 @@
           <a:p>
             <a:fld id="{D4AD37E9-5A10-49A7-855D-CAA2D2E848B6}" type="datetimeFigureOut">
               <a:rPr lang="de-DE" smtClean="0"/>
-              <a:t>21.07.2021</a:t>
+              <a:t>25.07.21</a:t>
             </a:fld>
             <a:endParaRPr lang="de-DE"/>
           </a:p>
@@ -6541,7 +6541,7 @@
           <a:p>
             <a:fld id="{D4AD37E9-5A10-49A7-855D-CAA2D2E848B6}" type="datetimeFigureOut">
               <a:rPr lang="de-DE" smtClean="0"/>
-              <a:t>21.07.2021</a:t>
+              <a:t>25.07.21</a:t>
             </a:fld>
             <a:endParaRPr lang="de-DE"/>
           </a:p>
@@ -6711,7 +6711,7 @@
           <a:p>
             <a:fld id="{D4AD37E9-5A10-49A7-855D-CAA2D2E848B6}" type="datetimeFigureOut">
               <a:rPr lang="de-DE" smtClean="0"/>
-              <a:t>21.07.2021</a:t>
+              <a:t>25.07.21</a:t>
             </a:fld>
             <a:endParaRPr lang="de-DE"/>
           </a:p>
@@ -6968,7 +6968,7 @@
           <a:p>
             <a:fld id="{D4AD37E9-5A10-49A7-855D-CAA2D2E848B6}" type="datetimeFigureOut">
               <a:rPr lang="de-DE" smtClean="0"/>
-              <a:t>21.07.2021</a:t>
+              <a:t>25.07.21</a:t>
             </a:fld>
             <a:endParaRPr lang="de-DE"/>
           </a:p>
@@ -7200,7 +7200,7 @@
           <a:p>
             <a:fld id="{D4AD37E9-5A10-49A7-855D-CAA2D2E848B6}" type="datetimeFigureOut">
               <a:rPr lang="de-DE" smtClean="0"/>
-              <a:t>21.07.2021</a:t>
+              <a:t>25.07.21</a:t>
             </a:fld>
             <a:endParaRPr lang="de-DE"/>
           </a:p>
@@ -7593,7 +7593,7 @@
           <a:p>
             <a:fld id="{D4AD37E9-5A10-49A7-855D-CAA2D2E848B6}" type="datetimeFigureOut">
               <a:rPr lang="de-DE" smtClean="0"/>
-              <a:t>21.07.2021</a:t>
+              <a:t>25.07.21</a:t>
             </a:fld>
             <a:endParaRPr lang="de-DE"/>
           </a:p>
@@ -7711,7 +7711,7 @@
           <a:p>
             <a:fld id="{D4AD37E9-5A10-49A7-855D-CAA2D2E848B6}" type="datetimeFigureOut">
               <a:rPr lang="de-DE" smtClean="0"/>
-              <a:t>21.07.2021</a:t>
+              <a:t>25.07.21</a:t>
             </a:fld>
             <a:endParaRPr lang="de-DE"/>
           </a:p>
@@ -7806,7 +7806,7 @@
           <a:p>
             <a:fld id="{D4AD37E9-5A10-49A7-855D-CAA2D2E848B6}" type="datetimeFigureOut">
               <a:rPr lang="de-DE" smtClean="0"/>
-              <a:t>21.07.2021</a:t>
+              <a:t>25.07.21</a:t>
             </a:fld>
             <a:endParaRPr lang="de-DE"/>
           </a:p>
@@ -8079,7 +8079,7 @@
           <a:p>
             <a:fld id="{D4AD37E9-5A10-49A7-855D-CAA2D2E848B6}" type="datetimeFigureOut">
               <a:rPr lang="de-DE" smtClean="0"/>
-              <a:t>21.07.2021</a:t>
+              <a:t>25.07.21</a:t>
             </a:fld>
             <a:endParaRPr lang="de-DE"/>
           </a:p>
@@ -8360,7 +8360,7 @@
           <a:p>
             <a:fld id="{D4AD37E9-5A10-49A7-855D-CAA2D2E848B6}" type="datetimeFigureOut">
               <a:rPr lang="de-DE" smtClean="0"/>
-              <a:t>21.07.2021</a:t>
+              <a:t>25.07.21</a:t>
             </a:fld>
             <a:endParaRPr lang="de-DE"/>
           </a:p>
@@ -8600,7 +8600,7 @@
           <a:p>
             <a:fld id="{D4AD37E9-5A10-49A7-855D-CAA2D2E848B6}" type="datetimeFigureOut">
               <a:rPr lang="de-DE" smtClean="0"/>
-              <a:t>21.07.2021</a:t>
+              <a:t>25.07.21</a:t>
             </a:fld>
             <a:endParaRPr lang="de-DE"/>
           </a:p>
@@ -9262,7 +9262,7 @@
           <a:p>
             <a:fld id="{D4AD37E9-5A10-49A7-855D-CAA2D2E848B6}" type="datetimeFigureOut">
               <a:rPr lang="de-DE" smtClean="0"/>
-              <a:t>21.07.2021</a:t>
+              <a:t>25.07.21</a:t>
             </a:fld>
             <a:endParaRPr lang="de-DE" dirty="0"/>
           </a:p>
@@ -9783,7 +9783,7 @@
           <a:p>
             <a:fld id="{D4AD37E9-5A10-49A7-855D-CAA2D2E848B6}" type="datetimeFigureOut">
               <a:rPr lang="de-DE" smtClean="0"/>
-              <a:t>21.07.2021</a:t>
+              <a:t>25.07.21</a:t>
             </a:fld>
             <a:endParaRPr lang="de-DE"/>
           </a:p>
@@ -9816,14 +9816,14 @@
           <a:lstStyle/>
           <a:p>
             <a:r>
-              <a:rPr lang="de-DE" sz="1200" dirty="0" err="1">
+              <a:rPr lang="de-DE" dirty="0">
                 <a:solidFill>
                   <a:schemeClr val="tx1">
                     <a:lumMod val="95000"/>
                   </a:schemeClr>
                 </a:solidFill>
               </a:rPr>
-              <a:t>Unittesting</a:t>
+              <a:t>Threading</a:t>
             </a:r>
             <a:endParaRPr lang="en-US" sz="1200" dirty="0">
               <a:solidFill>
@@ -10404,7 +10404,7 @@
           <a:p>
             <a:fld id="{D4AD37E9-5A10-49A7-855D-CAA2D2E848B6}" type="datetimeFigureOut">
               <a:rPr lang="de-DE" smtClean="0"/>
-              <a:t>21.07.2021</a:t>
+              <a:t>25.07.21</a:t>
             </a:fld>
             <a:endParaRPr lang="de-DE"/>
           </a:p>
@@ -10437,14 +10437,14 @@
           <a:lstStyle/>
           <a:p>
             <a:r>
-              <a:rPr lang="de-DE" sz="1200" dirty="0" err="1">
+              <a:rPr lang="de-DE" dirty="0">
                 <a:solidFill>
                   <a:schemeClr val="tx1">
                     <a:lumMod val="95000"/>
                   </a:schemeClr>
                 </a:solidFill>
               </a:rPr>
-              <a:t>Unittesting</a:t>
+              <a:t>Threading</a:t>
             </a:r>
             <a:endParaRPr lang="en-US" sz="1200" dirty="0">
               <a:solidFill>
@@ -16594,7 +16594,7 @@
           <a:p>
             <a:fld id="{D4AD37E9-5A10-49A7-855D-CAA2D2E848B6}" type="datetimeFigureOut">
               <a:rPr lang="de-DE" smtClean="0"/>
-              <a:t>21.07.2021</a:t>
+              <a:t>25.07.21</a:t>
             </a:fld>
             <a:endParaRPr lang="de-DE"/>
           </a:p>
@@ -16627,14 +16627,14 @@
           <a:lstStyle/>
           <a:p>
             <a:r>
-              <a:rPr lang="de-DE" sz="1200" dirty="0" err="1">
+              <a:rPr lang="de-DE" dirty="0">
                 <a:solidFill>
                   <a:schemeClr val="tx1">
                     <a:lumMod val="95000"/>
                   </a:schemeClr>
                 </a:solidFill>
               </a:rPr>
-              <a:t>Unittesting</a:t>
+              <a:t>Threading</a:t>
             </a:r>
             <a:endParaRPr lang="en-US" sz="1200" dirty="0">
               <a:solidFill>
@@ -18729,7 +18729,7 @@
           <a:p>
             <a:fld id="{D4AD37E9-5A10-49A7-855D-CAA2D2E848B6}" type="datetimeFigureOut">
               <a:rPr lang="de-DE" smtClean="0"/>
-              <a:t>21.07.2021</a:t>
+              <a:t>25.07.21</a:t>
             </a:fld>
             <a:endParaRPr lang="de-DE"/>
           </a:p>
@@ -18762,14 +18762,14 @@
           <a:lstStyle/>
           <a:p>
             <a:r>
-              <a:rPr lang="de-DE" sz="1200" dirty="0" err="1">
+              <a:rPr lang="de-DE">
                 <a:solidFill>
                   <a:schemeClr val="tx1">
                     <a:lumMod val="95000"/>
                   </a:schemeClr>
                 </a:solidFill>
               </a:rPr>
-              <a:t>Unittesting</a:t>
+              <a:t>Threading</a:t>
             </a:r>
             <a:endParaRPr lang="en-US" sz="1200" dirty="0">
               <a:solidFill>

</xml_diff>